<commit_message>
add slides for ray-tracing
</commit_message>
<xml_diff>
--- a/computer-graphics-js-1.pptx
+++ b/computer-graphics-js-1.pptx
@@ -5,13 +5,14 @@
     <p:sldMasterId id="2147483648" r:id="rId1"/>
   </p:sldMasterIdLst>
   <p:notesMasterIdLst>
-    <p:notesMasterId r:id="rId6"/>
+    <p:notesMasterId r:id="rId7"/>
   </p:notesMasterIdLst>
   <p:sldIdLst>
     <p:sldId id="256" r:id="rId2"/>
     <p:sldId id="257" r:id="rId3"/>
     <p:sldId id="258" r:id="rId4"/>
     <p:sldId id="259" r:id="rId5"/>
+    <p:sldId id="260" r:id="rId6"/>
   </p:sldIdLst>
   <p:sldSz cx="12192000" cy="6858000"/>
   <p:notesSz cx="6858000" cy="9144000"/>
@@ -110,6 +111,11 @@
       </a:defRPr>
     </a:lvl9pPr>
   </p:defaultTextStyle>
+  <p:extLst>
+    <p:ext uri="{EFAFB233-063F-42B5-8137-9DF3F51BA10A}">
+      <p15:sldGuideLst xmlns:p15="http://schemas.microsoft.com/office/powerpoint/2012/main"/>
+    </p:ext>
+  </p:extLst>
 </p:presentation>
 </file>
 
@@ -4951,6 +4957,327 @@
     <p:extLst>
       <p:ext uri="{BB962C8B-B14F-4D97-AF65-F5344CB8AC3E}">
         <p14:creationId xmlns:p14="http://schemas.microsoft.com/office/powerpoint/2010/main" val="1115997790"/>
+      </p:ext>
+    </p:extLst>
+  </p:cSld>
+  <p:clrMapOvr>
+    <a:masterClrMapping/>
+  </p:clrMapOvr>
+</p:sld>
+</file>
+
+<file path=ppt/slides/slide5.xml><?xml version="1.0" encoding="utf-8"?>
+<p:sld xmlns:a="http://schemas.openxmlformats.org/drawingml/2006/main" xmlns:r="http://schemas.openxmlformats.org/officeDocument/2006/relationships" xmlns:p="http://schemas.openxmlformats.org/presentationml/2006/main">
+  <p:cSld>
+    <p:spTree>
+      <p:nvGrpSpPr>
+        <p:cNvPr id="1" name=""/>
+        <p:cNvGrpSpPr/>
+        <p:nvPr/>
+      </p:nvGrpSpPr>
+      <p:grpSpPr>
+        <a:xfrm>
+          <a:off x="0" y="0"/>
+          <a:ext cx="0" cy="0"/>
+          <a:chOff x="0" y="0"/>
+          <a:chExt cx="0" cy="0"/>
+        </a:xfrm>
+      </p:grpSpPr>
+      <p:sp>
+        <p:nvSpPr>
+          <p:cNvPr id="2" name="Title 1">
+            <a:extLst>
+              <a:ext uri="{FF2B5EF4-FFF2-40B4-BE49-F238E27FC236}">
+                <a16:creationId xmlns:a16="http://schemas.microsoft.com/office/drawing/2014/main" id="{B1DE1D93-D103-4F28-85EC-E27216354621}"/>
+              </a:ext>
+            </a:extLst>
+          </p:cNvPr>
+          <p:cNvSpPr>
+            <a:spLocks noGrp="1"/>
+          </p:cNvSpPr>
+          <p:nvPr>
+            <p:ph type="title"/>
+          </p:nvPr>
+        </p:nvSpPr>
+        <p:spPr/>
+        <p:txBody>
+          <a:bodyPr/>
+          <a:lstStyle/>
+          <a:p>
+            <a:r>
+              <a:rPr lang="en-US" dirty="0"/>
+              <a:t>Basic Raytracing</a:t>
+            </a:r>
+          </a:p>
+        </p:txBody>
+      </p:sp>
+      <p:sp>
+        <p:nvSpPr>
+          <p:cNvPr id="3" name="Content Placeholder 2">
+            <a:extLst>
+              <a:ext uri="{FF2B5EF4-FFF2-40B4-BE49-F238E27FC236}">
+                <a16:creationId xmlns:a16="http://schemas.microsoft.com/office/drawing/2014/main" id="{F147BA42-A60C-4037-B079-DFE47B9C3DC1}"/>
+              </a:ext>
+            </a:extLst>
+          </p:cNvPr>
+          <p:cNvSpPr>
+            <a:spLocks noGrp="1"/>
+          </p:cNvSpPr>
+          <p:nvPr>
+            <p:ph idx="1"/>
+          </p:nvPr>
+        </p:nvSpPr>
+        <p:spPr/>
+        <p:txBody>
+          <a:bodyPr/>
+          <a:lstStyle/>
+          <a:p>
+            <a:pPr marL="0" indent="0">
+              <a:buNone/>
+            </a:pPr>
+            <a:r>
+              <a:rPr lang="en-US" dirty="0"/>
+              <a:t>Pseudocode: </a:t>
+            </a:r>
+          </a:p>
+          <a:p>
+            <a:pPr marL="0" indent="0">
+              <a:buNone/>
+            </a:pPr>
+            <a:endParaRPr lang="en-US" dirty="0"/>
+          </a:p>
+        </p:txBody>
+      </p:sp>
+      <p:sp>
+        <p:nvSpPr>
+          <p:cNvPr id="4" name="Date Placeholder 3">
+            <a:extLst>
+              <a:ext uri="{FF2B5EF4-FFF2-40B4-BE49-F238E27FC236}">
+                <a16:creationId xmlns:a16="http://schemas.microsoft.com/office/drawing/2014/main" id="{2DFCFD9A-54E6-45B0-AE26-A6F5D8255C39}"/>
+              </a:ext>
+            </a:extLst>
+          </p:cNvPr>
+          <p:cNvSpPr>
+            <a:spLocks noGrp="1"/>
+          </p:cNvSpPr>
+          <p:nvPr>
+            <p:ph type="dt" sz="half" idx="10"/>
+          </p:nvPr>
+        </p:nvSpPr>
+        <p:spPr/>
+        <p:txBody>
+          <a:bodyPr/>
+          <a:lstStyle/>
+          <a:p>
+            <a:fld id="{82BCD581-7540-41CB-8BBB-BEC98AE789ED}" type="datetime1">
+              <a:rPr lang="en-US" smtClean="0"/>
+              <a:t>2/24/2021</a:t>
+            </a:fld>
+            <a:endParaRPr lang="en-US"/>
+          </a:p>
+        </p:txBody>
+      </p:sp>
+      <p:sp>
+        <p:nvSpPr>
+          <p:cNvPr id="5" name="Footer Placeholder 4">
+            <a:extLst>
+              <a:ext uri="{FF2B5EF4-FFF2-40B4-BE49-F238E27FC236}">
+                <a16:creationId xmlns:a16="http://schemas.microsoft.com/office/drawing/2014/main" id="{3D4E6B97-08C1-44FF-B059-963E71CCC39D}"/>
+              </a:ext>
+            </a:extLst>
+          </p:cNvPr>
+          <p:cNvSpPr>
+            <a:spLocks noGrp="1"/>
+          </p:cNvSpPr>
+          <p:nvPr>
+            <p:ph type="ftr" sz="quarter" idx="11"/>
+          </p:nvPr>
+        </p:nvSpPr>
+        <p:spPr/>
+        <p:txBody>
+          <a:bodyPr/>
+          <a:lstStyle/>
+          <a:p>
+            <a:r>
+              <a:rPr lang="en-US"/>
+              <a:t>Gambetta, Gabriel. 2021, Computer Graphics from Scratch</a:t>
+            </a:r>
+          </a:p>
+        </p:txBody>
+      </p:sp>
+      <p:pic>
+        <p:nvPicPr>
+          <p:cNvPr id="7" name="Picture 6">
+            <a:extLst>
+              <a:ext uri="{FF2B5EF4-FFF2-40B4-BE49-F238E27FC236}">
+                <a16:creationId xmlns:a16="http://schemas.microsoft.com/office/drawing/2014/main" id="{6C62F3C6-2CD2-430B-A306-3B3B859C8441}"/>
+              </a:ext>
+            </a:extLst>
+          </p:cNvPr>
+          <p:cNvPicPr>
+            <a:picLocks noChangeAspect="1"/>
+          </p:cNvPicPr>
+          <p:nvPr/>
+        </p:nvPicPr>
+        <p:blipFill>
+          <a:blip r:embed="rId2">
+            <a:extLst>
+              <a:ext uri="{28A0092B-C50C-407E-A947-70E740481C1C}">
+                <a14:useLocalDpi xmlns:a14="http://schemas.microsoft.com/office/drawing/2010/main" val="0"/>
+              </a:ext>
+            </a:extLst>
+          </a:blip>
+          <a:stretch>
+            <a:fillRect/>
+          </a:stretch>
+        </p:blipFill>
+        <p:spPr>
+          <a:xfrm>
+            <a:off x="1920756" y="2564369"/>
+            <a:ext cx="7957252" cy="812970"/>
+          </a:xfrm>
+          <a:prstGeom prst="rect">
+            <a:avLst/>
+          </a:prstGeom>
+        </p:spPr>
+      </p:pic>
+      <p:pic>
+        <p:nvPicPr>
+          <p:cNvPr id="1026" name="Picture 2" descr="Figure 2-1: A breathtaking Swiss landscape">
+            <a:extLst>
+              <a:ext uri="{FF2B5EF4-FFF2-40B4-BE49-F238E27FC236}">
+                <a16:creationId xmlns:a16="http://schemas.microsoft.com/office/drawing/2014/main" id="{FAE330BF-5699-41CC-8E7E-DC3A8219DCB9}"/>
+              </a:ext>
+            </a:extLst>
+          </p:cNvPr>
+          <p:cNvPicPr>
+            <a:picLocks noChangeAspect="1" noChangeArrowheads="1"/>
+          </p:cNvPicPr>
+          <p:nvPr/>
+        </p:nvPicPr>
+        <p:blipFill>
+          <a:blip r:embed="rId3">
+            <a:extLst>
+              <a:ext uri="{28A0092B-C50C-407E-A947-70E740481C1C}">
+                <a14:useLocalDpi xmlns:a14="http://schemas.microsoft.com/office/drawing/2010/main" val="0"/>
+              </a:ext>
+            </a:extLst>
+          </a:blip>
+          <a:srcRect/>
+          <a:stretch>
+            <a:fillRect/>
+          </a:stretch>
+        </p:blipFill>
+        <p:spPr bwMode="auto">
+          <a:xfrm>
+            <a:off x="1982468" y="3429000"/>
+            <a:ext cx="3155447" cy="2366585"/>
+          </a:xfrm>
+          <a:prstGeom prst="rect">
+            <a:avLst/>
+          </a:prstGeom>
+          <a:noFill/>
+          <a:extLst>
+            <a:ext uri="{909E8E84-426E-40DD-AFC4-6F175D3DCCD1}">
+              <a14:hiddenFill xmlns:a14="http://schemas.microsoft.com/office/drawing/2010/main">
+                <a:solidFill>
+                  <a:srgbClr val="FFFFFF"/>
+                </a:solidFill>
+              </a14:hiddenFill>
+            </a:ext>
+          </a:extLst>
+        </p:spPr>
+      </p:pic>
+      <p:pic>
+        <p:nvPicPr>
+          <p:cNvPr id="1028" name="Picture 4" descr="Figure 2-2: A crude approximation of the landscape">
+            <a:extLst>
+              <a:ext uri="{FF2B5EF4-FFF2-40B4-BE49-F238E27FC236}">
+                <a16:creationId xmlns:a16="http://schemas.microsoft.com/office/drawing/2014/main" id="{3D7D51AE-2F66-4E69-BE46-1E44B372E748}"/>
+              </a:ext>
+            </a:extLst>
+          </p:cNvPr>
+          <p:cNvPicPr>
+            <a:picLocks noChangeAspect="1" noChangeArrowheads="1"/>
+          </p:cNvPicPr>
+          <p:nvPr/>
+        </p:nvPicPr>
+        <p:blipFill>
+          <a:blip r:embed="rId4">
+            <a:extLst>
+              <a:ext uri="{28A0092B-C50C-407E-A947-70E740481C1C}">
+                <a14:useLocalDpi xmlns:a14="http://schemas.microsoft.com/office/drawing/2010/main" val="0"/>
+              </a:ext>
+            </a:extLst>
+          </a:blip>
+          <a:srcRect/>
+          <a:stretch>
+            <a:fillRect/>
+          </a:stretch>
+        </p:blipFill>
+        <p:spPr bwMode="auto">
+          <a:xfrm>
+            <a:off x="6668135" y="3419810"/>
+            <a:ext cx="3155445" cy="2366584"/>
+          </a:xfrm>
+          <a:prstGeom prst="rect">
+            <a:avLst/>
+          </a:prstGeom>
+          <a:noFill/>
+          <a:extLst>
+            <a:ext uri="{909E8E84-426E-40DD-AFC4-6F175D3DCCD1}">
+              <a14:hiddenFill xmlns:a14="http://schemas.microsoft.com/office/drawing/2010/main">
+                <a:solidFill>
+                  <a:srgbClr val="FFFFFF"/>
+                </a:solidFill>
+              </a14:hiddenFill>
+            </a:ext>
+          </a:extLst>
+        </p:spPr>
+      </p:pic>
+      <p:cxnSp>
+        <p:nvCxnSpPr>
+          <p:cNvPr id="18" name="Connector: Elbow 17">
+            <a:extLst>
+              <a:ext uri="{FF2B5EF4-FFF2-40B4-BE49-F238E27FC236}">
+                <a16:creationId xmlns:a16="http://schemas.microsoft.com/office/drawing/2014/main" id="{298374BB-5D9C-487B-A804-C00AF82F3569}"/>
+              </a:ext>
+            </a:extLst>
+          </p:cNvPr>
+          <p:cNvCxnSpPr/>
+          <p:nvPr/>
+        </p:nvCxnSpPr>
+        <p:spPr>
+          <a:xfrm>
+            <a:off x="5137915" y="4093029"/>
+            <a:ext cx="1480599" cy="1020147"/>
+          </a:xfrm>
+          <a:prstGeom prst="bentConnector3">
+            <a:avLst/>
+          </a:prstGeom>
+          <a:ln>
+            <a:tailEnd type="triangle"/>
+          </a:ln>
+        </p:spPr>
+        <p:style>
+          <a:lnRef idx="1">
+            <a:schemeClr val="accent1"/>
+          </a:lnRef>
+          <a:fillRef idx="0">
+            <a:schemeClr val="accent1"/>
+          </a:fillRef>
+          <a:effectRef idx="0">
+            <a:schemeClr val="accent1"/>
+          </a:effectRef>
+          <a:fontRef idx="minor">
+            <a:schemeClr val="tx1"/>
+          </a:fontRef>
+        </p:style>
+      </p:cxnSp>
+    </p:spTree>
+    <p:extLst>
+      <p:ext uri="{BB962C8B-B14F-4D97-AF65-F5344CB8AC3E}">
+        <p14:creationId xmlns:p14="http://schemas.microsoft.com/office/powerpoint/2010/main" val="4254742362"/>
       </p:ext>
     </p:extLst>
   </p:cSld>

</xml_diff>

<commit_message>
add ray tracing html and JS class, added more ray tracing slides to slide deck
</commit_message>
<xml_diff>
--- a/computer-graphics-js-1.pptx
+++ b/computer-graphics-js-1.pptx
@@ -5,7 +5,7 @@
     <p:sldMasterId id="2147483648" r:id="rId1"/>
   </p:sldMasterIdLst>
   <p:notesMasterIdLst>
-    <p:notesMasterId r:id="rId7"/>
+    <p:notesMasterId r:id="rId8"/>
   </p:notesMasterIdLst>
   <p:sldIdLst>
     <p:sldId id="256" r:id="rId2"/>
@@ -13,6 +13,7 @@
     <p:sldId id="258" r:id="rId4"/>
     <p:sldId id="259" r:id="rId5"/>
     <p:sldId id="260" r:id="rId6"/>
+    <p:sldId id="261" r:id="rId7"/>
   </p:sldIdLst>
   <p:sldSz cx="12192000" cy="6858000"/>
   <p:notesSz cx="6858000" cy="9144000"/>
@@ -4617,6 +4618,61 @@
           </a:prstGeom>
         </p:spPr>
       </p:pic>
+      <p:sp>
+        <p:nvSpPr>
+          <p:cNvPr id="3" name="TextBox 2">
+            <a:extLst>
+              <a:ext uri="{FF2B5EF4-FFF2-40B4-BE49-F238E27FC236}">
+                <a16:creationId xmlns:a16="http://schemas.microsoft.com/office/drawing/2014/main" id="{8123814D-2B3E-4CE8-8CC1-2B6A1802CD00}"/>
+              </a:ext>
+            </a:extLst>
+          </p:cNvPr>
+          <p:cNvSpPr txBox="1"/>
+          <p:nvPr/>
+        </p:nvSpPr>
+        <p:spPr>
+          <a:xfrm>
+            <a:off x="2868001" y="5987018"/>
+            <a:ext cx="6455998" cy="369332"/>
+          </a:xfrm>
+          <a:prstGeom prst="rect">
+            <a:avLst/>
+          </a:prstGeom>
+          <a:noFill/>
+        </p:spPr>
+        <p:txBody>
+          <a:bodyPr wrap="none" rtlCol="0">
+            <a:spAutoFit/>
+          </a:bodyPr>
+          <a:lstStyle/>
+          <a:p>
+            <a:r>
+              <a:rPr lang="en-US" dirty="0"/>
+              <a:t>Note: We will assume </a:t>
+            </a:r>
+            <a:r>
+              <a:rPr lang="en-US" i="1" dirty="0" err="1">
+                <a:solidFill>
+                  <a:schemeClr val="tx2"/>
+                </a:solidFill>
+              </a:rPr>
+              <a:t>canvas.PutPixel</a:t>
+            </a:r>
+            <a:r>
+              <a:rPr lang="en-US" i="1" dirty="0">
+                <a:solidFill>
+                  <a:schemeClr val="tx2"/>
+                </a:solidFill>
+              </a:rPr>
+              <a:t>() </a:t>
+            </a:r>
+            <a:r>
+              <a:rPr lang="en-US" dirty="0"/>
+              <a:t>does this conversion for us. </a:t>
+            </a:r>
+          </a:p>
+        </p:txBody>
+      </p:sp>
     </p:spTree>
     <p:extLst>
       <p:ext uri="{BB962C8B-B14F-4D97-AF65-F5344CB8AC3E}">
@@ -5006,7 +5062,7 @@
           <a:p>
             <a:r>
               <a:rPr lang="en-US" dirty="0"/>
-              <a:t>Basic Raytracing</a:t>
+              <a:t>Raytracing</a:t>
             </a:r>
           </a:p>
         </p:txBody>
@@ -5278,6 +5334,391 @@
     <p:extLst>
       <p:ext uri="{BB962C8B-B14F-4D97-AF65-F5344CB8AC3E}">
         <p14:creationId xmlns:p14="http://schemas.microsoft.com/office/powerpoint/2010/main" val="4254742362"/>
+      </p:ext>
+    </p:extLst>
+  </p:cSld>
+  <p:clrMapOvr>
+    <a:masterClrMapping/>
+  </p:clrMapOvr>
+</p:sld>
+</file>
+
+<file path=ppt/slides/slide6.xml><?xml version="1.0" encoding="utf-8"?>
+<p:sld xmlns:a="http://schemas.openxmlformats.org/drawingml/2006/main" xmlns:r="http://schemas.openxmlformats.org/officeDocument/2006/relationships" xmlns:p="http://schemas.openxmlformats.org/presentationml/2006/main">
+  <p:cSld>
+    <p:spTree>
+      <p:nvGrpSpPr>
+        <p:cNvPr id="1" name=""/>
+        <p:cNvGrpSpPr/>
+        <p:nvPr/>
+      </p:nvGrpSpPr>
+      <p:grpSpPr>
+        <a:xfrm>
+          <a:off x="0" y="0"/>
+          <a:ext cx="0" cy="0"/>
+          <a:chOff x="0" y="0"/>
+          <a:chExt cx="0" cy="0"/>
+        </a:xfrm>
+      </p:grpSpPr>
+      <p:sp>
+        <p:nvSpPr>
+          <p:cNvPr id="2" name="Title 1">
+            <a:extLst>
+              <a:ext uri="{FF2B5EF4-FFF2-40B4-BE49-F238E27FC236}">
+                <a16:creationId xmlns:a16="http://schemas.microsoft.com/office/drawing/2014/main" id="{90EAD578-3000-4ECC-8955-4586A64A81B9}"/>
+              </a:ext>
+            </a:extLst>
+          </p:cNvPr>
+          <p:cNvSpPr>
+            <a:spLocks noGrp="1"/>
+          </p:cNvSpPr>
+          <p:nvPr>
+            <p:ph type="title"/>
+          </p:nvPr>
+        </p:nvSpPr>
+        <p:spPr/>
+        <p:txBody>
+          <a:bodyPr/>
+          <a:lstStyle/>
+          <a:p>
+            <a:r>
+              <a:rPr lang="en-US" dirty="0"/>
+              <a:t>Viewport, Viewing Position, Z-Axis</a:t>
+            </a:r>
+          </a:p>
+        </p:txBody>
+      </p:sp>
+      <p:sp>
+        <p:nvSpPr>
+          <p:cNvPr id="4" name="Date Placeholder 3">
+            <a:extLst>
+              <a:ext uri="{FF2B5EF4-FFF2-40B4-BE49-F238E27FC236}">
+                <a16:creationId xmlns:a16="http://schemas.microsoft.com/office/drawing/2014/main" id="{2787BEE0-6464-4517-8DFF-11DC1B991D1F}"/>
+              </a:ext>
+            </a:extLst>
+          </p:cNvPr>
+          <p:cNvSpPr>
+            <a:spLocks noGrp="1"/>
+          </p:cNvSpPr>
+          <p:nvPr>
+            <p:ph type="dt" sz="half" idx="10"/>
+          </p:nvPr>
+        </p:nvSpPr>
+        <p:spPr>
+          <a:xfrm>
+            <a:off x="794559" y="6367884"/>
+            <a:ext cx="2743200" cy="365125"/>
+          </a:xfrm>
+        </p:spPr>
+        <p:txBody>
+          <a:bodyPr/>
+          <a:lstStyle/>
+          <a:p>
+            <a:fld id="{82BCD581-7540-41CB-8BBB-BEC98AE789ED}" type="datetime1">
+              <a:rPr lang="en-US" smtClean="0"/>
+              <a:t>2/24/2021</a:t>
+            </a:fld>
+            <a:endParaRPr lang="en-US" dirty="0"/>
+          </a:p>
+        </p:txBody>
+      </p:sp>
+      <p:sp>
+        <p:nvSpPr>
+          <p:cNvPr id="5" name="Footer Placeholder 4">
+            <a:extLst>
+              <a:ext uri="{FF2B5EF4-FFF2-40B4-BE49-F238E27FC236}">
+                <a16:creationId xmlns:a16="http://schemas.microsoft.com/office/drawing/2014/main" id="{7270B72A-09EF-4DFB-A21A-DEB33EA22253}"/>
+              </a:ext>
+            </a:extLst>
+          </p:cNvPr>
+          <p:cNvSpPr>
+            <a:spLocks noGrp="1"/>
+          </p:cNvSpPr>
+          <p:nvPr>
+            <p:ph type="ftr" sz="quarter" idx="11"/>
+          </p:nvPr>
+        </p:nvSpPr>
+        <p:spPr/>
+        <p:txBody>
+          <a:bodyPr/>
+          <a:lstStyle/>
+          <a:p>
+            <a:r>
+              <a:rPr lang="en-US" dirty="0"/>
+              <a:t>Gambetta, Gabriel. 2021, Computer Graphics from Scratch</a:t>
+            </a:r>
+          </a:p>
+        </p:txBody>
+      </p:sp>
+      <p:sp>
+        <p:nvSpPr>
+          <p:cNvPr id="6" name="Content Placeholder 5">
+            <a:extLst>
+              <a:ext uri="{FF2B5EF4-FFF2-40B4-BE49-F238E27FC236}">
+                <a16:creationId xmlns:a16="http://schemas.microsoft.com/office/drawing/2014/main" id="{97BF2EFA-6295-494D-86C6-45A87ABF0AA7}"/>
+              </a:ext>
+            </a:extLst>
+          </p:cNvPr>
+          <p:cNvSpPr>
+            <a:spLocks noGrp="1"/>
+          </p:cNvSpPr>
+          <p:nvPr>
+            <p:ph idx="1"/>
+          </p:nvPr>
+        </p:nvSpPr>
+        <p:spPr>
+          <a:xfrm>
+            <a:off x="838200" y="1720527"/>
+            <a:ext cx="10464282" cy="3539510"/>
+          </a:xfrm>
+        </p:spPr>
+        <p:txBody>
+          <a:bodyPr>
+            <a:normAutofit lnSpcReduction="10000"/>
+          </a:bodyPr>
+          <a:lstStyle/>
+          <a:p>
+            <a:pPr marL="0" indent="0">
+              <a:buNone/>
+            </a:pPr>
+            <a:r>
+              <a:rPr lang="en-US" dirty="0"/>
+              <a:t>To create something basic let’s fix some variables:</a:t>
+            </a:r>
+          </a:p>
+          <a:p>
+            <a:pPr marL="514350" indent="-514350">
+              <a:buFont typeface="+mj-lt"/>
+              <a:buAutoNum type="arabicPeriod"/>
+            </a:pPr>
+            <a:r>
+              <a:rPr lang="en-US" sz="2400" dirty="0">
+                <a:latin typeface="+mj-lt"/>
+              </a:rPr>
+              <a:t>We will need to assume a fixed viewport (</a:t>
+            </a:r>
+            <a:r>
+              <a:rPr lang="en-US" sz="2400" dirty="0" err="1">
+                <a:latin typeface="+mj-lt"/>
+              </a:rPr>
+              <a:t>vw</a:t>
+            </a:r>
+            <a:r>
+              <a:rPr lang="en-US" sz="2400" dirty="0">
+                <a:latin typeface="+mj-lt"/>
+              </a:rPr>
+              <a:t>, </a:t>
+            </a:r>
+            <a:r>
+              <a:rPr lang="en-US" sz="2400" dirty="0" err="1">
+                <a:latin typeface="+mj-lt"/>
+              </a:rPr>
+              <a:t>vh</a:t>
+            </a:r>
+            <a:r>
+              <a:rPr lang="en-US" sz="2400" dirty="0">
+                <a:latin typeface="+mj-lt"/>
+              </a:rPr>
+              <a:t>)</a:t>
+            </a:r>
+          </a:p>
+          <a:p>
+            <a:pPr lvl="1">
+              <a:buFontTx/>
+              <a:buChar char="-"/>
+            </a:pPr>
+            <a:r>
+              <a:rPr lang="en-US" sz="2000" dirty="0">
+                <a:latin typeface="+mj-lt"/>
+              </a:rPr>
+              <a:t>The size of the viewport and the distance to the camera position are the FOV</a:t>
+            </a:r>
+          </a:p>
+          <a:p>
+            <a:pPr lvl="1">
+              <a:buFontTx/>
+              <a:buChar char="-"/>
+            </a:pPr>
+            <a:r>
+              <a:rPr lang="en-US" sz="2000" dirty="0">
+                <a:latin typeface="+mj-lt"/>
+              </a:rPr>
+              <a:t>Humans have approximately 180 degrees</a:t>
+            </a:r>
+          </a:p>
+          <a:p>
+            <a:pPr marL="514350" indent="-514350">
+              <a:buFont typeface="+mj-lt"/>
+              <a:buAutoNum type="arabicPeriod"/>
+            </a:pPr>
+            <a:r>
+              <a:rPr lang="en-US" sz="2400" dirty="0">
+                <a:latin typeface="+mj-lt"/>
+              </a:rPr>
+              <a:t>A fixed distance (d) to the point of origin on our </a:t>
+            </a:r>
+            <a:r>
+              <a:rPr lang="en-US" sz="2400" dirty="0" err="1">
+                <a:latin typeface="+mj-lt"/>
+              </a:rPr>
+              <a:t>x,y,z</a:t>
+            </a:r>
+            <a:r>
+              <a:rPr lang="en-US" sz="2400" dirty="0">
+                <a:latin typeface="+mj-lt"/>
+              </a:rPr>
+              <a:t> plane</a:t>
+            </a:r>
+          </a:p>
+          <a:p>
+            <a:pPr marL="514350" indent="-514350">
+              <a:buFont typeface="+mj-lt"/>
+              <a:buAutoNum type="arabicPeriod"/>
+            </a:pPr>
+            <a:r>
+              <a:rPr lang="en-US" sz="2400" b="0" i="0" dirty="0">
+                <a:solidFill>
+                  <a:srgbClr val="212529"/>
+                </a:solidFill>
+                <a:effectLst/>
+                <a:latin typeface="+mj-lt"/>
+              </a:rPr>
+              <a:t>The camera position and orientation</a:t>
+            </a:r>
+            <a:br>
+              <a:rPr lang="en-US" sz="2400" b="0" i="0" dirty="0">
+                <a:solidFill>
+                  <a:srgbClr val="212529"/>
+                </a:solidFill>
+                <a:effectLst/>
+                <a:latin typeface="+mj-lt"/>
+              </a:rPr>
+            </a:br>
+            <a:r>
+              <a:rPr lang="en-US" sz="2400" b="0" i="0" dirty="0">
+                <a:solidFill>
+                  <a:srgbClr val="212529"/>
+                </a:solidFill>
+                <a:effectLst/>
+                <a:latin typeface="+mj-lt"/>
+              </a:rPr>
+              <a:t>- perpendicular to the Z axis.</a:t>
+            </a:r>
+          </a:p>
+          <a:p>
+            <a:pPr marL="0" indent="0">
+              <a:buNone/>
+            </a:pPr>
+            <a:endParaRPr lang="en-US" sz="2400" dirty="0">
+              <a:solidFill>
+                <a:srgbClr val="212529"/>
+              </a:solidFill>
+              <a:latin typeface="+mj-lt"/>
+            </a:endParaRPr>
+          </a:p>
+          <a:p>
+            <a:pPr marL="0" indent="0">
+              <a:buNone/>
+            </a:pPr>
+            <a:r>
+              <a:rPr lang="en-US" sz="2400" dirty="0">
+                <a:solidFill>
+                  <a:srgbClr val="212529"/>
+                </a:solidFill>
+                <a:latin typeface="+mj-lt"/>
+              </a:rPr>
+              <a:t>We will use:  </a:t>
+            </a:r>
+            <a:r>
+              <a:rPr lang="en-US" sz="2400" b="1" i="1" dirty="0" err="1">
+                <a:solidFill>
+                  <a:srgbClr val="212529"/>
+                </a:solidFill>
+                <a:latin typeface="+mj-lt"/>
+              </a:rPr>
+              <a:t>vw</a:t>
+            </a:r>
+            <a:r>
+              <a:rPr lang="en-US" sz="2400" b="1" i="1" dirty="0">
+                <a:solidFill>
+                  <a:srgbClr val="212529"/>
+                </a:solidFill>
+                <a:latin typeface="+mj-lt"/>
+              </a:rPr>
+              <a:t> = </a:t>
+            </a:r>
+            <a:r>
+              <a:rPr lang="en-US" sz="2400" b="1" i="1" dirty="0" err="1">
+                <a:solidFill>
+                  <a:srgbClr val="212529"/>
+                </a:solidFill>
+                <a:latin typeface="+mj-lt"/>
+              </a:rPr>
+              <a:t>vh</a:t>
+            </a:r>
+            <a:r>
+              <a:rPr lang="en-US" sz="2400" b="1" i="1" dirty="0">
+                <a:solidFill>
+                  <a:srgbClr val="212529"/>
+                </a:solidFill>
+                <a:latin typeface="+mj-lt"/>
+              </a:rPr>
+              <a:t> = d = 1, FOV = 53 degrees</a:t>
+            </a:r>
+          </a:p>
+        </p:txBody>
+      </p:sp>
+      <p:pic>
+        <p:nvPicPr>
+          <p:cNvPr id="1028" name="Picture 4" descr="Figure 2-4: The position and orientation of the viewport">
+            <a:extLst>
+              <a:ext uri="{FF2B5EF4-FFF2-40B4-BE49-F238E27FC236}">
+                <a16:creationId xmlns:a16="http://schemas.microsoft.com/office/drawing/2014/main" id="{B4963C8A-28B2-426C-A5AB-7FB0292BC22B}"/>
+              </a:ext>
+            </a:extLst>
+          </p:cNvPr>
+          <p:cNvPicPr>
+            <a:picLocks noChangeAspect="1" noChangeArrowheads="1"/>
+          </p:cNvPicPr>
+          <p:nvPr/>
+        </p:nvPicPr>
+        <p:blipFill>
+          <a:blip r:embed="rId2">
+            <a:extLst>
+              <a:ext uri="{28A0092B-C50C-407E-A947-70E740481C1C}">
+                <a14:useLocalDpi xmlns:a14="http://schemas.microsoft.com/office/drawing/2010/main" val="0"/>
+              </a:ext>
+            </a:extLst>
+          </a:blip>
+          <a:srcRect/>
+          <a:stretch>
+            <a:fillRect/>
+          </a:stretch>
+        </p:blipFill>
+        <p:spPr bwMode="auto">
+          <a:xfrm>
+            <a:off x="8654241" y="3825974"/>
+            <a:ext cx="2699559" cy="2530376"/>
+          </a:xfrm>
+          <a:prstGeom prst="rect">
+            <a:avLst/>
+          </a:prstGeom>
+          <a:noFill/>
+          <a:extLst>
+            <a:ext uri="{909E8E84-426E-40DD-AFC4-6F175D3DCCD1}">
+              <a14:hiddenFill xmlns:a14="http://schemas.microsoft.com/office/drawing/2010/main">
+                <a:solidFill>
+                  <a:srgbClr val="FFFFFF"/>
+                </a:solidFill>
+              </a14:hiddenFill>
+            </a:ext>
+          </a:extLst>
+        </p:spPr>
+      </p:pic>
+    </p:spTree>
+    <p:extLst>
+      <p:ext uri="{BB962C8B-B14F-4D97-AF65-F5344CB8AC3E}">
+        <p14:creationId xmlns:p14="http://schemas.microsoft.com/office/powerpoint/2010/main" val="2414811693"/>
       </p:ext>
     </p:extLst>
   </p:cSld>

</xml_diff>

<commit_message>
changed div to canvas
</commit_message>
<xml_diff>
--- a/computer-graphics-js-1.pptx
+++ b/computer-graphics-js-1.pptx
@@ -5,7 +5,7 @@
     <p:sldMasterId id="2147483648" r:id="rId1"/>
   </p:sldMasterIdLst>
   <p:notesMasterIdLst>
-    <p:notesMasterId r:id="rId8"/>
+    <p:notesMasterId r:id="rId14"/>
   </p:notesMasterIdLst>
   <p:sldIdLst>
     <p:sldId id="256" r:id="rId2"/>
@@ -14,6 +14,12 @@
     <p:sldId id="259" r:id="rId5"/>
     <p:sldId id="260" r:id="rId6"/>
     <p:sldId id="261" r:id="rId7"/>
+    <p:sldId id="262" r:id="rId8"/>
+    <p:sldId id="263" r:id="rId9"/>
+    <p:sldId id="264" r:id="rId10"/>
+    <p:sldId id="265" r:id="rId11"/>
+    <p:sldId id="266" r:id="rId12"/>
+    <p:sldId id="267" r:id="rId13"/>
   </p:sldIdLst>
   <p:sldSz cx="12192000" cy="6858000"/>
   <p:notesSz cx="6858000" cy="9144000"/>
@@ -202,7 +208,7 @@
           <a:p>
             <a:fld id="{1C68982D-E66A-4CC9-8D60-F3452BA7A398}" type="datetimeFigureOut">
               <a:rPr lang="en-US" smtClean="0"/>
-              <a:t>2/24/2021</a:t>
+              <a:t>3/17/2021</a:t>
             </a:fld>
             <a:endParaRPr lang="en-US"/>
           </a:p>
@@ -469,6 +475,258 @@
 </p:notesMaster>
 </file>
 
+<file path=ppt/notesSlides/notesSlide1.xml><?xml version="1.0" encoding="utf-8"?>
+<p:notes xmlns:a="http://schemas.openxmlformats.org/drawingml/2006/main" xmlns:r="http://schemas.openxmlformats.org/officeDocument/2006/relationships" xmlns:p="http://schemas.openxmlformats.org/presentationml/2006/main">
+  <p:cSld>
+    <p:spTree>
+      <p:nvGrpSpPr>
+        <p:cNvPr id="1" name=""/>
+        <p:cNvGrpSpPr/>
+        <p:nvPr/>
+      </p:nvGrpSpPr>
+      <p:grpSpPr>
+        <a:xfrm>
+          <a:off x="0" y="0"/>
+          <a:ext cx="0" cy="0"/>
+          <a:chOff x="0" y="0"/>
+          <a:chExt cx="0" cy="0"/>
+        </a:xfrm>
+      </p:grpSpPr>
+      <p:sp>
+        <p:nvSpPr>
+          <p:cNvPr id="2" name="Slide Image Placeholder 1"/>
+          <p:cNvSpPr>
+            <a:spLocks noGrp="1" noRot="1" noChangeAspect="1"/>
+          </p:cNvSpPr>
+          <p:nvPr>
+            <p:ph type="sldImg"/>
+          </p:nvPr>
+        </p:nvSpPr>
+        <p:spPr/>
+      </p:sp>
+      <p:sp>
+        <p:nvSpPr>
+          <p:cNvPr id="3" name="Notes Placeholder 2"/>
+          <p:cNvSpPr>
+            <a:spLocks noGrp="1"/>
+          </p:cNvSpPr>
+          <p:nvPr>
+            <p:ph type="body" idx="1"/>
+          </p:nvPr>
+        </p:nvSpPr>
+        <p:spPr/>
+        <p:txBody>
+          <a:bodyPr/>
+          <a:lstStyle/>
+          <a:p>
+            <a:endParaRPr lang="en-US" dirty="0"/>
+          </a:p>
+        </p:txBody>
+      </p:sp>
+      <p:sp>
+        <p:nvSpPr>
+          <p:cNvPr id="4" name="Slide Number Placeholder 3"/>
+          <p:cNvSpPr>
+            <a:spLocks noGrp="1"/>
+          </p:cNvSpPr>
+          <p:nvPr>
+            <p:ph type="sldNum" sz="quarter" idx="5"/>
+          </p:nvPr>
+        </p:nvSpPr>
+        <p:spPr/>
+        <p:txBody>
+          <a:bodyPr/>
+          <a:lstStyle/>
+          <a:p>
+            <a:fld id="{68D67263-86F8-4041-922D-D14F3EA6CAA4}" type="slidenum">
+              <a:rPr lang="en-US" smtClean="0"/>
+              <a:t>10</a:t>
+            </a:fld>
+            <a:endParaRPr lang="en-US"/>
+          </a:p>
+        </p:txBody>
+      </p:sp>
+    </p:spTree>
+    <p:extLst>
+      <p:ext uri="{BB962C8B-B14F-4D97-AF65-F5344CB8AC3E}">
+        <p14:creationId xmlns:p14="http://schemas.microsoft.com/office/powerpoint/2010/main" val="4106550192"/>
+      </p:ext>
+    </p:extLst>
+  </p:cSld>
+  <p:clrMapOvr>
+    <a:masterClrMapping/>
+  </p:clrMapOvr>
+</p:notes>
+</file>
+
+<file path=ppt/notesSlides/notesSlide2.xml><?xml version="1.0" encoding="utf-8"?>
+<p:notes xmlns:a="http://schemas.openxmlformats.org/drawingml/2006/main" xmlns:r="http://schemas.openxmlformats.org/officeDocument/2006/relationships" xmlns:p="http://schemas.openxmlformats.org/presentationml/2006/main">
+  <p:cSld>
+    <p:spTree>
+      <p:nvGrpSpPr>
+        <p:cNvPr id="1" name=""/>
+        <p:cNvGrpSpPr/>
+        <p:nvPr/>
+      </p:nvGrpSpPr>
+      <p:grpSpPr>
+        <a:xfrm>
+          <a:off x="0" y="0"/>
+          <a:ext cx="0" cy="0"/>
+          <a:chOff x="0" y="0"/>
+          <a:chExt cx="0" cy="0"/>
+        </a:xfrm>
+      </p:grpSpPr>
+      <p:sp>
+        <p:nvSpPr>
+          <p:cNvPr id="2" name="Slide Image Placeholder 1"/>
+          <p:cNvSpPr>
+            <a:spLocks noGrp="1" noRot="1" noChangeAspect="1"/>
+          </p:cNvSpPr>
+          <p:nvPr>
+            <p:ph type="sldImg"/>
+          </p:nvPr>
+        </p:nvSpPr>
+        <p:spPr/>
+      </p:sp>
+      <p:sp>
+        <p:nvSpPr>
+          <p:cNvPr id="3" name="Notes Placeholder 2"/>
+          <p:cNvSpPr>
+            <a:spLocks noGrp="1"/>
+          </p:cNvSpPr>
+          <p:nvPr>
+            <p:ph type="body" idx="1"/>
+          </p:nvPr>
+        </p:nvSpPr>
+        <p:spPr/>
+        <p:txBody>
+          <a:bodyPr/>
+          <a:lstStyle/>
+          <a:p>
+            <a:endParaRPr lang="en-US" dirty="0"/>
+          </a:p>
+        </p:txBody>
+      </p:sp>
+      <p:sp>
+        <p:nvSpPr>
+          <p:cNvPr id="4" name="Slide Number Placeholder 3"/>
+          <p:cNvSpPr>
+            <a:spLocks noGrp="1"/>
+          </p:cNvSpPr>
+          <p:nvPr>
+            <p:ph type="sldNum" sz="quarter" idx="5"/>
+          </p:nvPr>
+        </p:nvSpPr>
+        <p:spPr/>
+        <p:txBody>
+          <a:bodyPr/>
+          <a:lstStyle/>
+          <a:p>
+            <a:fld id="{68D67263-86F8-4041-922D-D14F3EA6CAA4}" type="slidenum">
+              <a:rPr lang="en-US" smtClean="0"/>
+              <a:t>11</a:t>
+            </a:fld>
+            <a:endParaRPr lang="en-US"/>
+          </a:p>
+        </p:txBody>
+      </p:sp>
+    </p:spTree>
+    <p:extLst>
+      <p:ext uri="{BB962C8B-B14F-4D97-AF65-F5344CB8AC3E}">
+        <p14:creationId xmlns:p14="http://schemas.microsoft.com/office/powerpoint/2010/main" val="4264932496"/>
+      </p:ext>
+    </p:extLst>
+  </p:cSld>
+  <p:clrMapOvr>
+    <a:masterClrMapping/>
+  </p:clrMapOvr>
+</p:notes>
+</file>
+
+<file path=ppt/notesSlides/notesSlide3.xml><?xml version="1.0" encoding="utf-8"?>
+<p:notes xmlns:a="http://schemas.openxmlformats.org/drawingml/2006/main" xmlns:r="http://schemas.openxmlformats.org/officeDocument/2006/relationships" xmlns:p="http://schemas.openxmlformats.org/presentationml/2006/main">
+  <p:cSld>
+    <p:spTree>
+      <p:nvGrpSpPr>
+        <p:cNvPr id="1" name=""/>
+        <p:cNvGrpSpPr/>
+        <p:nvPr/>
+      </p:nvGrpSpPr>
+      <p:grpSpPr>
+        <a:xfrm>
+          <a:off x="0" y="0"/>
+          <a:ext cx="0" cy="0"/>
+          <a:chOff x="0" y="0"/>
+          <a:chExt cx="0" cy="0"/>
+        </a:xfrm>
+      </p:grpSpPr>
+      <p:sp>
+        <p:nvSpPr>
+          <p:cNvPr id="2" name="Slide Image Placeholder 1"/>
+          <p:cNvSpPr>
+            <a:spLocks noGrp="1" noRot="1" noChangeAspect="1"/>
+          </p:cNvSpPr>
+          <p:nvPr>
+            <p:ph type="sldImg"/>
+          </p:nvPr>
+        </p:nvSpPr>
+        <p:spPr/>
+      </p:sp>
+      <p:sp>
+        <p:nvSpPr>
+          <p:cNvPr id="3" name="Notes Placeholder 2"/>
+          <p:cNvSpPr>
+            <a:spLocks noGrp="1"/>
+          </p:cNvSpPr>
+          <p:nvPr>
+            <p:ph type="body" idx="1"/>
+          </p:nvPr>
+        </p:nvSpPr>
+        <p:spPr/>
+        <p:txBody>
+          <a:bodyPr/>
+          <a:lstStyle/>
+          <a:p>
+            <a:endParaRPr lang="en-US" dirty="0"/>
+          </a:p>
+        </p:txBody>
+      </p:sp>
+      <p:sp>
+        <p:nvSpPr>
+          <p:cNvPr id="4" name="Slide Number Placeholder 3"/>
+          <p:cNvSpPr>
+            <a:spLocks noGrp="1"/>
+          </p:cNvSpPr>
+          <p:nvPr>
+            <p:ph type="sldNum" sz="quarter" idx="5"/>
+          </p:nvPr>
+        </p:nvSpPr>
+        <p:spPr/>
+        <p:txBody>
+          <a:bodyPr/>
+          <a:lstStyle/>
+          <a:p>
+            <a:fld id="{68D67263-86F8-4041-922D-D14F3EA6CAA4}" type="slidenum">
+              <a:rPr lang="en-US" smtClean="0"/>
+              <a:t>12</a:t>
+            </a:fld>
+            <a:endParaRPr lang="en-US"/>
+          </a:p>
+        </p:txBody>
+      </p:sp>
+    </p:spTree>
+    <p:extLst>
+      <p:ext uri="{BB962C8B-B14F-4D97-AF65-F5344CB8AC3E}">
+        <p14:creationId xmlns:p14="http://schemas.microsoft.com/office/powerpoint/2010/main" val="2424738408"/>
+      </p:ext>
+    </p:extLst>
+  </p:cSld>
+  <p:clrMapOvr>
+    <a:masterClrMapping/>
+  </p:clrMapOvr>
+</p:notes>
+</file>
+
 <file path=ppt/slideLayouts/slideLayout1.xml><?xml version="1.0" encoding="utf-8"?>
 <p:sldLayout xmlns:a="http://schemas.openxmlformats.org/drawingml/2006/main" xmlns:r="http://schemas.openxmlformats.org/officeDocument/2006/relationships" xmlns:p="http://schemas.openxmlformats.org/presentationml/2006/main" type="title" preserve="1">
   <p:cSld name="Title Slide">
@@ -616,7 +874,7 @@
           <a:p>
             <a:fld id="{8FA5496C-C728-456A-977F-D9196E097204}" type="datetime1">
               <a:rPr lang="en-US" smtClean="0"/>
-              <a:t>2/24/2021</a:t>
+              <a:t>3/17/2021</a:t>
             </a:fld>
             <a:endParaRPr lang="en-US"/>
           </a:p>
@@ -817,7 +1075,7 @@
           <a:p>
             <a:fld id="{334FE89A-4755-42FC-8111-20439C1F0FC8}" type="datetime1">
               <a:rPr lang="en-US" smtClean="0"/>
-              <a:t>2/24/2021</a:t>
+              <a:t>3/17/2021</a:t>
             </a:fld>
             <a:endParaRPr lang="en-US"/>
           </a:p>
@@ -1028,7 +1286,7 @@
           <a:p>
             <a:fld id="{5C5E400F-89D0-46D1-9B46-371CDED5800F}" type="datetime1">
               <a:rPr lang="en-US" smtClean="0"/>
-              <a:t>2/24/2021</a:t>
+              <a:t>3/17/2021</a:t>
             </a:fld>
             <a:endParaRPr lang="en-US"/>
           </a:p>
@@ -1229,7 +1487,7 @@
           <a:p>
             <a:fld id="{82BCD581-7540-41CB-8BBB-BEC98AE789ED}" type="datetime1">
               <a:rPr lang="en-US" smtClean="0"/>
-              <a:t>2/24/2021</a:t>
+              <a:t>3/17/2021</a:t>
             </a:fld>
             <a:endParaRPr lang="en-US"/>
           </a:p>
@@ -1507,7 +1765,7 @@
           <a:p>
             <a:fld id="{FE716A51-E2A8-46FD-9E85-91012295338D}" type="datetime1">
               <a:rPr lang="en-US" smtClean="0"/>
-              <a:t>2/24/2021</a:t>
+              <a:t>3/17/2021</a:t>
             </a:fld>
             <a:endParaRPr lang="en-US"/>
           </a:p>
@@ -1775,7 +2033,7 @@
           <a:p>
             <a:fld id="{725D7A7C-FF76-48E2-AFCE-76270FDC0A73}" type="datetime1">
               <a:rPr lang="en-US" smtClean="0"/>
-              <a:t>2/24/2021</a:t>
+              <a:t>3/17/2021</a:t>
             </a:fld>
             <a:endParaRPr lang="en-US"/>
           </a:p>
@@ -2190,7 +2448,7 @@
           <a:p>
             <a:fld id="{8CBA4743-8874-4114-AF63-FA0AC80D7895}" type="datetime1">
               <a:rPr lang="en-US" smtClean="0"/>
-              <a:t>2/24/2021</a:t>
+              <a:t>3/17/2021</a:t>
             </a:fld>
             <a:endParaRPr lang="en-US"/>
           </a:p>
@@ -2334,7 +2592,7 @@
           <a:p>
             <a:fld id="{9064E9D3-DC0A-4ABC-9213-50B3983CCD13}" type="datetime1">
               <a:rPr lang="en-US" smtClean="0"/>
-              <a:t>2/24/2021</a:t>
+              <a:t>3/17/2021</a:t>
             </a:fld>
             <a:endParaRPr lang="en-US"/>
           </a:p>
@@ -2450,7 +2708,7 @@
           <a:p>
             <a:fld id="{332F517D-9C77-4CA9-A25F-12287C96135E}" type="datetime1">
               <a:rPr lang="en-US" smtClean="0"/>
-              <a:t>2/24/2021</a:t>
+              <a:t>3/17/2021</a:t>
             </a:fld>
             <a:endParaRPr lang="en-US"/>
           </a:p>
@@ -2764,7 +3022,7 @@
           <a:p>
             <a:fld id="{E5B3C226-B550-4C7D-A05F-07AA9FF43E24}" type="datetime1">
               <a:rPr lang="en-US" smtClean="0"/>
-              <a:t>2/24/2021</a:t>
+              <a:t>3/17/2021</a:t>
             </a:fld>
             <a:endParaRPr lang="en-US"/>
           </a:p>
@@ -3055,7 +3313,7 @@
           <a:p>
             <a:fld id="{46EE6C59-4282-4A86-BEDA-6EBC9A482A2D}" type="datetime1">
               <a:rPr lang="en-US" smtClean="0"/>
-              <a:t>2/24/2021</a:t>
+              <a:t>3/17/2021</a:t>
             </a:fld>
             <a:endParaRPr lang="en-US"/>
           </a:p>
@@ -3299,7 +3557,7 @@
           <a:p>
             <a:fld id="{A7700EF3-3C29-4744-8EE4-CE5D48A4A04B}" type="datetime1">
               <a:rPr lang="en-US" smtClean="0"/>
-              <a:t>2/24/2021</a:t>
+              <a:t>3/17/2021</a:t>
             </a:fld>
             <a:endParaRPr lang="en-US"/>
           </a:p>
@@ -4066,7 +4324,7 @@
                   <a:spcPts val="600"/>
                 </a:spcAft>
               </a:pPr>
-              <a:t>2/24/2021</a:t>
+              <a:t>3/17/2021</a:t>
             </a:fld>
             <a:endParaRPr lang="en-US" sz="1100">
               <a:solidFill>
@@ -4133,6 +4391,1448 @@
   </p:cSld>
   <p:clrMapOvr>
     <a:overrideClrMapping bg1="dk1" tx1="lt1" bg2="dk2" tx2="lt2" accent1="accent1" accent2="accent2" accent3="accent3" accent4="accent4" accent5="accent5" accent6="accent6" hlink="hlink" folHlink="folHlink"/>
+  </p:clrMapOvr>
+</p:sld>
+</file>
+
+<file path=ppt/slides/slide10.xml><?xml version="1.0" encoding="utf-8"?>
+<p:sld xmlns:a="http://schemas.openxmlformats.org/drawingml/2006/main" xmlns:r="http://schemas.openxmlformats.org/officeDocument/2006/relationships" xmlns:p="http://schemas.openxmlformats.org/presentationml/2006/main">
+  <p:cSld>
+    <p:spTree>
+      <p:nvGrpSpPr>
+        <p:cNvPr id="1" name=""/>
+        <p:cNvGrpSpPr/>
+        <p:nvPr/>
+      </p:nvGrpSpPr>
+      <p:grpSpPr>
+        <a:xfrm>
+          <a:off x="0" y="0"/>
+          <a:ext cx="0" cy="0"/>
+          <a:chOff x="0" y="0"/>
+          <a:chExt cx="0" cy="0"/>
+        </a:xfrm>
+      </p:grpSpPr>
+      <p:sp>
+        <p:nvSpPr>
+          <p:cNvPr id="2" name="Title 1">
+            <a:extLst>
+              <a:ext uri="{FF2B5EF4-FFF2-40B4-BE49-F238E27FC236}">
+                <a16:creationId xmlns:a16="http://schemas.microsoft.com/office/drawing/2014/main" id="{90EAD578-3000-4ECC-8955-4586A64A81B9}"/>
+              </a:ext>
+            </a:extLst>
+          </p:cNvPr>
+          <p:cNvSpPr>
+            <a:spLocks noGrp="1"/>
+          </p:cNvSpPr>
+          <p:nvPr>
+            <p:ph type="title"/>
+          </p:nvPr>
+        </p:nvSpPr>
+        <p:spPr/>
+        <p:txBody>
+          <a:bodyPr/>
+          <a:lstStyle/>
+          <a:p>
+            <a:r>
+              <a:rPr lang="en-US" dirty="0"/>
+              <a:t>The Sphere Equation</a:t>
+            </a:r>
+          </a:p>
+        </p:txBody>
+      </p:sp>
+      <p:sp>
+        <p:nvSpPr>
+          <p:cNvPr id="4" name="Date Placeholder 3">
+            <a:extLst>
+              <a:ext uri="{FF2B5EF4-FFF2-40B4-BE49-F238E27FC236}">
+                <a16:creationId xmlns:a16="http://schemas.microsoft.com/office/drawing/2014/main" id="{2787BEE0-6464-4517-8DFF-11DC1B991D1F}"/>
+              </a:ext>
+            </a:extLst>
+          </p:cNvPr>
+          <p:cNvSpPr>
+            <a:spLocks noGrp="1"/>
+          </p:cNvSpPr>
+          <p:nvPr>
+            <p:ph type="dt" sz="half" idx="10"/>
+          </p:nvPr>
+        </p:nvSpPr>
+        <p:spPr>
+          <a:xfrm>
+            <a:off x="794559" y="6367884"/>
+            <a:ext cx="2743200" cy="365125"/>
+          </a:xfrm>
+        </p:spPr>
+        <p:txBody>
+          <a:bodyPr/>
+          <a:lstStyle/>
+          <a:p>
+            <a:fld id="{82BCD581-7540-41CB-8BBB-BEC98AE789ED}" type="datetime1">
+              <a:rPr lang="en-US" smtClean="0"/>
+              <a:t>3/17/2021</a:t>
+            </a:fld>
+            <a:endParaRPr lang="en-US" dirty="0"/>
+          </a:p>
+        </p:txBody>
+      </p:sp>
+      <p:sp>
+        <p:nvSpPr>
+          <p:cNvPr id="5" name="Footer Placeholder 4">
+            <a:extLst>
+              <a:ext uri="{FF2B5EF4-FFF2-40B4-BE49-F238E27FC236}">
+                <a16:creationId xmlns:a16="http://schemas.microsoft.com/office/drawing/2014/main" id="{7270B72A-09EF-4DFB-A21A-DEB33EA22253}"/>
+              </a:ext>
+            </a:extLst>
+          </p:cNvPr>
+          <p:cNvSpPr>
+            <a:spLocks noGrp="1"/>
+          </p:cNvSpPr>
+          <p:nvPr>
+            <p:ph type="ftr" sz="quarter" idx="11"/>
+          </p:nvPr>
+        </p:nvSpPr>
+        <p:spPr/>
+        <p:txBody>
+          <a:bodyPr/>
+          <a:lstStyle/>
+          <a:p>
+            <a:r>
+              <a:rPr lang="en-US" dirty="0"/>
+              <a:t>Gambetta, Gabriel. 2021, Computer Graphics from Scratch</a:t>
+            </a:r>
+          </a:p>
+        </p:txBody>
+      </p:sp>
+      <p:sp>
+        <p:nvSpPr>
+          <p:cNvPr id="6" name="Content Placeholder 5">
+            <a:extLst>
+              <a:ext uri="{FF2B5EF4-FFF2-40B4-BE49-F238E27FC236}">
+                <a16:creationId xmlns:a16="http://schemas.microsoft.com/office/drawing/2014/main" id="{97BF2EFA-6295-494D-86C6-45A87ABF0AA7}"/>
+              </a:ext>
+            </a:extLst>
+          </p:cNvPr>
+          <p:cNvSpPr>
+            <a:spLocks noGrp="1"/>
+          </p:cNvSpPr>
+          <p:nvPr>
+            <p:ph idx="1"/>
+          </p:nvPr>
+        </p:nvSpPr>
+        <p:spPr>
+          <a:xfrm>
+            <a:off x="838200" y="1690688"/>
+            <a:ext cx="10464282" cy="3539510"/>
+          </a:xfrm>
+        </p:spPr>
+        <p:txBody>
+          <a:bodyPr>
+            <a:normAutofit lnSpcReduction="10000"/>
+          </a:bodyPr>
+          <a:lstStyle/>
+          <a:p>
+            <a:pPr marL="0" indent="0">
+              <a:buNone/>
+            </a:pPr>
+            <a:r>
+              <a:rPr lang="en-US" sz="2000" b="1" dirty="0">
+                <a:latin typeface="+mj-lt"/>
+              </a:rPr>
+              <a:t>We need our “Ray” to hit something! Let’s make them hit spheres:</a:t>
+            </a:r>
+          </a:p>
+          <a:p>
+            <a:pPr marL="457200" indent="-457200">
+              <a:buFont typeface="+mj-lt"/>
+              <a:buAutoNum type="arabicPeriod"/>
+            </a:pPr>
+            <a:r>
+              <a:rPr lang="en-US" sz="2000" dirty="0">
+                <a:latin typeface="+mj-lt"/>
+              </a:rPr>
+              <a:t>Note the Radius (r) and center point (C), and any point on the surface (P) of the sphere below:</a:t>
+            </a:r>
+          </a:p>
+          <a:p>
+            <a:pPr marL="457200" indent="-457200">
+              <a:buFont typeface="+mj-lt"/>
+              <a:buAutoNum type="arabicPeriod"/>
+            </a:pPr>
+            <a:endParaRPr lang="en-US" sz="2000" dirty="0">
+              <a:latin typeface="+mj-lt"/>
+            </a:endParaRPr>
+          </a:p>
+          <a:p>
+            <a:pPr marL="457200" indent="-457200">
+              <a:buFont typeface="+mj-lt"/>
+              <a:buAutoNum type="arabicPeriod"/>
+            </a:pPr>
+            <a:endParaRPr lang="en-US" sz="2000" dirty="0">
+              <a:latin typeface="+mj-lt"/>
+            </a:endParaRPr>
+          </a:p>
+          <a:p>
+            <a:pPr marL="457200" indent="-457200">
+              <a:buFont typeface="+mj-lt"/>
+              <a:buAutoNum type="arabicPeriod"/>
+            </a:pPr>
+            <a:endParaRPr lang="en-US" sz="2000" dirty="0">
+              <a:latin typeface="+mj-lt"/>
+            </a:endParaRPr>
+          </a:p>
+          <a:p>
+            <a:pPr marL="457200" indent="-457200">
+              <a:buFont typeface="+mj-lt"/>
+              <a:buAutoNum type="arabicPeriod"/>
+            </a:pPr>
+            <a:endParaRPr lang="en-US" sz="2000" dirty="0">
+              <a:latin typeface="+mj-lt"/>
+            </a:endParaRPr>
+          </a:p>
+          <a:p>
+            <a:pPr marL="457200" indent="-457200">
+              <a:buFont typeface="+mj-lt"/>
+              <a:buAutoNum type="arabicPeriod"/>
+            </a:pPr>
+            <a:endParaRPr lang="en-US" sz="2000" dirty="0">
+              <a:latin typeface="+mj-lt"/>
+            </a:endParaRPr>
+          </a:p>
+          <a:p>
+            <a:pPr marL="457200" indent="-457200">
+              <a:buFont typeface="+mj-lt"/>
+              <a:buAutoNum type="arabicPeriod"/>
+            </a:pPr>
+            <a:endParaRPr lang="en-US" sz="2000" dirty="0">
+              <a:latin typeface="+mj-lt"/>
+            </a:endParaRPr>
+          </a:p>
+          <a:p>
+            <a:pPr marL="457200" indent="-457200">
+              <a:buFont typeface="+mj-lt"/>
+              <a:buAutoNum type="arabicPeriod"/>
+            </a:pPr>
+            <a:r>
+              <a:rPr lang="en-US" sz="2000" dirty="0">
+                <a:latin typeface="+mj-lt"/>
+              </a:rPr>
+              <a:t>The length of a vector (V) is the square root of its dot product with itself:</a:t>
+            </a:r>
+          </a:p>
+          <a:p>
+            <a:pPr marL="457200" indent="-457200">
+              <a:buFont typeface="+mj-lt"/>
+              <a:buAutoNum type="arabicPeriod"/>
+            </a:pPr>
+            <a:endParaRPr lang="en-US" sz="2000" dirty="0">
+              <a:latin typeface="+mj-lt"/>
+            </a:endParaRPr>
+          </a:p>
+          <a:p>
+            <a:pPr marL="0" indent="0">
+              <a:buNone/>
+            </a:pPr>
+            <a:endParaRPr lang="en-US" sz="2000" dirty="0">
+              <a:latin typeface="+mj-lt"/>
+            </a:endParaRPr>
+          </a:p>
+          <a:p>
+            <a:pPr marL="457200" indent="-457200">
+              <a:buFont typeface="+mj-lt"/>
+              <a:buAutoNum type="arabicPeriod"/>
+            </a:pPr>
+            <a:endParaRPr lang="en-US" sz="2000" dirty="0">
+              <a:latin typeface="+mj-lt"/>
+            </a:endParaRPr>
+          </a:p>
+          <a:p>
+            <a:pPr marL="0" indent="0">
+              <a:buNone/>
+            </a:pPr>
+            <a:endParaRPr lang="en-US" sz="1600" dirty="0">
+              <a:latin typeface="+mj-lt"/>
+            </a:endParaRPr>
+          </a:p>
+          <a:p>
+            <a:pPr marL="514350" indent="-514350">
+              <a:buFont typeface="+mj-lt"/>
+              <a:buAutoNum type="arabicPeriod"/>
+            </a:pPr>
+            <a:endParaRPr lang="en-US" sz="2000" dirty="0">
+              <a:latin typeface="+mj-lt"/>
+            </a:endParaRPr>
+          </a:p>
+        </p:txBody>
+      </p:sp>
+      <p:pic>
+        <p:nvPicPr>
+          <p:cNvPr id="7" name="Picture 6" descr="Diagram, venn diagram&#10;&#10;Description automatically generated">
+            <a:extLst>
+              <a:ext uri="{FF2B5EF4-FFF2-40B4-BE49-F238E27FC236}">
+                <a16:creationId xmlns:a16="http://schemas.microsoft.com/office/drawing/2014/main" id="{92E03FB0-DA74-44D7-8138-16735474A4A8}"/>
+              </a:ext>
+            </a:extLst>
+          </p:cNvPr>
+          <p:cNvPicPr>
+            <a:picLocks noChangeAspect="1"/>
+          </p:cNvPicPr>
+          <p:nvPr/>
+        </p:nvPicPr>
+        <p:blipFill>
+          <a:blip r:embed="rId3">
+            <a:extLst>
+              <a:ext uri="{28A0092B-C50C-407E-A947-70E740481C1C}">
+                <a14:useLocalDpi xmlns:a14="http://schemas.microsoft.com/office/drawing/2010/main" val="0"/>
+              </a:ext>
+            </a:extLst>
+          </a:blip>
+          <a:stretch>
+            <a:fillRect/>
+          </a:stretch>
+        </p:blipFill>
+        <p:spPr>
+          <a:xfrm>
+            <a:off x="4821728" y="2389907"/>
+            <a:ext cx="2548543" cy="2141072"/>
+          </a:xfrm>
+          <a:prstGeom prst="rect">
+            <a:avLst/>
+          </a:prstGeom>
+        </p:spPr>
+      </p:pic>
+      <p:pic>
+        <p:nvPicPr>
+          <p:cNvPr id="9" name="Picture 8" descr="Text&#10;&#10;Description automatically generated with low confidence">
+            <a:extLst>
+              <a:ext uri="{FF2B5EF4-FFF2-40B4-BE49-F238E27FC236}">
+                <a16:creationId xmlns:a16="http://schemas.microsoft.com/office/drawing/2014/main" id="{50A91B98-CFA0-4711-BC67-F62BB03AFE1C}"/>
+              </a:ext>
+            </a:extLst>
+          </p:cNvPr>
+          <p:cNvPicPr>
+            <a:picLocks noChangeAspect="1"/>
+          </p:cNvPicPr>
+          <p:nvPr/>
+        </p:nvPicPr>
+        <p:blipFill>
+          <a:blip r:embed="rId4">
+            <a:extLst>
+              <a:ext uri="{28A0092B-C50C-407E-A947-70E740481C1C}">
+                <a14:useLocalDpi xmlns:a14="http://schemas.microsoft.com/office/drawing/2010/main" val="0"/>
+              </a:ext>
+            </a:extLst>
+          </a:blip>
+          <a:stretch>
+            <a:fillRect/>
+          </a:stretch>
+        </p:blipFill>
+        <p:spPr>
+          <a:xfrm>
+            <a:off x="1993918" y="5167312"/>
+            <a:ext cx="2362530" cy="543001"/>
+          </a:xfrm>
+          <a:prstGeom prst="rect">
+            <a:avLst/>
+          </a:prstGeom>
+        </p:spPr>
+      </p:pic>
+      <p:cxnSp>
+        <p:nvCxnSpPr>
+          <p:cNvPr id="11" name="Straight Arrow Connector 10">
+            <a:extLst>
+              <a:ext uri="{FF2B5EF4-FFF2-40B4-BE49-F238E27FC236}">
+                <a16:creationId xmlns:a16="http://schemas.microsoft.com/office/drawing/2014/main" id="{244B1564-91C4-4489-B338-F55F5D319300}"/>
+              </a:ext>
+            </a:extLst>
+          </p:cNvPr>
+          <p:cNvCxnSpPr>
+            <a:stCxn id="9" idx="3"/>
+          </p:cNvCxnSpPr>
+          <p:nvPr/>
+        </p:nvCxnSpPr>
+        <p:spPr>
+          <a:xfrm flipV="1">
+            <a:off x="4356448" y="5438812"/>
+            <a:ext cx="1531235" cy="1"/>
+          </a:xfrm>
+          <a:prstGeom prst="straightConnector1">
+            <a:avLst/>
+          </a:prstGeom>
+          <a:ln>
+            <a:tailEnd type="triangle"/>
+          </a:ln>
+        </p:spPr>
+        <p:style>
+          <a:lnRef idx="1">
+            <a:schemeClr val="accent1"/>
+          </a:lnRef>
+          <a:fillRef idx="0">
+            <a:schemeClr val="accent1"/>
+          </a:fillRef>
+          <a:effectRef idx="0">
+            <a:schemeClr val="accent1"/>
+          </a:effectRef>
+          <a:fontRef idx="minor">
+            <a:schemeClr val="tx1"/>
+          </a:fontRef>
+        </p:style>
+      </p:cxnSp>
+      <p:pic>
+        <p:nvPicPr>
+          <p:cNvPr id="13" name="Picture 12">
+            <a:extLst>
+              <a:ext uri="{FF2B5EF4-FFF2-40B4-BE49-F238E27FC236}">
+                <a16:creationId xmlns:a16="http://schemas.microsoft.com/office/drawing/2014/main" id="{C7663FE8-C0E7-486E-BC94-10816BD52FE7}"/>
+              </a:ext>
+            </a:extLst>
+          </p:cNvPr>
+          <p:cNvPicPr>
+            <a:picLocks noChangeAspect="1"/>
+          </p:cNvPicPr>
+          <p:nvPr/>
+        </p:nvPicPr>
+        <p:blipFill>
+          <a:blip r:embed="rId5">
+            <a:extLst>
+              <a:ext uri="{28A0092B-C50C-407E-A947-70E740481C1C}">
+                <a14:useLocalDpi xmlns:a14="http://schemas.microsoft.com/office/drawing/2010/main" val="0"/>
+              </a:ext>
+            </a:extLst>
+          </a:blip>
+          <a:stretch>
+            <a:fillRect/>
+          </a:stretch>
+        </p:blipFill>
+        <p:spPr>
+          <a:xfrm>
+            <a:off x="6304319" y="5215894"/>
+            <a:ext cx="1838582" cy="419158"/>
+          </a:xfrm>
+          <a:prstGeom prst="rect">
+            <a:avLst/>
+          </a:prstGeom>
+        </p:spPr>
+      </p:pic>
+    </p:spTree>
+    <p:extLst>
+      <p:ext uri="{BB962C8B-B14F-4D97-AF65-F5344CB8AC3E}">
+        <p14:creationId xmlns:p14="http://schemas.microsoft.com/office/powerpoint/2010/main" val="4066343566"/>
+      </p:ext>
+    </p:extLst>
+  </p:cSld>
+  <p:clrMapOvr>
+    <a:masterClrMapping/>
+  </p:clrMapOvr>
+</p:sld>
+</file>
+
+<file path=ppt/slides/slide11.xml><?xml version="1.0" encoding="utf-8"?>
+<p:sld xmlns:a="http://schemas.openxmlformats.org/drawingml/2006/main" xmlns:r="http://schemas.openxmlformats.org/officeDocument/2006/relationships" xmlns:p="http://schemas.openxmlformats.org/presentationml/2006/main">
+  <p:cSld>
+    <p:spTree>
+      <p:nvGrpSpPr>
+        <p:cNvPr id="1" name=""/>
+        <p:cNvGrpSpPr/>
+        <p:nvPr/>
+      </p:nvGrpSpPr>
+      <p:grpSpPr>
+        <a:xfrm>
+          <a:off x="0" y="0"/>
+          <a:ext cx="0" cy="0"/>
+          <a:chOff x="0" y="0"/>
+          <a:chExt cx="0" cy="0"/>
+        </a:xfrm>
+      </p:grpSpPr>
+      <p:sp>
+        <p:nvSpPr>
+          <p:cNvPr id="2" name="Title 1">
+            <a:extLst>
+              <a:ext uri="{FF2B5EF4-FFF2-40B4-BE49-F238E27FC236}">
+                <a16:creationId xmlns:a16="http://schemas.microsoft.com/office/drawing/2014/main" id="{90EAD578-3000-4ECC-8955-4586A64A81B9}"/>
+              </a:ext>
+            </a:extLst>
+          </p:cNvPr>
+          <p:cNvSpPr>
+            <a:spLocks noGrp="1"/>
+          </p:cNvSpPr>
+          <p:nvPr>
+            <p:ph type="title"/>
+          </p:nvPr>
+        </p:nvSpPr>
+        <p:spPr/>
+        <p:txBody>
+          <a:bodyPr/>
+          <a:lstStyle/>
+          <a:p>
+            <a:r>
+              <a:rPr lang="en-US" dirty="0"/>
+              <a:t>Ray meets Sphere</a:t>
+            </a:r>
+          </a:p>
+        </p:txBody>
+      </p:sp>
+      <p:sp>
+        <p:nvSpPr>
+          <p:cNvPr id="4" name="Date Placeholder 3">
+            <a:extLst>
+              <a:ext uri="{FF2B5EF4-FFF2-40B4-BE49-F238E27FC236}">
+                <a16:creationId xmlns:a16="http://schemas.microsoft.com/office/drawing/2014/main" id="{2787BEE0-6464-4517-8DFF-11DC1B991D1F}"/>
+              </a:ext>
+            </a:extLst>
+          </p:cNvPr>
+          <p:cNvSpPr>
+            <a:spLocks noGrp="1"/>
+          </p:cNvSpPr>
+          <p:nvPr>
+            <p:ph type="dt" sz="half" idx="10"/>
+          </p:nvPr>
+        </p:nvSpPr>
+        <p:spPr>
+          <a:xfrm>
+            <a:off x="794559" y="6367884"/>
+            <a:ext cx="2743200" cy="365125"/>
+          </a:xfrm>
+        </p:spPr>
+        <p:txBody>
+          <a:bodyPr/>
+          <a:lstStyle/>
+          <a:p>
+            <a:fld id="{82BCD581-7540-41CB-8BBB-BEC98AE789ED}" type="datetime1">
+              <a:rPr lang="en-US" smtClean="0"/>
+              <a:t>3/17/2021</a:t>
+            </a:fld>
+            <a:endParaRPr lang="en-US" dirty="0"/>
+          </a:p>
+        </p:txBody>
+      </p:sp>
+      <p:sp>
+        <p:nvSpPr>
+          <p:cNvPr id="5" name="Footer Placeholder 4">
+            <a:extLst>
+              <a:ext uri="{FF2B5EF4-FFF2-40B4-BE49-F238E27FC236}">
+                <a16:creationId xmlns:a16="http://schemas.microsoft.com/office/drawing/2014/main" id="{7270B72A-09EF-4DFB-A21A-DEB33EA22253}"/>
+              </a:ext>
+            </a:extLst>
+          </p:cNvPr>
+          <p:cNvSpPr>
+            <a:spLocks noGrp="1"/>
+          </p:cNvSpPr>
+          <p:nvPr>
+            <p:ph type="ftr" sz="quarter" idx="11"/>
+          </p:nvPr>
+        </p:nvSpPr>
+        <p:spPr/>
+        <p:txBody>
+          <a:bodyPr/>
+          <a:lstStyle/>
+          <a:p>
+            <a:r>
+              <a:rPr lang="en-US" dirty="0"/>
+              <a:t>Gambetta, Gabriel. 2021, Computer Graphics from Scratch</a:t>
+            </a:r>
+          </a:p>
+        </p:txBody>
+      </p:sp>
+      <p:sp>
+        <p:nvSpPr>
+          <p:cNvPr id="6" name="Content Placeholder 5">
+            <a:extLst>
+              <a:ext uri="{FF2B5EF4-FFF2-40B4-BE49-F238E27FC236}">
+                <a16:creationId xmlns:a16="http://schemas.microsoft.com/office/drawing/2014/main" id="{97BF2EFA-6295-494D-86C6-45A87ABF0AA7}"/>
+              </a:ext>
+            </a:extLst>
+          </p:cNvPr>
+          <p:cNvSpPr>
+            <a:spLocks noGrp="1"/>
+          </p:cNvSpPr>
+          <p:nvPr>
+            <p:ph idx="1"/>
+          </p:nvPr>
+        </p:nvSpPr>
+        <p:spPr>
+          <a:xfrm>
+            <a:off x="838200" y="1690688"/>
+            <a:ext cx="10464282" cy="3539510"/>
+          </a:xfrm>
+        </p:spPr>
+        <p:txBody>
+          <a:bodyPr>
+            <a:normAutofit/>
+          </a:bodyPr>
+          <a:lstStyle/>
+          <a:p>
+            <a:pPr marL="0" indent="0">
+              <a:buNone/>
+            </a:pPr>
+            <a:r>
+              <a:rPr lang="en-US" sz="2000" b="1" dirty="0">
+                <a:latin typeface="+mj-lt"/>
+              </a:rPr>
+              <a:t>We will suppose that the ray and the sphere intersect at a point (P).</a:t>
+            </a:r>
+          </a:p>
+          <a:p>
+            <a:pPr marL="457200" indent="-457200">
+              <a:buFont typeface="+mj-lt"/>
+              <a:buAutoNum type="arabicPeriod"/>
+            </a:pPr>
+            <a:r>
+              <a:rPr lang="en-US" sz="2000" dirty="0">
+                <a:latin typeface="+mj-lt"/>
+              </a:rPr>
+              <a:t>We must note that this point is along the ray’s vector, and the sphere’s vector, so it must satisfy both of our previous equations: </a:t>
+            </a:r>
+          </a:p>
+          <a:p>
+            <a:pPr marL="457200" indent="-457200">
+              <a:buFont typeface="+mj-lt"/>
+              <a:buAutoNum type="arabicPeriod"/>
+            </a:pPr>
+            <a:endParaRPr lang="en-US" sz="2000" dirty="0">
+              <a:latin typeface="+mj-lt"/>
+            </a:endParaRPr>
+          </a:p>
+          <a:p>
+            <a:pPr marL="457200" indent="-457200">
+              <a:buFont typeface="+mj-lt"/>
+              <a:buAutoNum type="arabicPeriod"/>
+            </a:pPr>
+            <a:r>
+              <a:rPr lang="en-US" sz="2000" dirty="0">
+                <a:latin typeface="+mj-lt"/>
+              </a:rPr>
+              <a:t>Using Algebra, we can use substitution of variables to get the following equation:</a:t>
+            </a:r>
+          </a:p>
+          <a:p>
+            <a:pPr marL="457200" indent="-457200">
+              <a:buFont typeface="+mj-lt"/>
+              <a:buAutoNum type="arabicPeriod"/>
+            </a:pPr>
+            <a:endParaRPr lang="en-US" sz="2000" dirty="0">
+              <a:latin typeface="+mj-lt"/>
+            </a:endParaRPr>
+          </a:p>
+          <a:p>
+            <a:pPr marL="457200" indent="-457200">
+              <a:buFont typeface="+mj-lt"/>
+              <a:buAutoNum type="arabicPeriod"/>
+            </a:pPr>
+            <a:endParaRPr lang="en-US" sz="2000" dirty="0">
+              <a:latin typeface="+mj-lt"/>
+            </a:endParaRPr>
+          </a:p>
+          <a:p>
+            <a:pPr marL="457200" indent="-457200">
+              <a:buFont typeface="+mj-lt"/>
+              <a:buAutoNum type="arabicPeriod"/>
+            </a:pPr>
+            <a:endParaRPr lang="en-US" sz="2000" dirty="0">
+              <a:latin typeface="+mj-lt"/>
+            </a:endParaRPr>
+          </a:p>
+          <a:p>
+            <a:pPr marL="457200" indent="-457200">
+              <a:buFont typeface="+mj-lt"/>
+              <a:buAutoNum type="arabicPeriod"/>
+            </a:pPr>
+            <a:r>
+              <a:rPr lang="en-US" sz="2000" dirty="0">
+                <a:latin typeface="+mj-lt"/>
+              </a:rPr>
+              <a:t>Then we expand the dot products and refactor our equation:</a:t>
+            </a:r>
+          </a:p>
+          <a:p>
+            <a:pPr marL="457200" indent="-457200">
+              <a:buFont typeface="+mj-lt"/>
+              <a:buAutoNum type="arabicPeriod"/>
+            </a:pPr>
+            <a:endParaRPr lang="en-US" sz="2000" dirty="0">
+              <a:latin typeface="+mj-lt"/>
+            </a:endParaRPr>
+          </a:p>
+          <a:p>
+            <a:pPr marL="0" indent="0">
+              <a:buNone/>
+            </a:pPr>
+            <a:endParaRPr lang="en-US" sz="2000" dirty="0">
+              <a:latin typeface="+mj-lt"/>
+            </a:endParaRPr>
+          </a:p>
+          <a:p>
+            <a:pPr marL="457200" indent="-457200">
+              <a:buFont typeface="+mj-lt"/>
+              <a:buAutoNum type="arabicPeriod"/>
+            </a:pPr>
+            <a:endParaRPr lang="en-US" sz="2000" dirty="0">
+              <a:latin typeface="+mj-lt"/>
+            </a:endParaRPr>
+          </a:p>
+          <a:p>
+            <a:pPr marL="0" indent="0">
+              <a:buNone/>
+            </a:pPr>
+            <a:endParaRPr lang="en-US" sz="1600" dirty="0">
+              <a:latin typeface="+mj-lt"/>
+            </a:endParaRPr>
+          </a:p>
+          <a:p>
+            <a:pPr marL="514350" indent="-514350">
+              <a:buFont typeface="+mj-lt"/>
+              <a:buAutoNum type="arabicPeriod"/>
+            </a:pPr>
+            <a:endParaRPr lang="en-US" sz="2000" dirty="0">
+              <a:latin typeface="+mj-lt"/>
+            </a:endParaRPr>
+          </a:p>
+        </p:txBody>
+      </p:sp>
+      <p:pic>
+        <p:nvPicPr>
+          <p:cNvPr id="13" name="Picture 12">
+            <a:extLst>
+              <a:ext uri="{FF2B5EF4-FFF2-40B4-BE49-F238E27FC236}">
+                <a16:creationId xmlns:a16="http://schemas.microsoft.com/office/drawing/2014/main" id="{C7663FE8-C0E7-486E-BC94-10816BD52FE7}"/>
+              </a:ext>
+            </a:extLst>
+          </p:cNvPr>
+          <p:cNvPicPr>
+            <a:picLocks noChangeAspect="1"/>
+          </p:cNvPicPr>
+          <p:nvPr/>
+        </p:nvPicPr>
+        <p:blipFill>
+          <a:blip r:embed="rId3">
+            <a:extLst>
+              <a:ext uri="{28A0092B-C50C-407E-A947-70E740481C1C}">
+                <a14:useLocalDpi xmlns:a14="http://schemas.microsoft.com/office/drawing/2010/main" val="0"/>
+              </a:ext>
+            </a:extLst>
+          </a:blip>
+          <a:stretch>
+            <a:fillRect/>
+          </a:stretch>
+        </p:blipFill>
+        <p:spPr>
+          <a:xfrm>
+            <a:off x="7234109" y="2626314"/>
+            <a:ext cx="1838582" cy="419158"/>
+          </a:xfrm>
+          <a:prstGeom prst="rect">
+            <a:avLst/>
+          </a:prstGeom>
+        </p:spPr>
+      </p:pic>
+      <p:pic>
+        <p:nvPicPr>
+          <p:cNvPr id="10" name="Picture 9">
+            <a:extLst>
+              <a:ext uri="{FF2B5EF4-FFF2-40B4-BE49-F238E27FC236}">
+                <a16:creationId xmlns:a16="http://schemas.microsoft.com/office/drawing/2014/main" id="{B37FBF05-BD1A-4AEA-BB31-E8A305F0DC5E}"/>
+              </a:ext>
+            </a:extLst>
+          </p:cNvPr>
+          <p:cNvPicPr>
+            <a:picLocks noChangeAspect="1"/>
+          </p:cNvPicPr>
+          <p:nvPr/>
+        </p:nvPicPr>
+        <p:blipFill>
+          <a:blip r:embed="rId4">
+            <a:extLst>
+              <a:ext uri="{28A0092B-C50C-407E-A947-70E740481C1C}">
+                <a14:useLocalDpi xmlns:a14="http://schemas.microsoft.com/office/drawing/2010/main" val="0"/>
+              </a:ext>
+            </a:extLst>
+          </a:blip>
+          <a:stretch>
+            <a:fillRect/>
+          </a:stretch>
+        </p:blipFill>
+        <p:spPr>
+          <a:xfrm>
+            <a:off x="5017710" y="2588208"/>
+            <a:ext cx="1086002" cy="457264"/>
+          </a:xfrm>
+          <a:prstGeom prst="rect">
+            <a:avLst/>
+          </a:prstGeom>
+        </p:spPr>
+      </p:pic>
+      <p:pic>
+        <p:nvPicPr>
+          <p:cNvPr id="8" name="Picture 7">
+            <a:extLst>
+              <a:ext uri="{FF2B5EF4-FFF2-40B4-BE49-F238E27FC236}">
+                <a16:creationId xmlns:a16="http://schemas.microsoft.com/office/drawing/2014/main" id="{B0C8E86C-9F38-4D37-A03B-D3C909053067}"/>
+              </a:ext>
+            </a:extLst>
+          </p:cNvPr>
+          <p:cNvPicPr>
+            <a:picLocks noChangeAspect="1"/>
+          </p:cNvPicPr>
+          <p:nvPr/>
+        </p:nvPicPr>
+        <p:blipFill>
+          <a:blip r:embed="rId5">
+            <a:extLst>
+              <a:ext uri="{28A0092B-C50C-407E-A947-70E740481C1C}">
+                <a14:useLocalDpi xmlns:a14="http://schemas.microsoft.com/office/drawing/2010/main" val="0"/>
+              </a:ext>
+            </a:extLst>
+          </a:blip>
+          <a:stretch>
+            <a:fillRect/>
+          </a:stretch>
+        </p:blipFill>
+        <p:spPr>
+          <a:xfrm>
+            <a:off x="1640343" y="3940989"/>
+            <a:ext cx="2753109" cy="419158"/>
+          </a:xfrm>
+          <a:prstGeom prst="rect">
+            <a:avLst/>
+          </a:prstGeom>
+        </p:spPr>
+      </p:pic>
+      <p:cxnSp>
+        <p:nvCxnSpPr>
+          <p:cNvPr id="14" name="Straight Arrow Connector 13">
+            <a:extLst>
+              <a:ext uri="{FF2B5EF4-FFF2-40B4-BE49-F238E27FC236}">
+                <a16:creationId xmlns:a16="http://schemas.microsoft.com/office/drawing/2014/main" id="{1C4567DF-A6DF-449F-9ED4-6B6792EC5D18}"/>
+              </a:ext>
+            </a:extLst>
+          </p:cNvPr>
+          <p:cNvCxnSpPr/>
+          <p:nvPr/>
+        </p:nvCxnSpPr>
+        <p:spPr>
+          <a:xfrm>
+            <a:off x="4509796" y="4150568"/>
+            <a:ext cx="802433" cy="0"/>
+          </a:xfrm>
+          <a:prstGeom prst="straightConnector1">
+            <a:avLst/>
+          </a:prstGeom>
+          <a:ln>
+            <a:tailEnd type="triangle"/>
+          </a:ln>
+        </p:spPr>
+        <p:style>
+          <a:lnRef idx="1">
+            <a:schemeClr val="accent1"/>
+          </a:lnRef>
+          <a:fillRef idx="0">
+            <a:schemeClr val="accent1"/>
+          </a:fillRef>
+          <a:effectRef idx="0">
+            <a:schemeClr val="accent1"/>
+          </a:effectRef>
+          <a:fontRef idx="minor">
+            <a:schemeClr val="tx1"/>
+          </a:fontRef>
+        </p:style>
+      </p:cxnSp>
+      <p:pic>
+        <p:nvPicPr>
+          <p:cNvPr id="16" name="Picture 15">
+            <a:extLst>
+              <a:ext uri="{FF2B5EF4-FFF2-40B4-BE49-F238E27FC236}">
+                <a16:creationId xmlns:a16="http://schemas.microsoft.com/office/drawing/2014/main" id="{2449FD62-DDF0-46B1-AE54-BF82EB4C0009}"/>
+              </a:ext>
+            </a:extLst>
+          </p:cNvPr>
+          <p:cNvPicPr>
+            <a:picLocks noChangeAspect="1"/>
+          </p:cNvPicPr>
+          <p:nvPr/>
+        </p:nvPicPr>
+        <p:blipFill>
+          <a:blip r:embed="rId6">
+            <a:extLst>
+              <a:ext uri="{28A0092B-C50C-407E-A947-70E740481C1C}">
+                <a14:useLocalDpi xmlns:a14="http://schemas.microsoft.com/office/drawing/2010/main" val="0"/>
+              </a:ext>
+            </a:extLst>
+          </a:blip>
+          <a:stretch>
+            <a:fillRect/>
+          </a:stretch>
+        </p:blipFill>
+        <p:spPr>
+          <a:xfrm>
+            <a:off x="5560711" y="3933019"/>
+            <a:ext cx="2191056" cy="409632"/>
+          </a:xfrm>
+          <a:prstGeom prst="rect">
+            <a:avLst/>
+          </a:prstGeom>
+        </p:spPr>
+      </p:pic>
+      <p:pic>
+        <p:nvPicPr>
+          <p:cNvPr id="18" name="Picture 17" descr="Text&#10;&#10;Description automatically generated">
+            <a:extLst>
+              <a:ext uri="{FF2B5EF4-FFF2-40B4-BE49-F238E27FC236}">
+                <a16:creationId xmlns:a16="http://schemas.microsoft.com/office/drawing/2014/main" id="{8DC25539-005B-4869-A607-9FD5246949E8}"/>
+              </a:ext>
+            </a:extLst>
+          </p:cNvPr>
+          <p:cNvPicPr>
+            <a:picLocks noChangeAspect="1"/>
+          </p:cNvPicPr>
+          <p:nvPr/>
+        </p:nvPicPr>
+        <p:blipFill>
+          <a:blip r:embed="rId7">
+            <a:extLst>
+              <a:ext uri="{28A0092B-C50C-407E-A947-70E740481C1C}">
+                <a14:useLocalDpi xmlns:a14="http://schemas.microsoft.com/office/drawing/2010/main" val="0"/>
+              </a:ext>
+            </a:extLst>
+          </a:blip>
+          <a:stretch>
+            <a:fillRect/>
+          </a:stretch>
+        </p:blipFill>
+        <p:spPr>
+          <a:xfrm>
+            <a:off x="1441966" y="5320655"/>
+            <a:ext cx="4191585" cy="905001"/>
+          </a:xfrm>
+          <a:prstGeom prst="rect">
+            <a:avLst/>
+          </a:prstGeom>
+        </p:spPr>
+      </p:pic>
+      <p:cxnSp>
+        <p:nvCxnSpPr>
+          <p:cNvPr id="20" name="Straight Arrow Connector 19">
+            <a:extLst>
+              <a:ext uri="{FF2B5EF4-FFF2-40B4-BE49-F238E27FC236}">
+                <a16:creationId xmlns:a16="http://schemas.microsoft.com/office/drawing/2014/main" id="{6501CED9-8CDC-49AB-A295-A55A88BD0C2C}"/>
+              </a:ext>
+            </a:extLst>
+          </p:cNvPr>
+          <p:cNvCxnSpPr/>
+          <p:nvPr/>
+        </p:nvCxnSpPr>
+        <p:spPr>
+          <a:xfrm>
+            <a:off x="3387211" y="5722710"/>
+            <a:ext cx="0" cy="212176"/>
+          </a:xfrm>
+          <a:prstGeom prst="straightConnector1">
+            <a:avLst/>
+          </a:prstGeom>
+          <a:ln>
+            <a:tailEnd type="triangle"/>
+          </a:ln>
+        </p:spPr>
+        <p:style>
+          <a:lnRef idx="1">
+            <a:schemeClr val="accent1"/>
+          </a:lnRef>
+          <a:fillRef idx="0">
+            <a:schemeClr val="accent1"/>
+          </a:fillRef>
+          <a:effectRef idx="0">
+            <a:schemeClr val="accent1"/>
+          </a:effectRef>
+          <a:fontRef idx="minor">
+            <a:schemeClr val="tx1"/>
+          </a:fontRef>
+        </p:style>
+      </p:cxnSp>
+      <p:pic>
+        <p:nvPicPr>
+          <p:cNvPr id="22" name="Picture 21" descr="A picture containing chart&#10;&#10;Description automatically generated">
+            <a:extLst>
+              <a:ext uri="{FF2B5EF4-FFF2-40B4-BE49-F238E27FC236}">
+                <a16:creationId xmlns:a16="http://schemas.microsoft.com/office/drawing/2014/main" id="{CED5360B-2453-4BB9-87E8-9C171EAB717E}"/>
+              </a:ext>
+            </a:extLst>
+          </p:cNvPr>
+          <p:cNvPicPr>
+            <a:picLocks noChangeAspect="1"/>
+          </p:cNvPicPr>
+          <p:nvPr/>
+        </p:nvPicPr>
+        <p:blipFill>
+          <a:blip r:embed="rId8">
+            <a:extLst>
+              <a:ext uri="{28A0092B-C50C-407E-A947-70E740481C1C}">
+                <a14:useLocalDpi xmlns:a14="http://schemas.microsoft.com/office/drawing/2010/main" val="0"/>
+              </a:ext>
+            </a:extLst>
+          </a:blip>
+          <a:stretch>
+            <a:fillRect/>
+          </a:stretch>
+        </p:blipFill>
+        <p:spPr>
+          <a:xfrm>
+            <a:off x="6854281" y="5409930"/>
+            <a:ext cx="3943900" cy="543001"/>
+          </a:xfrm>
+          <a:prstGeom prst="rect">
+            <a:avLst/>
+          </a:prstGeom>
+        </p:spPr>
+      </p:pic>
+      <p:cxnSp>
+        <p:nvCxnSpPr>
+          <p:cNvPr id="24" name="Straight Arrow Connector 23">
+            <a:extLst>
+              <a:ext uri="{FF2B5EF4-FFF2-40B4-BE49-F238E27FC236}">
+                <a16:creationId xmlns:a16="http://schemas.microsoft.com/office/drawing/2014/main" id="{833ADF0F-6FBA-4FD8-8991-96F0A366DCE0}"/>
+              </a:ext>
+            </a:extLst>
+          </p:cNvPr>
+          <p:cNvCxnSpPr>
+            <a:stCxn id="18" idx="3"/>
+          </p:cNvCxnSpPr>
+          <p:nvPr/>
+        </p:nvCxnSpPr>
+        <p:spPr>
+          <a:xfrm flipV="1">
+            <a:off x="5633551" y="5773155"/>
+            <a:ext cx="1078057" cy="1"/>
+          </a:xfrm>
+          <a:prstGeom prst="straightConnector1">
+            <a:avLst/>
+          </a:prstGeom>
+          <a:ln>
+            <a:tailEnd type="triangle"/>
+          </a:ln>
+        </p:spPr>
+        <p:style>
+          <a:lnRef idx="1">
+            <a:schemeClr val="accent1"/>
+          </a:lnRef>
+          <a:fillRef idx="0">
+            <a:schemeClr val="accent1"/>
+          </a:fillRef>
+          <a:effectRef idx="0">
+            <a:schemeClr val="accent1"/>
+          </a:effectRef>
+          <a:fontRef idx="minor">
+            <a:schemeClr val="tx1"/>
+          </a:fontRef>
+        </p:style>
+      </p:cxnSp>
+    </p:spTree>
+    <p:extLst>
+      <p:ext uri="{BB962C8B-B14F-4D97-AF65-F5344CB8AC3E}">
+        <p14:creationId xmlns:p14="http://schemas.microsoft.com/office/powerpoint/2010/main" val="3766353076"/>
+      </p:ext>
+    </p:extLst>
+  </p:cSld>
+  <p:clrMapOvr>
+    <a:masterClrMapping/>
+  </p:clrMapOvr>
+</p:sld>
+</file>
+
+<file path=ppt/slides/slide12.xml><?xml version="1.0" encoding="utf-8"?>
+<p:sld xmlns:a="http://schemas.openxmlformats.org/drawingml/2006/main" xmlns:r="http://schemas.openxmlformats.org/officeDocument/2006/relationships" xmlns:p="http://schemas.openxmlformats.org/presentationml/2006/main">
+  <p:cSld>
+    <p:spTree>
+      <p:nvGrpSpPr>
+        <p:cNvPr id="1" name=""/>
+        <p:cNvGrpSpPr/>
+        <p:nvPr/>
+      </p:nvGrpSpPr>
+      <p:grpSpPr>
+        <a:xfrm>
+          <a:off x="0" y="0"/>
+          <a:ext cx="0" cy="0"/>
+          <a:chOff x="0" y="0"/>
+          <a:chExt cx="0" cy="0"/>
+        </a:xfrm>
+      </p:grpSpPr>
+      <p:sp>
+        <p:nvSpPr>
+          <p:cNvPr id="2" name="Title 1">
+            <a:extLst>
+              <a:ext uri="{FF2B5EF4-FFF2-40B4-BE49-F238E27FC236}">
+                <a16:creationId xmlns:a16="http://schemas.microsoft.com/office/drawing/2014/main" id="{90EAD578-3000-4ECC-8955-4586A64A81B9}"/>
+              </a:ext>
+            </a:extLst>
+          </p:cNvPr>
+          <p:cNvSpPr>
+            <a:spLocks noGrp="1"/>
+          </p:cNvSpPr>
+          <p:nvPr>
+            <p:ph type="title"/>
+          </p:nvPr>
+        </p:nvSpPr>
+        <p:spPr/>
+        <p:txBody>
+          <a:bodyPr/>
+          <a:lstStyle/>
+          <a:p>
+            <a:r>
+              <a:rPr lang="en-US" dirty="0"/>
+              <a:t>Ray meets Sphere - part 2</a:t>
+            </a:r>
+          </a:p>
+        </p:txBody>
+      </p:sp>
+      <p:sp>
+        <p:nvSpPr>
+          <p:cNvPr id="4" name="Date Placeholder 3">
+            <a:extLst>
+              <a:ext uri="{FF2B5EF4-FFF2-40B4-BE49-F238E27FC236}">
+                <a16:creationId xmlns:a16="http://schemas.microsoft.com/office/drawing/2014/main" id="{2787BEE0-6464-4517-8DFF-11DC1B991D1F}"/>
+              </a:ext>
+            </a:extLst>
+          </p:cNvPr>
+          <p:cNvSpPr>
+            <a:spLocks noGrp="1"/>
+          </p:cNvSpPr>
+          <p:nvPr>
+            <p:ph type="dt" sz="half" idx="10"/>
+          </p:nvPr>
+        </p:nvSpPr>
+        <p:spPr>
+          <a:xfrm>
+            <a:off x="794559" y="6367884"/>
+            <a:ext cx="2743200" cy="365125"/>
+          </a:xfrm>
+        </p:spPr>
+        <p:txBody>
+          <a:bodyPr/>
+          <a:lstStyle/>
+          <a:p>
+            <a:fld id="{82BCD581-7540-41CB-8BBB-BEC98AE789ED}" type="datetime1">
+              <a:rPr lang="en-US" smtClean="0"/>
+              <a:t>3/17/2021</a:t>
+            </a:fld>
+            <a:endParaRPr lang="en-US" dirty="0"/>
+          </a:p>
+        </p:txBody>
+      </p:sp>
+      <p:sp>
+        <p:nvSpPr>
+          <p:cNvPr id="5" name="Footer Placeholder 4">
+            <a:extLst>
+              <a:ext uri="{FF2B5EF4-FFF2-40B4-BE49-F238E27FC236}">
+                <a16:creationId xmlns:a16="http://schemas.microsoft.com/office/drawing/2014/main" id="{7270B72A-09EF-4DFB-A21A-DEB33EA22253}"/>
+              </a:ext>
+            </a:extLst>
+          </p:cNvPr>
+          <p:cNvSpPr>
+            <a:spLocks noGrp="1"/>
+          </p:cNvSpPr>
+          <p:nvPr>
+            <p:ph type="ftr" sz="quarter" idx="11"/>
+          </p:nvPr>
+        </p:nvSpPr>
+        <p:spPr/>
+        <p:txBody>
+          <a:bodyPr/>
+          <a:lstStyle/>
+          <a:p>
+            <a:r>
+              <a:rPr lang="en-US" dirty="0"/>
+              <a:t>Gambetta, Gabriel. 2021, Computer Graphics from Scratch</a:t>
+            </a:r>
+          </a:p>
+        </p:txBody>
+      </p:sp>
+      <p:sp>
+        <p:nvSpPr>
+          <p:cNvPr id="6" name="Content Placeholder 5">
+            <a:extLst>
+              <a:ext uri="{FF2B5EF4-FFF2-40B4-BE49-F238E27FC236}">
+                <a16:creationId xmlns:a16="http://schemas.microsoft.com/office/drawing/2014/main" id="{97BF2EFA-6295-494D-86C6-45A87ABF0AA7}"/>
+              </a:ext>
+            </a:extLst>
+          </p:cNvPr>
+          <p:cNvSpPr>
+            <a:spLocks noGrp="1"/>
+          </p:cNvSpPr>
+          <p:nvPr>
+            <p:ph idx="1"/>
+          </p:nvPr>
+        </p:nvSpPr>
+        <p:spPr>
+          <a:xfrm>
+            <a:off x="838200" y="1690688"/>
+            <a:ext cx="10464282" cy="4665662"/>
+          </a:xfrm>
+        </p:spPr>
+        <p:txBody>
+          <a:bodyPr>
+            <a:normAutofit fontScale="92500" lnSpcReduction="10000"/>
+          </a:bodyPr>
+          <a:lstStyle/>
+          <a:p>
+            <a:pPr marL="0" indent="0">
+              <a:buNone/>
+            </a:pPr>
+            <a:r>
+              <a:rPr lang="en-US" sz="2000" dirty="0">
+                <a:latin typeface="+mj-lt"/>
+              </a:rPr>
+              <a:t>Since every dot product below is a real number, we can assign them each to a variable to make the quadratic formula easier to read:</a:t>
+            </a:r>
+          </a:p>
+          <a:p>
+            <a:pPr marL="457200" indent="-457200">
+              <a:buFont typeface="+mj-lt"/>
+              <a:buAutoNum type="arabicPeriod"/>
+            </a:pPr>
+            <a:endParaRPr lang="en-US" sz="2000" dirty="0">
+              <a:latin typeface="+mj-lt"/>
+            </a:endParaRPr>
+          </a:p>
+          <a:p>
+            <a:pPr marL="457200" indent="-457200">
+              <a:buFont typeface="+mj-lt"/>
+              <a:buAutoNum type="arabicPeriod"/>
+            </a:pPr>
+            <a:endParaRPr lang="en-US" sz="2000" dirty="0">
+              <a:latin typeface="+mj-lt"/>
+            </a:endParaRPr>
+          </a:p>
+          <a:p>
+            <a:pPr marL="457200" indent="-457200">
+              <a:buFont typeface="+mj-lt"/>
+              <a:buAutoNum type="arabicPeriod"/>
+            </a:pPr>
+            <a:endParaRPr lang="en-US" sz="2000" dirty="0">
+              <a:latin typeface="+mj-lt"/>
+            </a:endParaRPr>
+          </a:p>
+          <a:p>
+            <a:pPr marL="457200" indent="-457200">
+              <a:buFont typeface="+mj-lt"/>
+              <a:buAutoNum type="arabicPeriod"/>
+            </a:pPr>
+            <a:endParaRPr lang="en-US" sz="2000" dirty="0">
+              <a:latin typeface="+mj-lt"/>
+            </a:endParaRPr>
+          </a:p>
+          <a:p>
+            <a:pPr marL="0" indent="0">
+              <a:buNone/>
+            </a:pPr>
+            <a:endParaRPr lang="en-US" sz="2000" dirty="0">
+              <a:latin typeface="+mj-lt"/>
+            </a:endParaRPr>
+          </a:p>
+          <a:p>
+            <a:pPr marL="0" indent="0">
+              <a:buNone/>
+            </a:pPr>
+            <a:endParaRPr lang="en-US" sz="2000" dirty="0">
+              <a:latin typeface="+mj-lt"/>
+            </a:endParaRPr>
+          </a:p>
+          <a:p>
+            <a:pPr marL="0" indent="0">
+              <a:buNone/>
+            </a:pPr>
+            <a:r>
+              <a:rPr lang="en-US" sz="2000" dirty="0">
+                <a:latin typeface="+mj-lt"/>
+              </a:rPr>
+              <a:t>This refactored formula is a quadratic equation! Its solutions are the values of the parameter (t) where the ray intersects the sphere.</a:t>
+            </a:r>
+          </a:p>
+          <a:p>
+            <a:pPr marL="0" indent="0">
+              <a:buNone/>
+            </a:pPr>
+            <a:endParaRPr lang="en-US" sz="2000" dirty="0">
+              <a:latin typeface="+mj-lt"/>
+            </a:endParaRPr>
+          </a:p>
+          <a:p>
+            <a:pPr marL="0" indent="0">
+              <a:buNone/>
+            </a:pPr>
+            <a:endParaRPr lang="en-US" sz="2000" dirty="0">
+              <a:latin typeface="+mj-lt"/>
+            </a:endParaRPr>
+          </a:p>
+          <a:p>
+            <a:pPr marL="0" indent="0">
+              <a:buNone/>
+            </a:pPr>
+            <a:r>
+              <a:rPr lang="en-US" sz="2000" dirty="0">
+                <a:latin typeface="+mj-lt"/>
+              </a:rPr>
+              <a:t>So once we have found the value of (t) we can plug it back into the ray equation to find the intersection point (P)</a:t>
+            </a:r>
+          </a:p>
+        </p:txBody>
+      </p:sp>
+      <p:pic>
+        <p:nvPicPr>
+          <p:cNvPr id="22" name="Picture 21" descr="A picture containing chart&#10;&#10;Description automatically generated">
+            <a:extLst>
+              <a:ext uri="{FF2B5EF4-FFF2-40B4-BE49-F238E27FC236}">
+                <a16:creationId xmlns:a16="http://schemas.microsoft.com/office/drawing/2014/main" id="{CED5360B-2453-4BB9-87E8-9C171EAB717E}"/>
+              </a:ext>
+            </a:extLst>
+          </p:cNvPr>
+          <p:cNvPicPr>
+            <a:picLocks noChangeAspect="1"/>
+          </p:cNvPicPr>
+          <p:nvPr/>
+        </p:nvPicPr>
+        <p:blipFill>
+          <a:blip r:embed="rId3">
+            <a:extLst>
+              <a:ext uri="{28A0092B-C50C-407E-A947-70E740481C1C}">
+                <a14:useLocalDpi xmlns:a14="http://schemas.microsoft.com/office/drawing/2010/main" val="0"/>
+              </a:ext>
+            </a:extLst>
+          </a:blip>
+          <a:stretch>
+            <a:fillRect/>
+          </a:stretch>
+        </p:blipFill>
+        <p:spPr>
+          <a:xfrm>
+            <a:off x="1932169" y="3103223"/>
+            <a:ext cx="3943900" cy="543001"/>
+          </a:xfrm>
+          <a:prstGeom prst="rect">
+            <a:avLst/>
+          </a:prstGeom>
+        </p:spPr>
+      </p:pic>
+      <p:pic>
+        <p:nvPicPr>
+          <p:cNvPr id="17" name="Picture 16" descr="Text, letter&#10;&#10;Description automatically generated">
+            <a:extLst>
+              <a:ext uri="{FF2B5EF4-FFF2-40B4-BE49-F238E27FC236}">
+                <a16:creationId xmlns:a16="http://schemas.microsoft.com/office/drawing/2014/main" id="{115F37A8-1899-4366-B0B6-2B2FE7A4F7B7}"/>
+              </a:ext>
+            </a:extLst>
+          </p:cNvPr>
+          <p:cNvPicPr>
+            <a:picLocks noChangeAspect="1"/>
+          </p:cNvPicPr>
+          <p:nvPr/>
+        </p:nvPicPr>
+        <p:blipFill>
+          <a:blip r:embed="rId4">
+            <a:extLst>
+              <a:ext uri="{28A0092B-C50C-407E-A947-70E740481C1C}">
+                <a14:useLocalDpi xmlns:a14="http://schemas.microsoft.com/office/drawing/2010/main" val="0"/>
+              </a:ext>
+            </a:extLst>
+          </a:blip>
+          <a:stretch>
+            <a:fillRect/>
+          </a:stretch>
+        </p:blipFill>
+        <p:spPr>
+          <a:xfrm>
+            <a:off x="7036409" y="2460197"/>
+            <a:ext cx="1943371" cy="1829055"/>
+          </a:xfrm>
+          <a:prstGeom prst="rect">
+            <a:avLst/>
+          </a:prstGeom>
+        </p:spPr>
+      </p:pic>
+      <p:sp>
+        <p:nvSpPr>
+          <p:cNvPr id="23" name="Left Brace 22">
+            <a:extLst>
+              <a:ext uri="{FF2B5EF4-FFF2-40B4-BE49-F238E27FC236}">
+                <a16:creationId xmlns:a16="http://schemas.microsoft.com/office/drawing/2014/main" id="{936462A9-FB9E-4775-A972-96B0224785AE}"/>
+              </a:ext>
+            </a:extLst>
+          </p:cNvPr>
+          <p:cNvSpPr/>
+          <p:nvPr/>
+        </p:nvSpPr>
+        <p:spPr>
+          <a:xfrm>
+            <a:off x="5927387" y="2590417"/>
+            <a:ext cx="1232170" cy="1677166"/>
+          </a:xfrm>
+          <a:prstGeom prst="leftBrace">
+            <a:avLst/>
+          </a:prstGeom>
+        </p:spPr>
+        <p:style>
+          <a:lnRef idx="1">
+            <a:schemeClr val="accent1"/>
+          </a:lnRef>
+          <a:fillRef idx="0">
+            <a:schemeClr val="accent1"/>
+          </a:fillRef>
+          <a:effectRef idx="0">
+            <a:schemeClr val="accent1"/>
+          </a:effectRef>
+          <a:fontRef idx="minor">
+            <a:schemeClr val="tx1"/>
+          </a:fontRef>
+        </p:style>
+        <p:txBody>
+          <a:bodyPr rtlCol="0" anchor="ctr"/>
+          <a:lstStyle/>
+          <a:p>
+            <a:pPr algn="ctr"/>
+            <a:endParaRPr lang="en-US"/>
+          </a:p>
+        </p:txBody>
+      </p:sp>
+      <p:pic>
+        <p:nvPicPr>
+          <p:cNvPr id="27" name="Picture 26" descr="A picture containing diagram&#10;&#10;Description automatically generated">
+            <a:extLst>
+              <a:ext uri="{FF2B5EF4-FFF2-40B4-BE49-F238E27FC236}">
+                <a16:creationId xmlns:a16="http://schemas.microsoft.com/office/drawing/2014/main" id="{6CD73AEA-F6DB-4CCD-9E24-34FF21A0E9EE}"/>
+              </a:ext>
+            </a:extLst>
+          </p:cNvPr>
+          <p:cNvPicPr>
+            <a:picLocks noChangeAspect="1"/>
+          </p:cNvPicPr>
+          <p:nvPr/>
+        </p:nvPicPr>
+        <p:blipFill>
+          <a:blip r:embed="rId5">
+            <a:extLst>
+              <a:ext uri="{28A0092B-C50C-407E-A947-70E740481C1C}">
+                <a14:useLocalDpi xmlns:a14="http://schemas.microsoft.com/office/drawing/2010/main" val="0"/>
+              </a:ext>
+            </a:extLst>
+          </a:blip>
+          <a:stretch>
+            <a:fillRect/>
+          </a:stretch>
+        </p:blipFill>
+        <p:spPr>
+          <a:xfrm>
+            <a:off x="5162133" y="4798093"/>
+            <a:ext cx="2991267" cy="895475"/>
+          </a:xfrm>
+          <a:prstGeom prst="rect">
+            <a:avLst/>
+          </a:prstGeom>
+        </p:spPr>
+      </p:pic>
+    </p:spTree>
+    <p:extLst>
+      <p:ext uri="{BB962C8B-B14F-4D97-AF65-F5344CB8AC3E}">
+        <p14:creationId xmlns:p14="http://schemas.microsoft.com/office/powerpoint/2010/main" val="291025132"/>
+      </p:ext>
+    </p:extLst>
+  </p:cSld>
+  <p:clrMapOvr>
+    <a:masterClrMapping/>
   </p:clrMapOvr>
 </p:sld>
 </file>
@@ -4313,7 +6013,7 @@
           <a:p>
             <a:fld id="{82BCD581-7540-41CB-8BBB-BEC98AE789ED}" type="datetime1">
               <a:rPr lang="en-US" smtClean="0"/>
-              <a:t>2/24/2021</a:t>
+              <a:t>3/17/2021</a:t>
             </a:fld>
             <a:endParaRPr lang="en-US"/>
           </a:p>
@@ -4428,7 +6128,7 @@
           <a:p>
             <a:fld id="{82BCD581-7540-41CB-8BBB-BEC98AE789ED}" type="datetime1">
               <a:rPr lang="en-US" smtClean="0"/>
-              <a:t>2/24/2021</a:t>
+              <a:t>3/17/2021</a:t>
             </a:fld>
             <a:endParaRPr lang="en-US"/>
           </a:p>
@@ -4754,7 +6454,7 @@
           <a:p>
             <a:fld id="{82BCD581-7540-41CB-8BBB-BEC98AE789ED}" type="datetime1">
               <a:rPr lang="en-US" smtClean="0"/>
-              <a:t>2/24/2021</a:t>
+              <a:t>3/17/2021</a:t>
             </a:fld>
             <a:endParaRPr lang="en-US"/>
           </a:p>
@@ -5127,7 +6827,7 @@
           <a:p>
             <a:fld id="{82BCD581-7540-41CB-8BBB-BEC98AE789ED}" type="datetime1">
               <a:rPr lang="en-US" smtClean="0"/>
-              <a:t>2/24/2021</a:t>
+              <a:t>3/17/2021</a:t>
             </a:fld>
             <a:endParaRPr lang="en-US"/>
           </a:p>
@@ -5416,7 +7116,7 @@
           <a:p>
             <a:fld id="{82BCD581-7540-41CB-8BBB-BEC98AE789ED}" type="datetime1">
               <a:rPr lang="en-US" smtClean="0"/>
-              <a:t>2/24/2021</a:t>
+              <a:t>3/17/2021</a:t>
             </a:fld>
             <a:endParaRPr lang="en-US" dirty="0"/>
           </a:p>
@@ -5719,6 +7419,1316 @@
     <p:extLst>
       <p:ext uri="{BB962C8B-B14F-4D97-AF65-F5344CB8AC3E}">
         <p14:creationId xmlns:p14="http://schemas.microsoft.com/office/powerpoint/2010/main" val="2414811693"/>
+      </p:ext>
+    </p:extLst>
+  </p:cSld>
+  <p:clrMapOvr>
+    <a:masterClrMapping/>
+  </p:clrMapOvr>
+</p:sld>
+</file>
+
+<file path=ppt/slides/slide7.xml><?xml version="1.0" encoding="utf-8"?>
+<p:sld xmlns:a="http://schemas.openxmlformats.org/drawingml/2006/main" xmlns:r="http://schemas.openxmlformats.org/officeDocument/2006/relationships" xmlns:p="http://schemas.openxmlformats.org/presentationml/2006/main">
+  <p:cSld>
+    <p:spTree>
+      <p:nvGrpSpPr>
+        <p:cNvPr id="1" name=""/>
+        <p:cNvGrpSpPr/>
+        <p:nvPr/>
+      </p:nvGrpSpPr>
+      <p:grpSpPr>
+        <a:xfrm>
+          <a:off x="0" y="0"/>
+          <a:ext cx="0" cy="0"/>
+          <a:chOff x="0" y="0"/>
+          <a:chExt cx="0" cy="0"/>
+        </a:xfrm>
+      </p:grpSpPr>
+      <p:sp>
+        <p:nvSpPr>
+          <p:cNvPr id="2" name="Title 1">
+            <a:extLst>
+              <a:ext uri="{FF2B5EF4-FFF2-40B4-BE49-F238E27FC236}">
+                <a16:creationId xmlns:a16="http://schemas.microsoft.com/office/drawing/2014/main" id="{90EAD578-3000-4ECC-8955-4586A64A81B9}"/>
+              </a:ext>
+            </a:extLst>
+          </p:cNvPr>
+          <p:cNvSpPr>
+            <a:spLocks noGrp="1"/>
+          </p:cNvSpPr>
+          <p:nvPr>
+            <p:ph type="title"/>
+          </p:nvPr>
+        </p:nvSpPr>
+        <p:spPr/>
+        <p:txBody>
+          <a:bodyPr/>
+          <a:lstStyle/>
+          <a:p>
+            <a:r>
+              <a:rPr lang="en-US" dirty="0"/>
+              <a:t>Canvas to Viewport </a:t>
+            </a:r>
+          </a:p>
+        </p:txBody>
+      </p:sp>
+      <p:sp>
+        <p:nvSpPr>
+          <p:cNvPr id="4" name="Date Placeholder 3">
+            <a:extLst>
+              <a:ext uri="{FF2B5EF4-FFF2-40B4-BE49-F238E27FC236}">
+                <a16:creationId xmlns:a16="http://schemas.microsoft.com/office/drawing/2014/main" id="{2787BEE0-6464-4517-8DFF-11DC1B991D1F}"/>
+              </a:ext>
+            </a:extLst>
+          </p:cNvPr>
+          <p:cNvSpPr>
+            <a:spLocks noGrp="1"/>
+          </p:cNvSpPr>
+          <p:nvPr>
+            <p:ph type="dt" sz="half" idx="10"/>
+          </p:nvPr>
+        </p:nvSpPr>
+        <p:spPr>
+          <a:xfrm>
+            <a:off x="794559" y="6367884"/>
+            <a:ext cx="2743200" cy="365125"/>
+          </a:xfrm>
+        </p:spPr>
+        <p:txBody>
+          <a:bodyPr/>
+          <a:lstStyle/>
+          <a:p>
+            <a:fld id="{82BCD581-7540-41CB-8BBB-BEC98AE789ED}" type="datetime1">
+              <a:rPr lang="en-US" smtClean="0"/>
+              <a:t>3/17/2021</a:t>
+            </a:fld>
+            <a:endParaRPr lang="en-US" dirty="0"/>
+          </a:p>
+        </p:txBody>
+      </p:sp>
+      <p:sp>
+        <p:nvSpPr>
+          <p:cNvPr id="5" name="Footer Placeholder 4">
+            <a:extLst>
+              <a:ext uri="{FF2B5EF4-FFF2-40B4-BE49-F238E27FC236}">
+                <a16:creationId xmlns:a16="http://schemas.microsoft.com/office/drawing/2014/main" id="{7270B72A-09EF-4DFB-A21A-DEB33EA22253}"/>
+              </a:ext>
+            </a:extLst>
+          </p:cNvPr>
+          <p:cNvSpPr>
+            <a:spLocks noGrp="1"/>
+          </p:cNvSpPr>
+          <p:nvPr>
+            <p:ph type="ftr" sz="quarter" idx="11"/>
+          </p:nvPr>
+        </p:nvSpPr>
+        <p:spPr/>
+        <p:txBody>
+          <a:bodyPr/>
+          <a:lstStyle/>
+          <a:p>
+            <a:r>
+              <a:rPr lang="en-US" dirty="0"/>
+              <a:t>Gambetta, Gabriel. 2021, Computer Graphics from Scratch</a:t>
+            </a:r>
+          </a:p>
+        </p:txBody>
+      </p:sp>
+      <p:sp>
+        <p:nvSpPr>
+          <p:cNvPr id="6" name="Content Placeholder 5">
+            <a:extLst>
+              <a:ext uri="{FF2B5EF4-FFF2-40B4-BE49-F238E27FC236}">
+                <a16:creationId xmlns:a16="http://schemas.microsoft.com/office/drawing/2014/main" id="{97BF2EFA-6295-494D-86C6-45A87ABF0AA7}"/>
+              </a:ext>
+            </a:extLst>
+          </p:cNvPr>
+          <p:cNvSpPr>
+            <a:spLocks noGrp="1"/>
+          </p:cNvSpPr>
+          <p:nvPr>
+            <p:ph idx="1"/>
+          </p:nvPr>
+        </p:nvSpPr>
+        <p:spPr>
+          <a:xfrm>
+            <a:off x="794559" y="2496780"/>
+            <a:ext cx="10464282" cy="3539510"/>
+          </a:xfrm>
+        </p:spPr>
+        <p:txBody>
+          <a:bodyPr>
+            <a:normAutofit/>
+          </a:bodyPr>
+          <a:lstStyle/>
+          <a:p>
+            <a:pPr marL="0" indent="0">
+              <a:buNone/>
+            </a:pPr>
+            <a:r>
+              <a:rPr lang="en-US" dirty="0"/>
+              <a:t>We need to do some translation of coordinates:</a:t>
+            </a:r>
+          </a:p>
+          <a:p>
+            <a:pPr marL="514350" indent="-514350">
+              <a:buFont typeface="+mj-lt"/>
+              <a:buAutoNum type="arabicPeriod"/>
+            </a:pPr>
+            <a:r>
+              <a:rPr lang="en-US" sz="2000" dirty="0">
+                <a:latin typeface="+mj-lt"/>
+              </a:rPr>
+              <a:t>Assume canvas pixel coordinates are (</a:t>
+            </a:r>
+            <a:r>
+              <a:rPr lang="en-US" sz="2000" dirty="0" err="1">
+                <a:latin typeface="+mj-lt"/>
+              </a:rPr>
+              <a:t>Cx</a:t>
+            </a:r>
+            <a:r>
+              <a:rPr lang="en-US" sz="2000" dirty="0">
+                <a:latin typeface="+mj-lt"/>
+              </a:rPr>
+              <a:t>, Cy)</a:t>
+            </a:r>
+          </a:p>
+          <a:p>
+            <a:pPr marL="514350" indent="-514350">
+              <a:buFont typeface="+mj-lt"/>
+              <a:buAutoNum type="arabicPeriod"/>
+            </a:pPr>
+            <a:r>
+              <a:rPr lang="en-US" sz="2000" dirty="0">
+                <a:latin typeface="+mj-lt"/>
+              </a:rPr>
+              <a:t>Viewport’s axes match the orientation of those of the canvas</a:t>
+            </a:r>
+          </a:p>
+          <a:p>
+            <a:pPr marL="514350" indent="-514350">
+              <a:buFont typeface="+mj-lt"/>
+              <a:buAutoNum type="arabicPeriod"/>
+            </a:pPr>
+            <a:r>
+              <a:rPr lang="en-US" sz="2000" dirty="0">
+                <a:latin typeface="+mj-lt"/>
+              </a:rPr>
+              <a:t>Viewport’s center matches the center of the canvas.</a:t>
+            </a:r>
+          </a:p>
+          <a:p>
+            <a:pPr marL="514350" indent="-514350">
+              <a:buFont typeface="+mj-lt"/>
+              <a:buAutoNum type="arabicPeriod"/>
+            </a:pPr>
+            <a:endParaRPr lang="en-US" sz="2000" dirty="0">
+              <a:latin typeface="+mj-lt"/>
+            </a:endParaRPr>
+          </a:p>
+          <a:p>
+            <a:pPr marL="514350" indent="-514350">
+              <a:buFont typeface="+mj-lt"/>
+              <a:buAutoNum type="arabicPeriod"/>
+            </a:pPr>
+            <a:r>
+              <a:rPr lang="en-US" sz="2000" dirty="0">
+                <a:latin typeface="+mj-lt"/>
+              </a:rPr>
+              <a:t>Remember: Constant viewport distance </a:t>
+            </a:r>
+            <a:r>
+              <a:rPr lang="en-US" sz="2000" b="1" i="1" dirty="0">
+                <a:latin typeface="+mj-lt"/>
+              </a:rPr>
+              <a:t>d</a:t>
+            </a:r>
+            <a:r>
+              <a:rPr lang="en-US" sz="2000" dirty="0">
+                <a:latin typeface="+mj-lt"/>
+              </a:rPr>
+              <a:t> from the camera, and </a:t>
+            </a:r>
+            <a:r>
+              <a:rPr lang="en-US" sz="2000" b="1" i="1" dirty="0">
+                <a:latin typeface="+mj-lt"/>
+              </a:rPr>
+              <a:t>z</a:t>
+            </a:r>
+            <a:r>
+              <a:rPr lang="en-US" sz="2000" b="1" dirty="0">
+                <a:latin typeface="+mj-lt"/>
+              </a:rPr>
+              <a:t> </a:t>
+            </a:r>
+            <a:r>
+              <a:rPr lang="en-US" sz="2000" dirty="0">
+                <a:latin typeface="+mj-lt"/>
+              </a:rPr>
+              <a:t>= </a:t>
+            </a:r>
+            <a:r>
+              <a:rPr lang="en-US" sz="2000" b="1" i="1" dirty="0">
+                <a:latin typeface="+mj-lt"/>
+              </a:rPr>
+              <a:t>d</a:t>
+            </a:r>
+            <a:endParaRPr lang="en-US" sz="2400" dirty="0">
+              <a:solidFill>
+                <a:srgbClr val="212529"/>
+              </a:solidFill>
+              <a:latin typeface="+mj-lt"/>
+            </a:endParaRPr>
+          </a:p>
+        </p:txBody>
+      </p:sp>
+      <p:pic>
+        <p:nvPicPr>
+          <p:cNvPr id="7" name="Picture 6">
+            <a:extLst>
+              <a:ext uri="{FF2B5EF4-FFF2-40B4-BE49-F238E27FC236}">
+                <a16:creationId xmlns:a16="http://schemas.microsoft.com/office/drawing/2014/main" id="{035DEA5A-8047-4E05-8C0F-2B94F7D009D9}"/>
+              </a:ext>
+            </a:extLst>
+          </p:cNvPr>
+          <p:cNvPicPr>
+            <a:picLocks noChangeAspect="1"/>
+          </p:cNvPicPr>
+          <p:nvPr/>
+        </p:nvPicPr>
+        <p:blipFill>
+          <a:blip r:embed="rId2">
+            <a:extLst>
+              <a:ext uri="{28A0092B-C50C-407E-A947-70E740481C1C}">
+                <a14:useLocalDpi xmlns:a14="http://schemas.microsoft.com/office/drawing/2010/main" val="0"/>
+              </a:ext>
+            </a:extLst>
+          </a:blip>
+          <a:stretch>
+            <a:fillRect/>
+          </a:stretch>
+        </p:blipFill>
+        <p:spPr>
+          <a:xfrm>
+            <a:off x="1976535" y="1442263"/>
+            <a:ext cx="8698677" cy="888720"/>
+          </a:xfrm>
+          <a:prstGeom prst="rect">
+            <a:avLst/>
+          </a:prstGeom>
+        </p:spPr>
+      </p:pic>
+      <p:cxnSp>
+        <p:nvCxnSpPr>
+          <p:cNvPr id="10" name="Connector: Elbow 9">
+            <a:extLst>
+              <a:ext uri="{FF2B5EF4-FFF2-40B4-BE49-F238E27FC236}">
+                <a16:creationId xmlns:a16="http://schemas.microsoft.com/office/drawing/2014/main" id="{0789D3CA-3826-4AB2-955B-EA435702735C}"/>
+              </a:ext>
+            </a:extLst>
+          </p:cNvPr>
+          <p:cNvCxnSpPr>
+            <a:cxnSpLocks/>
+          </p:cNvCxnSpPr>
+          <p:nvPr/>
+        </p:nvCxnSpPr>
+        <p:spPr>
+          <a:xfrm>
+            <a:off x="1057469" y="1276466"/>
+            <a:ext cx="1219200" cy="610157"/>
+          </a:xfrm>
+          <a:prstGeom prst="bentConnector3">
+            <a:avLst/>
+          </a:prstGeom>
+          <a:ln>
+            <a:tailEnd type="triangle"/>
+          </a:ln>
+        </p:spPr>
+        <p:style>
+          <a:lnRef idx="1">
+            <a:schemeClr val="accent1"/>
+          </a:lnRef>
+          <a:fillRef idx="0">
+            <a:schemeClr val="accent1"/>
+          </a:fillRef>
+          <a:effectRef idx="0">
+            <a:schemeClr val="accent1"/>
+          </a:effectRef>
+          <a:fontRef idx="minor">
+            <a:schemeClr val="tx1"/>
+          </a:fontRef>
+        </p:style>
+      </p:cxnSp>
+      <p:cxnSp>
+        <p:nvCxnSpPr>
+          <p:cNvPr id="13" name="Straight Connector 12">
+            <a:extLst>
+              <a:ext uri="{FF2B5EF4-FFF2-40B4-BE49-F238E27FC236}">
+                <a16:creationId xmlns:a16="http://schemas.microsoft.com/office/drawing/2014/main" id="{A5C9F855-5B4A-49F4-A50A-D8759F64E0E4}"/>
+              </a:ext>
+            </a:extLst>
+          </p:cNvPr>
+          <p:cNvCxnSpPr/>
+          <p:nvPr/>
+        </p:nvCxnSpPr>
+        <p:spPr>
+          <a:xfrm>
+            <a:off x="1667069" y="1276466"/>
+            <a:ext cx="3558074" cy="0"/>
+          </a:xfrm>
+          <a:prstGeom prst="line">
+            <a:avLst/>
+          </a:prstGeom>
+        </p:spPr>
+        <p:style>
+          <a:lnRef idx="1">
+            <a:schemeClr val="accent1"/>
+          </a:lnRef>
+          <a:fillRef idx="0">
+            <a:schemeClr val="accent1"/>
+          </a:fillRef>
+          <a:effectRef idx="0">
+            <a:schemeClr val="accent1"/>
+          </a:effectRef>
+          <a:fontRef idx="minor">
+            <a:schemeClr val="tx1"/>
+          </a:fontRef>
+        </p:style>
+      </p:cxnSp>
+      <p:pic>
+        <p:nvPicPr>
+          <p:cNvPr id="17" name="Picture 16" descr="Text&#10;&#10;Description automatically generated with medium confidence">
+            <a:extLst>
+              <a:ext uri="{FF2B5EF4-FFF2-40B4-BE49-F238E27FC236}">
+                <a16:creationId xmlns:a16="http://schemas.microsoft.com/office/drawing/2014/main" id="{6D5E2C35-527F-4485-AE53-CEB6068A430D}"/>
+              </a:ext>
+            </a:extLst>
+          </p:cNvPr>
+          <p:cNvPicPr>
+            <a:picLocks noChangeAspect="1"/>
+          </p:cNvPicPr>
+          <p:nvPr/>
+        </p:nvPicPr>
+        <p:blipFill>
+          <a:blip r:embed="rId3">
+            <a:extLst>
+              <a:ext uri="{28A0092B-C50C-407E-A947-70E740481C1C}">
+                <a14:useLocalDpi xmlns:a14="http://schemas.microsoft.com/office/drawing/2010/main" val="0"/>
+              </a:ext>
+            </a:extLst>
+          </a:blip>
+          <a:stretch>
+            <a:fillRect/>
+          </a:stretch>
+        </p:blipFill>
+        <p:spPr>
+          <a:xfrm>
+            <a:off x="8426111" y="2985796"/>
+            <a:ext cx="1919771" cy="1397230"/>
+          </a:xfrm>
+          <a:prstGeom prst="rect">
+            <a:avLst/>
+          </a:prstGeom>
+        </p:spPr>
+      </p:pic>
+      <p:sp>
+        <p:nvSpPr>
+          <p:cNvPr id="23" name="Right Brace 22">
+            <a:extLst>
+              <a:ext uri="{FF2B5EF4-FFF2-40B4-BE49-F238E27FC236}">
+                <a16:creationId xmlns:a16="http://schemas.microsoft.com/office/drawing/2014/main" id="{3128F5DF-7376-469A-91FD-D57AADA5212D}"/>
+              </a:ext>
+            </a:extLst>
+          </p:cNvPr>
+          <p:cNvSpPr/>
+          <p:nvPr/>
+        </p:nvSpPr>
+        <p:spPr>
+          <a:xfrm>
+            <a:off x="7850155" y="2985796"/>
+            <a:ext cx="684245" cy="1287624"/>
+          </a:xfrm>
+          <a:prstGeom prst="rightBrace">
+            <a:avLst/>
+          </a:prstGeom>
+        </p:spPr>
+        <p:style>
+          <a:lnRef idx="1">
+            <a:schemeClr val="accent1"/>
+          </a:lnRef>
+          <a:fillRef idx="0">
+            <a:schemeClr val="accent1"/>
+          </a:fillRef>
+          <a:effectRef idx="0">
+            <a:schemeClr val="accent1"/>
+          </a:effectRef>
+          <a:fontRef idx="minor">
+            <a:schemeClr val="tx1"/>
+          </a:fontRef>
+        </p:style>
+        <p:txBody>
+          <a:bodyPr rtlCol="0" anchor="ctr"/>
+          <a:lstStyle/>
+          <a:p>
+            <a:pPr algn="ctr"/>
+            <a:endParaRPr lang="en-US"/>
+          </a:p>
+        </p:txBody>
+      </p:sp>
+      <p:pic>
+        <p:nvPicPr>
+          <p:cNvPr id="25" name="Picture 24">
+            <a:extLst>
+              <a:ext uri="{FF2B5EF4-FFF2-40B4-BE49-F238E27FC236}">
+                <a16:creationId xmlns:a16="http://schemas.microsoft.com/office/drawing/2014/main" id="{D140EFEA-6EF5-4472-BDE4-B137166AC70C}"/>
+              </a:ext>
+            </a:extLst>
+          </p:cNvPr>
+          <p:cNvPicPr>
+            <a:picLocks noChangeAspect="1"/>
+          </p:cNvPicPr>
+          <p:nvPr/>
+        </p:nvPicPr>
+        <p:blipFill>
+          <a:blip r:embed="rId4">
+            <a:extLst>
+              <a:ext uri="{28A0092B-C50C-407E-A947-70E740481C1C}">
+                <a14:useLocalDpi xmlns:a14="http://schemas.microsoft.com/office/drawing/2010/main" val="0"/>
+              </a:ext>
+            </a:extLst>
+          </a:blip>
+          <a:stretch>
+            <a:fillRect/>
+          </a:stretch>
+        </p:blipFill>
+        <p:spPr>
+          <a:xfrm>
+            <a:off x="9193895" y="4896261"/>
+            <a:ext cx="895475" cy="447737"/>
+          </a:xfrm>
+          <a:prstGeom prst="rect">
+            <a:avLst/>
+          </a:prstGeom>
+        </p:spPr>
+      </p:pic>
+      <p:cxnSp>
+        <p:nvCxnSpPr>
+          <p:cNvPr id="29" name="Connector: Elbow 28">
+            <a:extLst>
+              <a:ext uri="{FF2B5EF4-FFF2-40B4-BE49-F238E27FC236}">
+                <a16:creationId xmlns:a16="http://schemas.microsoft.com/office/drawing/2014/main" id="{DF0361A9-EFDE-475C-83D5-6D975D2943D2}"/>
+              </a:ext>
+            </a:extLst>
+          </p:cNvPr>
+          <p:cNvCxnSpPr>
+            <a:cxnSpLocks/>
+          </p:cNvCxnSpPr>
+          <p:nvPr/>
+        </p:nvCxnSpPr>
+        <p:spPr>
+          <a:xfrm>
+            <a:off x="8534400" y="4831424"/>
+            <a:ext cx="659495" cy="248088"/>
+          </a:xfrm>
+          <a:prstGeom prst="bentConnector3">
+            <a:avLst/>
+          </a:prstGeom>
+          <a:ln>
+            <a:tailEnd type="triangle"/>
+          </a:ln>
+        </p:spPr>
+        <p:style>
+          <a:lnRef idx="1">
+            <a:schemeClr val="accent1"/>
+          </a:lnRef>
+          <a:fillRef idx="0">
+            <a:schemeClr val="accent1"/>
+          </a:fillRef>
+          <a:effectRef idx="0">
+            <a:schemeClr val="accent1"/>
+          </a:effectRef>
+          <a:fontRef idx="minor">
+            <a:schemeClr val="tx1"/>
+          </a:fontRef>
+        </p:style>
+      </p:cxnSp>
+    </p:spTree>
+    <p:extLst>
+      <p:ext uri="{BB962C8B-B14F-4D97-AF65-F5344CB8AC3E}">
+        <p14:creationId xmlns:p14="http://schemas.microsoft.com/office/powerpoint/2010/main" val="665897640"/>
+      </p:ext>
+    </p:extLst>
+  </p:cSld>
+  <p:clrMapOvr>
+    <a:masterClrMapping/>
+  </p:clrMapOvr>
+</p:sld>
+</file>
+
+<file path=ppt/slides/slide8.xml><?xml version="1.0" encoding="utf-8"?>
+<p:sld xmlns:a="http://schemas.openxmlformats.org/drawingml/2006/main" xmlns:r="http://schemas.openxmlformats.org/officeDocument/2006/relationships" xmlns:p="http://schemas.openxmlformats.org/presentationml/2006/main">
+  <p:cSld>
+    <p:spTree>
+      <p:nvGrpSpPr>
+        <p:cNvPr id="1" name=""/>
+        <p:cNvGrpSpPr/>
+        <p:nvPr/>
+      </p:nvGrpSpPr>
+      <p:grpSpPr>
+        <a:xfrm>
+          <a:off x="0" y="0"/>
+          <a:ext cx="0" cy="0"/>
+          <a:chOff x="0" y="0"/>
+          <a:chExt cx="0" cy="0"/>
+        </a:xfrm>
+      </p:grpSpPr>
+      <p:sp>
+        <p:nvSpPr>
+          <p:cNvPr id="2" name="Title 1">
+            <a:extLst>
+              <a:ext uri="{FF2B5EF4-FFF2-40B4-BE49-F238E27FC236}">
+                <a16:creationId xmlns:a16="http://schemas.microsoft.com/office/drawing/2014/main" id="{90EAD578-3000-4ECC-8955-4586A64A81B9}"/>
+              </a:ext>
+            </a:extLst>
+          </p:cNvPr>
+          <p:cNvSpPr>
+            <a:spLocks noGrp="1"/>
+          </p:cNvSpPr>
+          <p:nvPr>
+            <p:ph type="title"/>
+          </p:nvPr>
+        </p:nvSpPr>
+        <p:spPr/>
+        <p:txBody>
+          <a:bodyPr/>
+          <a:lstStyle/>
+          <a:p>
+            <a:r>
+              <a:rPr lang="en-US" dirty="0"/>
+              <a:t>Tracing Rays</a:t>
+            </a:r>
+          </a:p>
+        </p:txBody>
+      </p:sp>
+      <p:sp>
+        <p:nvSpPr>
+          <p:cNvPr id="4" name="Date Placeholder 3">
+            <a:extLst>
+              <a:ext uri="{FF2B5EF4-FFF2-40B4-BE49-F238E27FC236}">
+                <a16:creationId xmlns:a16="http://schemas.microsoft.com/office/drawing/2014/main" id="{2787BEE0-6464-4517-8DFF-11DC1B991D1F}"/>
+              </a:ext>
+            </a:extLst>
+          </p:cNvPr>
+          <p:cNvSpPr>
+            <a:spLocks noGrp="1"/>
+          </p:cNvSpPr>
+          <p:nvPr>
+            <p:ph type="dt" sz="half" idx="10"/>
+          </p:nvPr>
+        </p:nvSpPr>
+        <p:spPr>
+          <a:xfrm>
+            <a:off x="794559" y="6367884"/>
+            <a:ext cx="2743200" cy="365125"/>
+          </a:xfrm>
+        </p:spPr>
+        <p:txBody>
+          <a:bodyPr/>
+          <a:lstStyle/>
+          <a:p>
+            <a:fld id="{82BCD581-7540-41CB-8BBB-BEC98AE789ED}" type="datetime1">
+              <a:rPr lang="en-US" smtClean="0"/>
+              <a:t>3/17/2021</a:t>
+            </a:fld>
+            <a:endParaRPr lang="en-US" dirty="0"/>
+          </a:p>
+        </p:txBody>
+      </p:sp>
+      <p:sp>
+        <p:nvSpPr>
+          <p:cNvPr id="5" name="Footer Placeholder 4">
+            <a:extLst>
+              <a:ext uri="{FF2B5EF4-FFF2-40B4-BE49-F238E27FC236}">
+                <a16:creationId xmlns:a16="http://schemas.microsoft.com/office/drawing/2014/main" id="{7270B72A-09EF-4DFB-A21A-DEB33EA22253}"/>
+              </a:ext>
+            </a:extLst>
+          </p:cNvPr>
+          <p:cNvSpPr>
+            <a:spLocks noGrp="1"/>
+          </p:cNvSpPr>
+          <p:nvPr>
+            <p:ph type="ftr" sz="quarter" idx="11"/>
+          </p:nvPr>
+        </p:nvSpPr>
+        <p:spPr/>
+        <p:txBody>
+          <a:bodyPr/>
+          <a:lstStyle/>
+          <a:p>
+            <a:r>
+              <a:rPr lang="en-US" dirty="0"/>
+              <a:t>Gambetta, Gabriel. 2021, Computer Graphics from Scratch</a:t>
+            </a:r>
+          </a:p>
+        </p:txBody>
+      </p:sp>
+      <p:sp>
+        <p:nvSpPr>
+          <p:cNvPr id="6" name="Content Placeholder 5">
+            <a:extLst>
+              <a:ext uri="{FF2B5EF4-FFF2-40B4-BE49-F238E27FC236}">
+                <a16:creationId xmlns:a16="http://schemas.microsoft.com/office/drawing/2014/main" id="{97BF2EFA-6295-494D-86C6-45A87ABF0AA7}"/>
+              </a:ext>
+            </a:extLst>
+          </p:cNvPr>
+          <p:cNvSpPr>
+            <a:spLocks noGrp="1"/>
+          </p:cNvSpPr>
+          <p:nvPr>
+            <p:ph idx="1"/>
+          </p:nvPr>
+        </p:nvSpPr>
+        <p:spPr>
+          <a:xfrm>
+            <a:off x="794559" y="2496780"/>
+            <a:ext cx="10464282" cy="3539510"/>
+          </a:xfrm>
+        </p:spPr>
+        <p:txBody>
+          <a:bodyPr>
+            <a:normAutofit/>
+          </a:bodyPr>
+          <a:lstStyle/>
+          <a:p>
+            <a:pPr marL="0" indent="0">
+              <a:buNone/>
+            </a:pPr>
+            <a:r>
+              <a:rPr lang="en-US" dirty="0"/>
+              <a:t>What color does the camera perceive each pixel?</a:t>
+            </a:r>
+          </a:p>
+          <a:p>
+            <a:pPr marL="514350" indent="-514350">
+              <a:buFont typeface="+mj-lt"/>
+              <a:buAutoNum type="arabicPeriod"/>
+            </a:pPr>
+            <a:r>
+              <a:rPr lang="en-US" sz="2000" dirty="0">
+                <a:latin typeface="+mj-lt"/>
+              </a:rPr>
+              <a:t>Note that simulating every possible photon’s path to simulate real light bouncing off our objects would be extremely time consuming and processor intensive. (Photon Mapping).</a:t>
+            </a:r>
+          </a:p>
+          <a:p>
+            <a:pPr marL="514350" indent="-514350">
+              <a:buFont typeface="+mj-lt"/>
+              <a:buAutoNum type="arabicPeriod"/>
+            </a:pPr>
+            <a:r>
+              <a:rPr lang="en-US" sz="2000" dirty="0">
+                <a:latin typeface="+mj-lt"/>
+              </a:rPr>
+              <a:t>Instead we use “Ray Tracing” which is essentially just tracing rays of light from our camera source to it’s contact with the objects in our scene. </a:t>
+            </a:r>
+          </a:p>
+          <a:p>
+            <a:pPr marL="514350" indent="-514350">
+              <a:buFont typeface="+mj-lt"/>
+              <a:buAutoNum type="arabicPeriod"/>
+            </a:pPr>
+            <a:endParaRPr lang="en-US" sz="2000" dirty="0">
+              <a:latin typeface="+mj-lt"/>
+            </a:endParaRPr>
+          </a:p>
+          <a:p>
+            <a:pPr marL="514350" indent="-514350">
+              <a:buFont typeface="+mj-lt"/>
+              <a:buAutoNum type="arabicPeriod"/>
+            </a:pPr>
+            <a:endParaRPr lang="en-US" sz="2000" dirty="0">
+              <a:latin typeface="+mj-lt"/>
+            </a:endParaRPr>
+          </a:p>
+        </p:txBody>
+      </p:sp>
+      <p:pic>
+        <p:nvPicPr>
+          <p:cNvPr id="7" name="Picture 6">
+            <a:extLst>
+              <a:ext uri="{FF2B5EF4-FFF2-40B4-BE49-F238E27FC236}">
+                <a16:creationId xmlns:a16="http://schemas.microsoft.com/office/drawing/2014/main" id="{035DEA5A-8047-4E05-8C0F-2B94F7D009D9}"/>
+              </a:ext>
+            </a:extLst>
+          </p:cNvPr>
+          <p:cNvPicPr>
+            <a:picLocks noChangeAspect="1"/>
+          </p:cNvPicPr>
+          <p:nvPr/>
+        </p:nvPicPr>
+        <p:blipFill>
+          <a:blip r:embed="rId2">
+            <a:extLst>
+              <a:ext uri="{28A0092B-C50C-407E-A947-70E740481C1C}">
+                <a14:useLocalDpi xmlns:a14="http://schemas.microsoft.com/office/drawing/2010/main" val="0"/>
+              </a:ext>
+            </a:extLst>
+          </a:blip>
+          <a:stretch>
+            <a:fillRect/>
+          </a:stretch>
+        </p:blipFill>
+        <p:spPr>
+          <a:xfrm>
+            <a:off x="1976535" y="1442263"/>
+            <a:ext cx="8698677" cy="888720"/>
+          </a:xfrm>
+          <a:prstGeom prst="rect">
+            <a:avLst/>
+          </a:prstGeom>
+        </p:spPr>
+      </p:pic>
+      <p:cxnSp>
+        <p:nvCxnSpPr>
+          <p:cNvPr id="10" name="Connector: Elbow 9">
+            <a:extLst>
+              <a:ext uri="{FF2B5EF4-FFF2-40B4-BE49-F238E27FC236}">
+                <a16:creationId xmlns:a16="http://schemas.microsoft.com/office/drawing/2014/main" id="{0789D3CA-3826-4AB2-955B-EA435702735C}"/>
+              </a:ext>
+            </a:extLst>
+          </p:cNvPr>
+          <p:cNvCxnSpPr>
+            <a:cxnSpLocks/>
+          </p:cNvCxnSpPr>
+          <p:nvPr/>
+        </p:nvCxnSpPr>
+        <p:spPr>
+          <a:xfrm>
+            <a:off x="1057469" y="1276466"/>
+            <a:ext cx="1219200" cy="751387"/>
+          </a:xfrm>
+          <a:prstGeom prst="bentConnector3">
+            <a:avLst/>
+          </a:prstGeom>
+          <a:ln>
+            <a:tailEnd type="triangle"/>
+          </a:ln>
+        </p:spPr>
+        <p:style>
+          <a:lnRef idx="1">
+            <a:schemeClr val="accent1"/>
+          </a:lnRef>
+          <a:fillRef idx="0">
+            <a:schemeClr val="accent1"/>
+          </a:fillRef>
+          <a:effectRef idx="0">
+            <a:schemeClr val="accent1"/>
+          </a:effectRef>
+          <a:fontRef idx="minor">
+            <a:schemeClr val="tx1"/>
+          </a:fontRef>
+        </p:style>
+      </p:cxnSp>
+      <p:cxnSp>
+        <p:nvCxnSpPr>
+          <p:cNvPr id="13" name="Straight Connector 12">
+            <a:extLst>
+              <a:ext uri="{FF2B5EF4-FFF2-40B4-BE49-F238E27FC236}">
+                <a16:creationId xmlns:a16="http://schemas.microsoft.com/office/drawing/2014/main" id="{A5C9F855-5B4A-49F4-A50A-D8759F64E0E4}"/>
+              </a:ext>
+            </a:extLst>
+          </p:cNvPr>
+          <p:cNvCxnSpPr/>
+          <p:nvPr/>
+        </p:nvCxnSpPr>
+        <p:spPr>
+          <a:xfrm>
+            <a:off x="1667069" y="1276466"/>
+            <a:ext cx="3558074" cy="0"/>
+          </a:xfrm>
+          <a:prstGeom prst="line">
+            <a:avLst/>
+          </a:prstGeom>
+        </p:spPr>
+        <p:style>
+          <a:lnRef idx="1">
+            <a:schemeClr val="accent1"/>
+          </a:lnRef>
+          <a:fillRef idx="0">
+            <a:schemeClr val="accent1"/>
+          </a:fillRef>
+          <a:effectRef idx="0">
+            <a:schemeClr val="accent1"/>
+          </a:effectRef>
+          <a:fontRef idx="minor">
+            <a:schemeClr val="tx1"/>
+          </a:fontRef>
+        </p:style>
+      </p:cxnSp>
+      <p:pic>
+        <p:nvPicPr>
+          <p:cNvPr id="12" name="Picture 11" descr="Diagram&#10;&#10;Description automatically generated">
+            <a:extLst>
+              <a:ext uri="{FF2B5EF4-FFF2-40B4-BE49-F238E27FC236}">
+                <a16:creationId xmlns:a16="http://schemas.microsoft.com/office/drawing/2014/main" id="{02A002AD-36BF-4097-8A8F-E45C15FE2BC8}"/>
+              </a:ext>
+            </a:extLst>
+          </p:cNvPr>
+          <p:cNvPicPr>
+            <a:picLocks noChangeAspect="1"/>
+          </p:cNvPicPr>
+          <p:nvPr/>
+        </p:nvPicPr>
+        <p:blipFill>
+          <a:blip r:embed="rId3">
+            <a:extLst>
+              <a:ext uri="{28A0092B-C50C-407E-A947-70E740481C1C}">
+                <a14:useLocalDpi xmlns:a14="http://schemas.microsoft.com/office/drawing/2010/main" val="0"/>
+              </a:ext>
+            </a:extLst>
+          </a:blip>
+          <a:stretch>
+            <a:fillRect/>
+          </a:stretch>
+        </p:blipFill>
+        <p:spPr>
+          <a:xfrm>
+            <a:off x="9004613" y="4150923"/>
+            <a:ext cx="2005509" cy="1701377"/>
+          </a:xfrm>
+          <a:prstGeom prst="rect">
+            <a:avLst/>
+          </a:prstGeom>
+        </p:spPr>
+      </p:pic>
+      <p:cxnSp>
+        <p:nvCxnSpPr>
+          <p:cNvPr id="15" name="Connector: Elbow 14">
+            <a:extLst>
+              <a:ext uri="{FF2B5EF4-FFF2-40B4-BE49-F238E27FC236}">
+                <a16:creationId xmlns:a16="http://schemas.microsoft.com/office/drawing/2014/main" id="{5DBA4F2E-72F8-4141-9D6E-2AA1E3971C3B}"/>
+              </a:ext>
+            </a:extLst>
+          </p:cNvPr>
+          <p:cNvCxnSpPr/>
+          <p:nvPr/>
+        </p:nvCxnSpPr>
+        <p:spPr>
+          <a:xfrm>
+            <a:off x="6668278" y="4150923"/>
+            <a:ext cx="2264228" cy="769420"/>
+          </a:xfrm>
+          <a:prstGeom prst="bentConnector3">
+            <a:avLst/>
+          </a:prstGeom>
+          <a:ln>
+            <a:tailEnd type="triangle"/>
+          </a:ln>
+        </p:spPr>
+        <p:style>
+          <a:lnRef idx="1">
+            <a:schemeClr val="accent1"/>
+          </a:lnRef>
+          <a:fillRef idx="0">
+            <a:schemeClr val="accent1"/>
+          </a:fillRef>
+          <a:effectRef idx="0">
+            <a:schemeClr val="accent1"/>
+          </a:effectRef>
+          <a:fontRef idx="minor">
+            <a:schemeClr val="tx1"/>
+          </a:fontRef>
+        </p:style>
+      </p:cxnSp>
+    </p:spTree>
+    <p:extLst>
+      <p:ext uri="{BB962C8B-B14F-4D97-AF65-F5344CB8AC3E}">
+        <p14:creationId xmlns:p14="http://schemas.microsoft.com/office/powerpoint/2010/main" val="3704284916"/>
+      </p:ext>
+    </p:extLst>
+  </p:cSld>
+  <p:clrMapOvr>
+    <a:masterClrMapping/>
+  </p:clrMapOvr>
+</p:sld>
+</file>
+
+<file path=ppt/slides/slide9.xml><?xml version="1.0" encoding="utf-8"?>
+<p:sld xmlns:a="http://schemas.openxmlformats.org/drawingml/2006/main" xmlns:r="http://schemas.openxmlformats.org/officeDocument/2006/relationships" xmlns:p="http://schemas.openxmlformats.org/presentationml/2006/main">
+  <p:cSld>
+    <p:spTree>
+      <p:nvGrpSpPr>
+        <p:cNvPr id="1" name=""/>
+        <p:cNvGrpSpPr/>
+        <p:nvPr/>
+      </p:nvGrpSpPr>
+      <p:grpSpPr>
+        <a:xfrm>
+          <a:off x="0" y="0"/>
+          <a:ext cx="0" cy="0"/>
+          <a:chOff x="0" y="0"/>
+          <a:chExt cx="0" cy="0"/>
+        </a:xfrm>
+      </p:grpSpPr>
+      <p:sp>
+        <p:nvSpPr>
+          <p:cNvPr id="2" name="Title 1">
+            <a:extLst>
+              <a:ext uri="{FF2B5EF4-FFF2-40B4-BE49-F238E27FC236}">
+                <a16:creationId xmlns:a16="http://schemas.microsoft.com/office/drawing/2014/main" id="{90EAD578-3000-4ECC-8955-4586A64A81B9}"/>
+              </a:ext>
+            </a:extLst>
+          </p:cNvPr>
+          <p:cNvSpPr>
+            <a:spLocks noGrp="1"/>
+          </p:cNvSpPr>
+          <p:nvPr>
+            <p:ph type="title"/>
+          </p:nvPr>
+        </p:nvSpPr>
+        <p:spPr/>
+        <p:txBody>
+          <a:bodyPr/>
+          <a:lstStyle/>
+          <a:p>
+            <a:r>
+              <a:rPr lang="en-US" dirty="0"/>
+              <a:t>The Ray Equation</a:t>
+            </a:r>
+          </a:p>
+        </p:txBody>
+      </p:sp>
+      <p:sp>
+        <p:nvSpPr>
+          <p:cNvPr id="4" name="Date Placeholder 3">
+            <a:extLst>
+              <a:ext uri="{FF2B5EF4-FFF2-40B4-BE49-F238E27FC236}">
+                <a16:creationId xmlns:a16="http://schemas.microsoft.com/office/drawing/2014/main" id="{2787BEE0-6464-4517-8DFF-11DC1B991D1F}"/>
+              </a:ext>
+            </a:extLst>
+          </p:cNvPr>
+          <p:cNvSpPr>
+            <a:spLocks noGrp="1"/>
+          </p:cNvSpPr>
+          <p:nvPr>
+            <p:ph type="dt" sz="half" idx="10"/>
+          </p:nvPr>
+        </p:nvSpPr>
+        <p:spPr>
+          <a:xfrm>
+            <a:off x="794559" y="6367884"/>
+            <a:ext cx="2743200" cy="365125"/>
+          </a:xfrm>
+        </p:spPr>
+        <p:txBody>
+          <a:bodyPr/>
+          <a:lstStyle/>
+          <a:p>
+            <a:fld id="{82BCD581-7540-41CB-8BBB-BEC98AE789ED}" type="datetime1">
+              <a:rPr lang="en-US" smtClean="0"/>
+              <a:t>3/17/2021</a:t>
+            </a:fld>
+            <a:endParaRPr lang="en-US" dirty="0"/>
+          </a:p>
+        </p:txBody>
+      </p:sp>
+      <p:sp>
+        <p:nvSpPr>
+          <p:cNvPr id="5" name="Footer Placeholder 4">
+            <a:extLst>
+              <a:ext uri="{FF2B5EF4-FFF2-40B4-BE49-F238E27FC236}">
+                <a16:creationId xmlns:a16="http://schemas.microsoft.com/office/drawing/2014/main" id="{7270B72A-09EF-4DFB-A21A-DEB33EA22253}"/>
+              </a:ext>
+            </a:extLst>
+          </p:cNvPr>
+          <p:cNvSpPr>
+            <a:spLocks noGrp="1"/>
+          </p:cNvSpPr>
+          <p:nvPr>
+            <p:ph type="ftr" sz="quarter" idx="11"/>
+          </p:nvPr>
+        </p:nvSpPr>
+        <p:spPr/>
+        <p:txBody>
+          <a:bodyPr/>
+          <a:lstStyle/>
+          <a:p>
+            <a:r>
+              <a:rPr lang="en-US" dirty="0"/>
+              <a:t>Gambetta, Gabriel. 2021, Computer Graphics from Scratch</a:t>
+            </a:r>
+          </a:p>
+        </p:txBody>
+      </p:sp>
+      <p:sp>
+        <p:nvSpPr>
+          <p:cNvPr id="6" name="Content Placeholder 5">
+            <a:extLst>
+              <a:ext uri="{FF2B5EF4-FFF2-40B4-BE49-F238E27FC236}">
+                <a16:creationId xmlns:a16="http://schemas.microsoft.com/office/drawing/2014/main" id="{97BF2EFA-6295-494D-86C6-45A87ABF0AA7}"/>
+              </a:ext>
+            </a:extLst>
+          </p:cNvPr>
+          <p:cNvSpPr>
+            <a:spLocks noGrp="1"/>
+          </p:cNvSpPr>
+          <p:nvPr>
+            <p:ph idx="1"/>
+          </p:nvPr>
+        </p:nvSpPr>
+        <p:spPr>
+          <a:xfrm>
+            <a:off x="838200" y="1690688"/>
+            <a:ext cx="10464282" cy="3539510"/>
+          </a:xfrm>
+        </p:spPr>
+        <p:txBody>
+          <a:bodyPr>
+            <a:normAutofit/>
+          </a:bodyPr>
+          <a:lstStyle/>
+          <a:p>
+            <a:pPr marL="0" indent="0">
+              <a:buNone/>
+            </a:pPr>
+            <a:r>
+              <a:rPr lang="en-US" sz="2000" b="1" dirty="0">
+                <a:latin typeface="+mj-lt"/>
+              </a:rPr>
+              <a:t>To determine our “Ray” we use the parametric equation</a:t>
+            </a:r>
+          </a:p>
+          <a:p>
+            <a:pPr marL="457200" indent="-457200">
+              <a:buFont typeface="+mj-lt"/>
+              <a:buAutoNum type="arabicPeriod"/>
+            </a:pPr>
+            <a:r>
+              <a:rPr lang="en-US" sz="2000" dirty="0">
+                <a:latin typeface="+mj-lt"/>
+              </a:rPr>
+              <a:t>We start our ray at the origin (O) and “advance” along the direction of the ray (V-O) to it’s contact point (V). This will include all points (t) along the ray: </a:t>
+            </a:r>
+          </a:p>
+          <a:p>
+            <a:pPr marL="457200" indent="-457200">
+              <a:buFont typeface="+mj-lt"/>
+              <a:buAutoNum type="arabicPeriod"/>
+            </a:pPr>
+            <a:endParaRPr lang="en-US" sz="2000" dirty="0">
+              <a:latin typeface="+mj-lt"/>
+            </a:endParaRPr>
+          </a:p>
+          <a:p>
+            <a:pPr marL="457200" indent="-457200">
+              <a:buFont typeface="+mj-lt"/>
+              <a:buAutoNum type="arabicPeriod"/>
+            </a:pPr>
+            <a:endParaRPr lang="en-US" sz="2000" dirty="0">
+              <a:latin typeface="+mj-lt"/>
+            </a:endParaRPr>
+          </a:p>
+          <a:p>
+            <a:pPr marL="0" indent="0">
+              <a:buNone/>
+            </a:pPr>
+            <a:r>
+              <a:rPr lang="en-US" sz="2000" dirty="0">
+                <a:latin typeface="+mj-lt"/>
+              </a:rPr>
+              <a:t>For example:</a:t>
+            </a:r>
+          </a:p>
+          <a:p>
+            <a:pPr marL="457200" indent="-457200">
+              <a:buFont typeface="+mj-lt"/>
+              <a:buAutoNum type="arabicPeriod"/>
+            </a:pPr>
+            <a:endParaRPr lang="en-US" sz="2000" dirty="0">
+              <a:latin typeface="+mj-lt"/>
+            </a:endParaRPr>
+          </a:p>
+          <a:p>
+            <a:pPr marL="457200" indent="-457200">
+              <a:buFont typeface="+mj-lt"/>
+              <a:buAutoNum type="arabicPeriod"/>
+            </a:pPr>
+            <a:endParaRPr lang="en-US" sz="2000" dirty="0">
+              <a:latin typeface="+mj-lt"/>
+            </a:endParaRPr>
+          </a:p>
+          <a:p>
+            <a:pPr marL="0" indent="0">
+              <a:buNone/>
+            </a:pPr>
+            <a:endParaRPr lang="en-US" sz="1600" dirty="0">
+              <a:latin typeface="+mj-lt"/>
+            </a:endParaRPr>
+          </a:p>
+          <a:p>
+            <a:pPr marL="514350" indent="-514350">
+              <a:buFont typeface="+mj-lt"/>
+              <a:buAutoNum type="arabicPeriod"/>
+            </a:pPr>
+            <a:endParaRPr lang="en-US" sz="2000" dirty="0">
+              <a:latin typeface="+mj-lt"/>
+            </a:endParaRPr>
+          </a:p>
+        </p:txBody>
+      </p:sp>
+      <p:pic>
+        <p:nvPicPr>
+          <p:cNvPr id="16" name="Picture 15">
+            <a:extLst>
+              <a:ext uri="{FF2B5EF4-FFF2-40B4-BE49-F238E27FC236}">
+                <a16:creationId xmlns:a16="http://schemas.microsoft.com/office/drawing/2014/main" id="{FB0434C0-333F-4499-BFBE-DB18B2EBE9C4}"/>
+              </a:ext>
+            </a:extLst>
+          </p:cNvPr>
+          <p:cNvPicPr>
+            <a:picLocks noChangeAspect="1"/>
+          </p:cNvPicPr>
+          <p:nvPr/>
+        </p:nvPicPr>
+        <p:blipFill>
+          <a:blip r:embed="rId2">
+            <a:extLst>
+              <a:ext uri="{28A0092B-C50C-407E-A947-70E740481C1C}">
+                <a14:useLocalDpi xmlns:a14="http://schemas.microsoft.com/office/drawing/2010/main" val="0"/>
+              </a:ext>
+            </a:extLst>
+          </a:blip>
+          <a:stretch>
+            <a:fillRect/>
+          </a:stretch>
+        </p:blipFill>
+        <p:spPr>
+          <a:xfrm>
+            <a:off x="4155149" y="2934006"/>
+            <a:ext cx="1676634" cy="371527"/>
+          </a:xfrm>
+          <a:prstGeom prst="rect">
+            <a:avLst/>
+          </a:prstGeom>
+        </p:spPr>
+      </p:pic>
+      <p:cxnSp>
+        <p:nvCxnSpPr>
+          <p:cNvPr id="18" name="Straight Arrow Connector 17">
+            <a:extLst>
+              <a:ext uri="{FF2B5EF4-FFF2-40B4-BE49-F238E27FC236}">
+                <a16:creationId xmlns:a16="http://schemas.microsoft.com/office/drawing/2014/main" id="{6E7CCF47-3C00-4AE5-9E82-5CCD280AA7FA}"/>
+              </a:ext>
+            </a:extLst>
+          </p:cNvPr>
+          <p:cNvCxnSpPr/>
+          <p:nvPr/>
+        </p:nvCxnSpPr>
+        <p:spPr>
+          <a:xfrm>
+            <a:off x="5950163" y="3119769"/>
+            <a:ext cx="820109" cy="0"/>
+          </a:xfrm>
+          <a:prstGeom prst="straightConnector1">
+            <a:avLst/>
+          </a:prstGeom>
+          <a:ln>
+            <a:tailEnd type="triangle"/>
+          </a:ln>
+        </p:spPr>
+        <p:style>
+          <a:lnRef idx="1">
+            <a:schemeClr val="accent1"/>
+          </a:lnRef>
+          <a:fillRef idx="0">
+            <a:schemeClr val="accent1"/>
+          </a:fillRef>
+          <a:effectRef idx="0">
+            <a:schemeClr val="accent1"/>
+          </a:effectRef>
+          <a:fontRef idx="minor">
+            <a:schemeClr val="tx1"/>
+          </a:fontRef>
+        </p:style>
+      </p:cxnSp>
+      <p:pic>
+        <p:nvPicPr>
+          <p:cNvPr id="22" name="Picture 21">
+            <a:extLst>
+              <a:ext uri="{FF2B5EF4-FFF2-40B4-BE49-F238E27FC236}">
+                <a16:creationId xmlns:a16="http://schemas.microsoft.com/office/drawing/2014/main" id="{411DCFBA-2CA4-4308-AD51-1944C9B2A1FE}"/>
+              </a:ext>
+            </a:extLst>
+          </p:cNvPr>
+          <p:cNvPicPr>
+            <a:picLocks noChangeAspect="1"/>
+          </p:cNvPicPr>
+          <p:nvPr/>
+        </p:nvPicPr>
+        <p:blipFill>
+          <a:blip r:embed="rId3">
+            <a:extLst>
+              <a:ext uri="{28A0092B-C50C-407E-A947-70E740481C1C}">
+                <a14:useLocalDpi xmlns:a14="http://schemas.microsoft.com/office/drawing/2010/main" val="0"/>
+              </a:ext>
+            </a:extLst>
+          </a:blip>
+          <a:stretch>
+            <a:fillRect/>
+          </a:stretch>
+        </p:blipFill>
+        <p:spPr>
+          <a:xfrm>
+            <a:off x="7175092" y="2891137"/>
+            <a:ext cx="1086002" cy="457264"/>
+          </a:xfrm>
+          <a:prstGeom prst="rect">
+            <a:avLst/>
+          </a:prstGeom>
+        </p:spPr>
+      </p:pic>
+      <p:pic>
+        <p:nvPicPr>
+          <p:cNvPr id="24" name="Picture 23" descr="Table&#10;&#10;Description automatically generated with low confidence">
+            <a:extLst>
+              <a:ext uri="{FF2B5EF4-FFF2-40B4-BE49-F238E27FC236}">
+                <a16:creationId xmlns:a16="http://schemas.microsoft.com/office/drawing/2014/main" id="{6F522FCD-227E-4891-BCCD-CF4B3B8C10C3}"/>
+              </a:ext>
+            </a:extLst>
+          </p:cNvPr>
+          <p:cNvPicPr>
+            <a:picLocks noChangeAspect="1"/>
+          </p:cNvPicPr>
+          <p:nvPr/>
+        </p:nvPicPr>
+        <p:blipFill>
+          <a:blip r:embed="rId4">
+            <a:extLst>
+              <a:ext uri="{28A0092B-C50C-407E-A947-70E740481C1C}">
+                <a14:useLocalDpi xmlns:a14="http://schemas.microsoft.com/office/drawing/2010/main" val="0"/>
+              </a:ext>
+            </a:extLst>
+          </a:blip>
+          <a:stretch>
+            <a:fillRect/>
+          </a:stretch>
+        </p:blipFill>
+        <p:spPr>
+          <a:xfrm>
+            <a:off x="2451520" y="3460443"/>
+            <a:ext cx="5439534" cy="1952898"/>
+          </a:xfrm>
+          <a:prstGeom prst="rect">
+            <a:avLst/>
+          </a:prstGeom>
+        </p:spPr>
+      </p:pic>
+    </p:spTree>
+    <p:extLst>
+      <p:ext uri="{BB962C8B-B14F-4D97-AF65-F5344CB8AC3E}">
+        <p14:creationId xmlns:p14="http://schemas.microsoft.com/office/powerpoint/2010/main" val="2111691814"/>
       </p:ext>
     </p:extLst>
   </p:cSld>

</xml_diff>

<commit_message>
added Gabriel Gambettas starter JS for basic raytracing
</commit_message>
<xml_diff>
--- a/computer-graphics-js-1.pptx
+++ b/computer-graphics-js-1.pptx
@@ -5,7 +5,7 @@
     <p:sldMasterId id="2147483648" r:id="rId1"/>
   </p:sldMasterIdLst>
   <p:notesMasterIdLst>
-    <p:notesMasterId r:id="rId14"/>
+    <p:notesMasterId r:id="rId17"/>
   </p:notesMasterIdLst>
   <p:sldIdLst>
     <p:sldId id="256" r:id="rId2"/>
@@ -20,6 +20,9 @@
     <p:sldId id="265" r:id="rId11"/>
     <p:sldId id="266" r:id="rId12"/>
     <p:sldId id="267" r:id="rId13"/>
+    <p:sldId id="268" r:id="rId14"/>
+    <p:sldId id="269" r:id="rId15"/>
+    <p:sldId id="270" r:id="rId16"/>
   </p:sldIdLst>
   <p:sldSz cx="12192000" cy="6858000"/>
   <p:notesSz cx="6858000" cy="9144000"/>
@@ -718,6 +721,90 @@
     <p:extLst>
       <p:ext uri="{BB962C8B-B14F-4D97-AF65-F5344CB8AC3E}">
         <p14:creationId xmlns:p14="http://schemas.microsoft.com/office/powerpoint/2010/main" val="2424738408"/>
+      </p:ext>
+    </p:extLst>
+  </p:cSld>
+  <p:clrMapOvr>
+    <a:masterClrMapping/>
+  </p:clrMapOvr>
+</p:notes>
+</file>
+
+<file path=ppt/notesSlides/notesSlide4.xml><?xml version="1.0" encoding="utf-8"?>
+<p:notes xmlns:a="http://schemas.openxmlformats.org/drawingml/2006/main" xmlns:r="http://schemas.openxmlformats.org/officeDocument/2006/relationships" xmlns:p="http://schemas.openxmlformats.org/presentationml/2006/main">
+  <p:cSld>
+    <p:spTree>
+      <p:nvGrpSpPr>
+        <p:cNvPr id="1" name=""/>
+        <p:cNvGrpSpPr/>
+        <p:nvPr/>
+      </p:nvGrpSpPr>
+      <p:grpSpPr>
+        <a:xfrm>
+          <a:off x="0" y="0"/>
+          <a:ext cx="0" cy="0"/>
+          <a:chOff x="0" y="0"/>
+          <a:chExt cx="0" cy="0"/>
+        </a:xfrm>
+      </p:grpSpPr>
+      <p:sp>
+        <p:nvSpPr>
+          <p:cNvPr id="2" name="Slide Image Placeholder 1"/>
+          <p:cNvSpPr>
+            <a:spLocks noGrp="1" noRot="1" noChangeAspect="1"/>
+          </p:cNvSpPr>
+          <p:nvPr>
+            <p:ph type="sldImg"/>
+          </p:nvPr>
+        </p:nvSpPr>
+        <p:spPr/>
+      </p:sp>
+      <p:sp>
+        <p:nvSpPr>
+          <p:cNvPr id="3" name="Notes Placeholder 2"/>
+          <p:cNvSpPr>
+            <a:spLocks noGrp="1"/>
+          </p:cNvSpPr>
+          <p:nvPr>
+            <p:ph type="body" idx="1"/>
+          </p:nvPr>
+        </p:nvSpPr>
+        <p:spPr/>
+        <p:txBody>
+          <a:bodyPr/>
+          <a:lstStyle/>
+          <a:p>
+            <a:endParaRPr lang="en-US" dirty="0"/>
+          </a:p>
+        </p:txBody>
+      </p:sp>
+      <p:sp>
+        <p:nvSpPr>
+          <p:cNvPr id="4" name="Slide Number Placeholder 3"/>
+          <p:cNvSpPr>
+            <a:spLocks noGrp="1"/>
+          </p:cNvSpPr>
+          <p:nvPr>
+            <p:ph type="sldNum" sz="quarter" idx="5"/>
+          </p:nvPr>
+        </p:nvSpPr>
+        <p:spPr/>
+        <p:txBody>
+          <a:bodyPr/>
+          <a:lstStyle/>
+          <a:p>
+            <a:fld id="{68D67263-86F8-4041-922D-D14F3EA6CAA4}" type="slidenum">
+              <a:rPr lang="en-US" smtClean="0"/>
+              <a:t>13</a:t>
+            </a:fld>
+            <a:endParaRPr lang="en-US"/>
+          </a:p>
+        </p:txBody>
+      </p:sp>
+    </p:spTree>
+    <p:extLst>
+      <p:ext uri="{BB962C8B-B14F-4D97-AF65-F5344CB8AC3E}">
+        <p14:creationId xmlns:p14="http://schemas.microsoft.com/office/powerpoint/2010/main" val="2812279566"/>
       </p:ext>
     </p:extLst>
   </p:cSld>
@@ -4056,7 +4143,7 @@
             <a:pPr algn="l"/>
             <a:r>
               <a:rPr lang="en-US" sz="2000" dirty="0"/>
-              <a:t>Part 1: An introduction using JS and HTML5 Canvas</a:t>
+              <a:t>Part 1: An introduction to Ray Tracing using JS and HTML5 Canvas</a:t>
             </a:r>
           </a:p>
         </p:txBody>
@@ -5566,7 +5653,7 @@
         </p:spPr>
         <p:txBody>
           <a:bodyPr>
-            <a:normAutofit fontScale="92500" lnSpcReduction="10000"/>
+            <a:normAutofit fontScale="85000" lnSpcReduction="10000"/>
           </a:bodyPr>
           <a:lstStyle/>
           <a:p>
@@ -5577,7 +5664,7 @@
               <a:rPr lang="en-US" sz="2000" dirty="0">
                 <a:latin typeface="+mj-lt"/>
               </a:rPr>
-              <a:t>Since every dot product below is a real number, we can assign them each to a variable to make the quadratic formula easier to read:</a:t>
+              <a:t>Since every dot product below is a real number, we can assign them each to a variable to make the formula easier to read:</a:t>
             </a:r>
           </a:p>
           <a:p>
@@ -5640,7 +5727,29 @@
               <a:rPr lang="en-US" sz="2000" dirty="0">
                 <a:latin typeface="+mj-lt"/>
               </a:rPr>
-              <a:t>This refactored formula is a quadratic equation! Its solutions are the values of the parameter (t) where the ray intersects the sphere.</a:t>
+              <a:t>This refactored formula is a quadratic equation!</a:t>
+            </a:r>
+          </a:p>
+          <a:p>
+            <a:pPr marL="0" indent="0">
+              <a:buNone/>
+            </a:pPr>
+            <a:r>
+              <a:rPr lang="en-US" sz="2000" dirty="0">
+                <a:latin typeface="+mj-lt"/>
+              </a:rPr>
+              <a:t>Its solutions are the values of the parameter (t)</a:t>
+            </a:r>
+          </a:p>
+          <a:p>
+            <a:pPr marL="0" indent="0">
+              <a:buNone/>
+            </a:pPr>
+            <a:r>
+              <a:rPr lang="en-US" sz="2000" dirty="0">
+                <a:latin typeface="+mj-lt"/>
+              </a:rPr>
+              <a:t> where the ray intersects the sphere.</a:t>
             </a:r>
           </a:p>
           <a:p>
@@ -5736,8 +5845,8 @@
         </p:blipFill>
         <p:spPr>
           <a:xfrm>
-            <a:off x="7036409" y="2460197"/>
-            <a:ext cx="1943371" cy="1829055"/>
+            <a:off x="6543472" y="2536140"/>
+            <a:ext cx="1781989" cy="1677166"/>
           </a:xfrm>
           <a:prstGeom prst="rect">
             <a:avLst/>
@@ -5816,8 +5925,44 @@
         </p:blipFill>
         <p:spPr>
           <a:xfrm>
-            <a:off x="5162133" y="4798093"/>
+            <a:off x="4222851" y="4893793"/>
             <a:ext cx="2991267" cy="895475"/>
+          </a:xfrm>
+          <a:prstGeom prst="rect">
+            <a:avLst/>
+          </a:prstGeom>
+        </p:spPr>
+      </p:pic>
+      <p:pic>
+        <p:nvPicPr>
+          <p:cNvPr id="7" name="Picture 6" descr="Diagram&#10;&#10;Description automatically generated">
+            <a:extLst>
+              <a:ext uri="{FF2B5EF4-FFF2-40B4-BE49-F238E27FC236}">
+                <a16:creationId xmlns:a16="http://schemas.microsoft.com/office/drawing/2014/main" id="{2788EB04-B755-434F-9D03-88C57EA6B73D}"/>
+              </a:ext>
+            </a:extLst>
+          </p:cNvPr>
+          <p:cNvPicPr>
+            <a:picLocks noChangeAspect="1"/>
+          </p:cNvPicPr>
+          <p:nvPr/>
+        </p:nvPicPr>
+        <p:blipFill>
+          <a:blip r:embed="rId6">
+            <a:extLst>
+              <a:ext uri="{28A0092B-C50C-407E-A947-70E740481C1C}">
+                <a14:useLocalDpi xmlns:a14="http://schemas.microsoft.com/office/drawing/2010/main" val="0"/>
+              </a:ext>
+            </a:extLst>
+          </a:blip>
+          <a:stretch>
+            <a:fillRect/>
+          </a:stretch>
+        </p:blipFill>
+        <p:spPr>
+          <a:xfrm>
+            <a:off x="8153400" y="3646224"/>
+            <a:ext cx="3698871" cy="2132290"/>
           </a:xfrm>
           <a:prstGeom prst="rect">
             <a:avLst/>
@@ -5828,6 +5973,597 @@
     <p:extLst>
       <p:ext uri="{BB962C8B-B14F-4D97-AF65-F5344CB8AC3E}">
         <p14:creationId xmlns:p14="http://schemas.microsoft.com/office/powerpoint/2010/main" val="291025132"/>
+      </p:ext>
+    </p:extLst>
+  </p:cSld>
+  <p:clrMapOvr>
+    <a:masterClrMapping/>
+  </p:clrMapOvr>
+</p:sld>
+</file>
+
+<file path=ppt/slides/slide13.xml><?xml version="1.0" encoding="utf-8"?>
+<p:sld xmlns:a="http://schemas.openxmlformats.org/drawingml/2006/main" xmlns:r="http://schemas.openxmlformats.org/officeDocument/2006/relationships" xmlns:p="http://schemas.openxmlformats.org/presentationml/2006/main">
+  <p:cSld>
+    <p:spTree>
+      <p:nvGrpSpPr>
+        <p:cNvPr id="1" name=""/>
+        <p:cNvGrpSpPr/>
+        <p:nvPr/>
+      </p:nvGrpSpPr>
+      <p:grpSpPr>
+        <a:xfrm>
+          <a:off x="0" y="0"/>
+          <a:ext cx="0" cy="0"/>
+          <a:chOff x="0" y="0"/>
+          <a:chExt cx="0" cy="0"/>
+        </a:xfrm>
+      </p:grpSpPr>
+      <p:sp>
+        <p:nvSpPr>
+          <p:cNvPr id="2" name="Title 1">
+            <a:extLst>
+              <a:ext uri="{FF2B5EF4-FFF2-40B4-BE49-F238E27FC236}">
+                <a16:creationId xmlns:a16="http://schemas.microsoft.com/office/drawing/2014/main" id="{90EAD578-3000-4ECC-8955-4586A64A81B9}"/>
+              </a:ext>
+            </a:extLst>
+          </p:cNvPr>
+          <p:cNvSpPr>
+            <a:spLocks noGrp="1"/>
+          </p:cNvSpPr>
+          <p:nvPr>
+            <p:ph type="title"/>
+          </p:nvPr>
+        </p:nvSpPr>
+        <p:spPr/>
+        <p:txBody>
+          <a:bodyPr/>
+          <a:lstStyle/>
+          <a:p>
+            <a:r>
+              <a:rPr lang="en-US" dirty="0"/>
+              <a:t>Recap/Summary</a:t>
+            </a:r>
+          </a:p>
+        </p:txBody>
+      </p:sp>
+      <p:sp>
+        <p:nvSpPr>
+          <p:cNvPr id="4" name="Date Placeholder 3">
+            <a:extLst>
+              <a:ext uri="{FF2B5EF4-FFF2-40B4-BE49-F238E27FC236}">
+                <a16:creationId xmlns:a16="http://schemas.microsoft.com/office/drawing/2014/main" id="{2787BEE0-6464-4517-8DFF-11DC1B991D1F}"/>
+              </a:ext>
+            </a:extLst>
+          </p:cNvPr>
+          <p:cNvSpPr>
+            <a:spLocks noGrp="1"/>
+          </p:cNvSpPr>
+          <p:nvPr>
+            <p:ph type="dt" sz="half" idx="10"/>
+          </p:nvPr>
+        </p:nvSpPr>
+        <p:spPr>
+          <a:xfrm>
+            <a:off x="794559" y="6367884"/>
+            <a:ext cx="2743200" cy="365125"/>
+          </a:xfrm>
+        </p:spPr>
+        <p:txBody>
+          <a:bodyPr/>
+          <a:lstStyle/>
+          <a:p>
+            <a:fld id="{82BCD581-7540-41CB-8BBB-BEC98AE789ED}" type="datetime1">
+              <a:rPr lang="en-US" smtClean="0"/>
+              <a:t>3/17/2021</a:t>
+            </a:fld>
+            <a:endParaRPr lang="en-US" dirty="0"/>
+          </a:p>
+        </p:txBody>
+      </p:sp>
+      <p:sp>
+        <p:nvSpPr>
+          <p:cNvPr id="5" name="Footer Placeholder 4">
+            <a:extLst>
+              <a:ext uri="{FF2B5EF4-FFF2-40B4-BE49-F238E27FC236}">
+                <a16:creationId xmlns:a16="http://schemas.microsoft.com/office/drawing/2014/main" id="{7270B72A-09EF-4DFB-A21A-DEB33EA22253}"/>
+              </a:ext>
+            </a:extLst>
+          </p:cNvPr>
+          <p:cNvSpPr>
+            <a:spLocks noGrp="1"/>
+          </p:cNvSpPr>
+          <p:nvPr>
+            <p:ph type="ftr" sz="quarter" idx="11"/>
+          </p:nvPr>
+        </p:nvSpPr>
+        <p:spPr/>
+        <p:txBody>
+          <a:bodyPr/>
+          <a:lstStyle/>
+          <a:p>
+            <a:r>
+              <a:rPr lang="en-US" dirty="0"/>
+              <a:t>Gambetta, Gabriel. 2021, Computer Graphics from Scratch</a:t>
+            </a:r>
+          </a:p>
+        </p:txBody>
+      </p:sp>
+      <p:sp>
+        <p:nvSpPr>
+          <p:cNvPr id="6" name="Content Placeholder 5">
+            <a:extLst>
+              <a:ext uri="{FF2B5EF4-FFF2-40B4-BE49-F238E27FC236}">
+                <a16:creationId xmlns:a16="http://schemas.microsoft.com/office/drawing/2014/main" id="{97BF2EFA-6295-494D-86C6-45A87ABF0AA7}"/>
+              </a:ext>
+            </a:extLst>
+          </p:cNvPr>
+          <p:cNvSpPr>
+            <a:spLocks noGrp="1"/>
+          </p:cNvSpPr>
+          <p:nvPr>
+            <p:ph idx="1"/>
+          </p:nvPr>
+        </p:nvSpPr>
+        <p:spPr>
+          <a:xfrm>
+            <a:off x="838200" y="1690688"/>
+            <a:ext cx="10464282" cy="4665662"/>
+          </a:xfrm>
+        </p:spPr>
+        <p:txBody>
+          <a:bodyPr>
+            <a:normAutofit/>
+          </a:bodyPr>
+          <a:lstStyle/>
+          <a:p>
+            <a:pPr marL="0" indent="0">
+              <a:buNone/>
+            </a:pPr>
+            <a:r>
+              <a:rPr lang="en-US" sz="2000" b="1" dirty="0">
+                <a:latin typeface="+mj-lt"/>
+              </a:rPr>
+              <a:t>We have formulas that:</a:t>
+            </a:r>
+          </a:p>
+          <a:p>
+            <a:pPr>
+              <a:buFontTx/>
+              <a:buChar char="-"/>
+            </a:pPr>
+            <a:r>
+              <a:rPr lang="en-US" sz="2000" dirty="0">
+                <a:latin typeface="+mj-lt"/>
+              </a:rPr>
+              <a:t>For each pixel on the canvas: compute the corresponding point on the viewport.</a:t>
+            </a:r>
+          </a:p>
+          <a:p>
+            <a:pPr>
+              <a:buFontTx/>
+              <a:buChar char="-"/>
+            </a:pPr>
+            <a:r>
+              <a:rPr lang="en-US" sz="2000" dirty="0">
+                <a:latin typeface="+mj-lt"/>
+              </a:rPr>
+              <a:t>Given the position of the camera, express the equation of a ray that starts at the camera and goes through that point of the viewport.</a:t>
+            </a:r>
+          </a:p>
+          <a:p>
+            <a:pPr>
+              <a:buFontTx/>
+              <a:buChar char="-"/>
+            </a:pPr>
+            <a:r>
+              <a:rPr lang="en-US" sz="2000" dirty="0">
+                <a:latin typeface="+mj-lt"/>
+              </a:rPr>
+              <a:t>Given a sphere, compute where the ray intersects that sphere.</a:t>
+            </a:r>
+          </a:p>
+          <a:p>
+            <a:pPr marL="0" indent="0">
+              <a:buNone/>
+            </a:pPr>
+            <a:r>
+              <a:rPr lang="en-US" sz="2000" b="1" dirty="0">
+                <a:latin typeface="+mj-lt"/>
+              </a:rPr>
+              <a:t>We need to:</a:t>
+            </a:r>
+          </a:p>
+          <a:p>
+            <a:pPr>
+              <a:buFontTx/>
+              <a:buChar char="-"/>
+            </a:pPr>
+            <a:r>
+              <a:rPr lang="en-US" sz="2000" dirty="0">
+                <a:latin typeface="+mj-lt"/>
+              </a:rPr>
+              <a:t>Compute the intersections of the ray and each sphere</a:t>
+            </a:r>
+          </a:p>
+          <a:p>
+            <a:pPr>
+              <a:buFontTx/>
+              <a:buChar char="-"/>
+            </a:pPr>
+            <a:r>
+              <a:rPr lang="en-US" sz="2000" dirty="0">
+                <a:latin typeface="+mj-lt"/>
+              </a:rPr>
+              <a:t>Keep the intersect point closest to the camera (we are only seeing the surface of the sphere)</a:t>
+            </a:r>
+          </a:p>
+          <a:p>
+            <a:pPr>
+              <a:buFontTx/>
+              <a:buChar char="-"/>
+            </a:pPr>
+            <a:r>
+              <a:rPr lang="en-US" sz="2000" dirty="0">
+                <a:latin typeface="+mj-lt"/>
+              </a:rPr>
+              <a:t>Paint the pixel on the canvas with the appropriate color.</a:t>
+            </a:r>
+          </a:p>
+          <a:p>
+            <a:pPr marL="0" indent="0">
+              <a:buNone/>
+            </a:pPr>
+            <a:endParaRPr lang="en-US" sz="2000" dirty="0">
+              <a:latin typeface="+mj-lt"/>
+            </a:endParaRPr>
+          </a:p>
+        </p:txBody>
+      </p:sp>
+    </p:spTree>
+    <p:extLst>
+      <p:ext uri="{BB962C8B-B14F-4D97-AF65-F5344CB8AC3E}">
+        <p14:creationId xmlns:p14="http://schemas.microsoft.com/office/powerpoint/2010/main" val="2531437524"/>
+      </p:ext>
+    </p:extLst>
+  </p:cSld>
+  <p:clrMapOvr>
+    <a:masterClrMapping/>
+  </p:clrMapOvr>
+</p:sld>
+</file>
+
+<file path=ppt/slides/slide14.xml><?xml version="1.0" encoding="utf-8"?>
+<p:sld xmlns:a="http://schemas.openxmlformats.org/drawingml/2006/main" xmlns:r="http://schemas.openxmlformats.org/officeDocument/2006/relationships" xmlns:p="http://schemas.openxmlformats.org/presentationml/2006/main">
+  <p:cSld>
+    <p:spTree>
+      <p:nvGrpSpPr>
+        <p:cNvPr id="1" name=""/>
+        <p:cNvGrpSpPr/>
+        <p:nvPr/>
+      </p:nvGrpSpPr>
+      <p:grpSpPr>
+        <a:xfrm>
+          <a:off x="0" y="0"/>
+          <a:ext cx="0" cy="0"/>
+          <a:chOff x="0" y="0"/>
+          <a:chExt cx="0" cy="0"/>
+        </a:xfrm>
+      </p:grpSpPr>
+      <p:sp>
+        <p:nvSpPr>
+          <p:cNvPr id="2" name="Title 1">
+            <a:extLst>
+              <a:ext uri="{FF2B5EF4-FFF2-40B4-BE49-F238E27FC236}">
+                <a16:creationId xmlns:a16="http://schemas.microsoft.com/office/drawing/2014/main" id="{78EACBE6-8C4C-43DD-B0AF-D3E5490CB985}"/>
+              </a:ext>
+            </a:extLst>
+          </p:cNvPr>
+          <p:cNvSpPr>
+            <a:spLocks noGrp="1"/>
+          </p:cNvSpPr>
+          <p:nvPr>
+            <p:ph type="title"/>
+          </p:nvPr>
+        </p:nvSpPr>
+        <p:spPr/>
+        <p:txBody>
+          <a:bodyPr/>
+          <a:lstStyle/>
+          <a:p>
+            <a:r>
+              <a:rPr lang="en-US" dirty="0"/>
+              <a:t>Further explanation of (t) </a:t>
+            </a:r>
+            <a:r>
+              <a:rPr lang="en-US" sz="1600" dirty="0"/>
+              <a:t>©Gabriel Gambetta</a:t>
+            </a:r>
+          </a:p>
+        </p:txBody>
+      </p:sp>
+      <p:pic>
+        <p:nvPicPr>
+          <p:cNvPr id="7" name="Content Placeholder 6" descr="Text&#10;&#10;Description automatically generated">
+            <a:extLst>
+              <a:ext uri="{FF2B5EF4-FFF2-40B4-BE49-F238E27FC236}">
+                <a16:creationId xmlns:a16="http://schemas.microsoft.com/office/drawing/2014/main" id="{6F9D6E4D-9396-4DCE-ABC1-7656F18ADDD1}"/>
+              </a:ext>
+            </a:extLst>
+          </p:cNvPr>
+          <p:cNvPicPr>
+            <a:picLocks noGrp="1" noChangeAspect="1"/>
+          </p:cNvPicPr>
+          <p:nvPr>
+            <p:ph idx="1"/>
+          </p:nvPr>
+        </p:nvPicPr>
+        <p:blipFill>
+          <a:blip r:embed="rId2">
+            <a:extLst>
+              <a:ext uri="{28A0092B-C50C-407E-A947-70E740481C1C}">
+                <a14:useLocalDpi xmlns:a14="http://schemas.microsoft.com/office/drawing/2010/main" val="0"/>
+              </a:ext>
+            </a:extLst>
+          </a:blip>
+          <a:stretch>
+            <a:fillRect/>
+          </a:stretch>
+        </p:blipFill>
+        <p:spPr>
+          <a:xfrm>
+            <a:off x="1766772" y="1825625"/>
+            <a:ext cx="8658455" cy="4351338"/>
+          </a:xfrm>
+        </p:spPr>
+      </p:pic>
+      <p:sp>
+        <p:nvSpPr>
+          <p:cNvPr id="4" name="Date Placeholder 3">
+            <a:extLst>
+              <a:ext uri="{FF2B5EF4-FFF2-40B4-BE49-F238E27FC236}">
+                <a16:creationId xmlns:a16="http://schemas.microsoft.com/office/drawing/2014/main" id="{A147C052-F65F-49F9-84ED-1B7742057692}"/>
+              </a:ext>
+            </a:extLst>
+          </p:cNvPr>
+          <p:cNvSpPr>
+            <a:spLocks noGrp="1"/>
+          </p:cNvSpPr>
+          <p:nvPr>
+            <p:ph type="dt" sz="half" idx="10"/>
+          </p:nvPr>
+        </p:nvSpPr>
+        <p:spPr/>
+        <p:txBody>
+          <a:bodyPr/>
+          <a:lstStyle/>
+          <a:p>
+            <a:fld id="{82BCD581-7540-41CB-8BBB-BEC98AE789ED}" type="datetime1">
+              <a:rPr lang="en-US" smtClean="0"/>
+              <a:t>3/17/2021</a:t>
+            </a:fld>
+            <a:endParaRPr lang="en-US"/>
+          </a:p>
+        </p:txBody>
+      </p:sp>
+      <p:sp>
+        <p:nvSpPr>
+          <p:cNvPr id="5" name="Footer Placeholder 4">
+            <a:extLst>
+              <a:ext uri="{FF2B5EF4-FFF2-40B4-BE49-F238E27FC236}">
+                <a16:creationId xmlns:a16="http://schemas.microsoft.com/office/drawing/2014/main" id="{4D88AE7C-8AFC-44CF-A6DB-75D233C34940}"/>
+              </a:ext>
+            </a:extLst>
+          </p:cNvPr>
+          <p:cNvSpPr>
+            <a:spLocks noGrp="1"/>
+          </p:cNvSpPr>
+          <p:nvPr>
+            <p:ph type="ftr" sz="quarter" idx="11"/>
+          </p:nvPr>
+        </p:nvSpPr>
+        <p:spPr/>
+        <p:txBody>
+          <a:bodyPr/>
+          <a:lstStyle/>
+          <a:p>
+            <a:r>
+              <a:rPr lang="en-US"/>
+              <a:t>Gambetta, Gabriel. 2021, Computer Graphics from Scratch</a:t>
+            </a:r>
+          </a:p>
+        </p:txBody>
+      </p:sp>
+    </p:spTree>
+    <p:extLst>
+      <p:ext uri="{BB962C8B-B14F-4D97-AF65-F5344CB8AC3E}">
+        <p14:creationId xmlns:p14="http://schemas.microsoft.com/office/powerpoint/2010/main" val="2188817165"/>
+      </p:ext>
+    </p:extLst>
+  </p:cSld>
+  <p:clrMapOvr>
+    <a:masterClrMapping/>
+  </p:clrMapOvr>
+</p:sld>
+</file>
+
+<file path=ppt/slides/slide15.xml><?xml version="1.0" encoding="utf-8"?>
+<p:sld xmlns:a="http://schemas.openxmlformats.org/drawingml/2006/main" xmlns:r="http://schemas.openxmlformats.org/officeDocument/2006/relationships" xmlns:p="http://schemas.openxmlformats.org/presentationml/2006/main">
+  <p:cSld>
+    <p:spTree>
+      <p:nvGrpSpPr>
+        <p:cNvPr id="1" name=""/>
+        <p:cNvGrpSpPr/>
+        <p:nvPr/>
+      </p:nvGrpSpPr>
+      <p:grpSpPr>
+        <a:xfrm>
+          <a:off x="0" y="0"/>
+          <a:ext cx="0" cy="0"/>
+          <a:chOff x="0" y="0"/>
+          <a:chExt cx="0" cy="0"/>
+        </a:xfrm>
+      </p:grpSpPr>
+      <p:sp>
+        <p:nvSpPr>
+          <p:cNvPr id="2" name="Title 1">
+            <a:extLst>
+              <a:ext uri="{FF2B5EF4-FFF2-40B4-BE49-F238E27FC236}">
+                <a16:creationId xmlns:a16="http://schemas.microsoft.com/office/drawing/2014/main" id="{24D7EC3B-884A-494C-B955-F553EFDE7262}"/>
+              </a:ext>
+            </a:extLst>
+          </p:cNvPr>
+          <p:cNvSpPr>
+            <a:spLocks noGrp="1"/>
+          </p:cNvSpPr>
+          <p:nvPr>
+            <p:ph type="title"/>
+          </p:nvPr>
+        </p:nvSpPr>
+        <p:spPr/>
+        <p:txBody>
+          <a:bodyPr/>
+          <a:lstStyle/>
+          <a:p>
+            <a:r>
+              <a:rPr lang="en-US" dirty="0"/>
+              <a:t>Finally! Let's look at some code!</a:t>
+            </a:r>
+          </a:p>
+        </p:txBody>
+      </p:sp>
+      <p:pic>
+        <p:nvPicPr>
+          <p:cNvPr id="7" name="Content Placeholder 6" descr="Chart, bubble chart&#10;&#10;Description automatically generated">
+            <a:extLst>
+              <a:ext uri="{FF2B5EF4-FFF2-40B4-BE49-F238E27FC236}">
+                <a16:creationId xmlns:a16="http://schemas.microsoft.com/office/drawing/2014/main" id="{CD3277A8-BF58-4ADC-A11A-F44CCCC389A5}"/>
+              </a:ext>
+            </a:extLst>
+          </p:cNvPr>
+          <p:cNvPicPr>
+            <a:picLocks noGrp="1" noChangeAspect="1"/>
+          </p:cNvPicPr>
+          <p:nvPr>
+            <p:ph idx="1"/>
+          </p:nvPr>
+        </p:nvPicPr>
+        <p:blipFill>
+          <a:blip r:embed="rId2">
+            <a:extLst>
+              <a:ext uri="{28A0092B-C50C-407E-A947-70E740481C1C}">
+                <a14:useLocalDpi xmlns:a14="http://schemas.microsoft.com/office/drawing/2010/main" val="0"/>
+              </a:ext>
+            </a:extLst>
+          </a:blip>
+          <a:stretch>
+            <a:fillRect/>
+          </a:stretch>
+        </p:blipFill>
+        <p:spPr>
+          <a:xfrm>
+            <a:off x="4267139" y="2225300"/>
+            <a:ext cx="7249537" cy="3315163"/>
+          </a:xfrm>
+        </p:spPr>
+      </p:pic>
+      <p:sp>
+        <p:nvSpPr>
+          <p:cNvPr id="4" name="Date Placeholder 3">
+            <a:extLst>
+              <a:ext uri="{FF2B5EF4-FFF2-40B4-BE49-F238E27FC236}">
+                <a16:creationId xmlns:a16="http://schemas.microsoft.com/office/drawing/2014/main" id="{4CA01F31-554B-4481-A4DA-32B36DC6851C}"/>
+              </a:ext>
+            </a:extLst>
+          </p:cNvPr>
+          <p:cNvSpPr>
+            <a:spLocks noGrp="1"/>
+          </p:cNvSpPr>
+          <p:nvPr>
+            <p:ph type="dt" sz="half" idx="10"/>
+          </p:nvPr>
+        </p:nvSpPr>
+        <p:spPr/>
+        <p:txBody>
+          <a:bodyPr/>
+          <a:lstStyle/>
+          <a:p>
+            <a:fld id="{82BCD581-7540-41CB-8BBB-BEC98AE789ED}" type="datetime1">
+              <a:rPr lang="en-US" smtClean="0"/>
+              <a:t>3/17/2021</a:t>
+            </a:fld>
+            <a:endParaRPr lang="en-US"/>
+          </a:p>
+        </p:txBody>
+      </p:sp>
+      <p:sp>
+        <p:nvSpPr>
+          <p:cNvPr id="5" name="Footer Placeholder 4">
+            <a:extLst>
+              <a:ext uri="{FF2B5EF4-FFF2-40B4-BE49-F238E27FC236}">
+                <a16:creationId xmlns:a16="http://schemas.microsoft.com/office/drawing/2014/main" id="{D5159840-64A1-4C77-B32A-9AF7C0017409}"/>
+              </a:ext>
+            </a:extLst>
+          </p:cNvPr>
+          <p:cNvSpPr>
+            <a:spLocks noGrp="1"/>
+          </p:cNvSpPr>
+          <p:nvPr>
+            <p:ph type="ftr" sz="quarter" idx="11"/>
+          </p:nvPr>
+        </p:nvSpPr>
+        <p:spPr/>
+        <p:txBody>
+          <a:bodyPr/>
+          <a:lstStyle/>
+          <a:p>
+            <a:r>
+              <a:rPr lang="en-US"/>
+              <a:t>Gambetta, Gabriel. 2021, Computer Graphics from Scratch</a:t>
+            </a:r>
+          </a:p>
+        </p:txBody>
+      </p:sp>
+      <p:pic>
+        <p:nvPicPr>
+          <p:cNvPr id="11" name="Picture 10" descr="Text, letter&#10;&#10;Description automatically generated">
+            <a:extLst>
+              <a:ext uri="{FF2B5EF4-FFF2-40B4-BE49-F238E27FC236}">
+                <a16:creationId xmlns:a16="http://schemas.microsoft.com/office/drawing/2014/main" id="{171DB856-5209-472B-A8FA-856ECA3629CC}"/>
+              </a:ext>
+            </a:extLst>
+          </p:cNvPr>
+          <p:cNvPicPr>
+            <a:picLocks noChangeAspect="1"/>
+          </p:cNvPicPr>
+          <p:nvPr/>
+        </p:nvPicPr>
+        <p:blipFill>
+          <a:blip r:embed="rId3">
+            <a:extLst>
+              <a:ext uri="{28A0092B-C50C-407E-A947-70E740481C1C}">
+                <a14:useLocalDpi xmlns:a14="http://schemas.microsoft.com/office/drawing/2010/main" val="0"/>
+              </a:ext>
+            </a:extLst>
+          </a:blip>
+          <a:stretch>
+            <a:fillRect/>
+          </a:stretch>
+        </p:blipFill>
+        <p:spPr>
+          <a:xfrm>
+            <a:off x="1662499" y="2698901"/>
+            <a:ext cx="2314898" cy="2486372"/>
+          </a:xfrm>
+          <a:prstGeom prst="rect">
+            <a:avLst/>
+          </a:prstGeom>
+        </p:spPr>
+      </p:pic>
+    </p:spTree>
+    <p:extLst>
+      <p:ext uri="{BB962C8B-B14F-4D97-AF65-F5344CB8AC3E}">
+        <p14:creationId xmlns:p14="http://schemas.microsoft.com/office/powerpoint/2010/main" val="306943890"/>
       </p:ext>
     </p:extLst>
   </p:cSld>

</xml_diff>

<commit_message>
updated ppt to add sources
</commit_message>
<xml_diff>
--- a/computer-graphics-js-1.pptx
+++ b/computer-graphics-js-1.pptx
@@ -5,7 +5,7 @@
     <p:sldMasterId id="2147483648" r:id="rId1"/>
   </p:sldMasterIdLst>
   <p:notesMasterIdLst>
-    <p:notesMasterId r:id="rId17"/>
+    <p:notesMasterId r:id="rId18"/>
   </p:notesMasterIdLst>
   <p:sldIdLst>
     <p:sldId id="256" r:id="rId2"/>
@@ -23,6 +23,7 @@
     <p:sldId id="268" r:id="rId14"/>
     <p:sldId id="269" r:id="rId15"/>
     <p:sldId id="270" r:id="rId16"/>
+    <p:sldId id="271" r:id="rId17"/>
   </p:sldIdLst>
   <p:sldSz cx="12192000" cy="6858000"/>
   <p:notesSz cx="6858000" cy="9144000"/>
@@ -211,7 +212,7 @@
           <a:p>
             <a:fld id="{1C68982D-E66A-4CC9-8D60-F3452BA7A398}" type="datetimeFigureOut">
               <a:rPr lang="en-US" smtClean="0"/>
-              <a:t>3/17/2021</a:t>
+              <a:t>3/18/2021</a:t>
             </a:fld>
             <a:endParaRPr lang="en-US"/>
           </a:p>
@@ -961,7 +962,7 @@
           <a:p>
             <a:fld id="{8FA5496C-C728-456A-977F-D9196E097204}" type="datetime1">
               <a:rPr lang="en-US" smtClean="0"/>
-              <a:t>3/17/2021</a:t>
+              <a:t>3/18/2021</a:t>
             </a:fld>
             <a:endParaRPr lang="en-US"/>
           </a:p>
@@ -1162,7 +1163,7 @@
           <a:p>
             <a:fld id="{334FE89A-4755-42FC-8111-20439C1F0FC8}" type="datetime1">
               <a:rPr lang="en-US" smtClean="0"/>
-              <a:t>3/17/2021</a:t>
+              <a:t>3/18/2021</a:t>
             </a:fld>
             <a:endParaRPr lang="en-US"/>
           </a:p>
@@ -1373,7 +1374,7 @@
           <a:p>
             <a:fld id="{5C5E400F-89D0-46D1-9B46-371CDED5800F}" type="datetime1">
               <a:rPr lang="en-US" smtClean="0"/>
-              <a:t>3/17/2021</a:t>
+              <a:t>3/18/2021</a:t>
             </a:fld>
             <a:endParaRPr lang="en-US"/>
           </a:p>
@@ -1574,7 +1575,7 @@
           <a:p>
             <a:fld id="{82BCD581-7540-41CB-8BBB-BEC98AE789ED}" type="datetime1">
               <a:rPr lang="en-US" smtClean="0"/>
-              <a:t>3/17/2021</a:t>
+              <a:t>3/18/2021</a:t>
             </a:fld>
             <a:endParaRPr lang="en-US"/>
           </a:p>
@@ -1852,7 +1853,7 @@
           <a:p>
             <a:fld id="{FE716A51-E2A8-46FD-9E85-91012295338D}" type="datetime1">
               <a:rPr lang="en-US" smtClean="0"/>
-              <a:t>3/17/2021</a:t>
+              <a:t>3/18/2021</a:t>
             </a:fld>
             <a:endParaRPr lang="en-US"/>
           </a:p>
@@ -2120,7 +2121,7 @@
           <a:p>
             <a:fld id="{725D7A7C-FF76-48E2-AFCE-76270FDC0A73}" type="datetime1">
               <a:rPr lang="en-US" smtClean="0"/>
-              <a:t>3/17/2021</a:t>
+              <a:t>3/18/2021</a:t>
             </a:fld>
             <a:endParaRPr lang="en-US"/>
           </a:p>
@@ -2535,7 +2536,7 @@
           <a:p>
             <a:fld id="{8CBA4743-8874-4114-AF63-FA0AC80D7895}" type="datetime1">
               <a:rPr lang="en-US" smtClean="0"/>
-              <a:t>3/17/2021</a:t>
+              <a:t>3/18/2021</a:t>
             </a:fld>
             <a:endParaRPr lang="en-US"/>
           </a:p>
@@ -2679,7 +2680,7 @@
           <a:p>
             <a:fld id="{9064E9D3-DC0A-4ABC-9213-50B3983CCD13}" type="datetime1">
               <a:rPr lang="en-US" smtClean="0"/>
-              <a:t>3/17/2021</a:t>
+              <a:t>3/18/2021</a:t>
             </a:fld>
             <a:endParaRPr lang="en-US"/>
           </a:p>
@@ -2795,7 +2796,7 @@
           <a:p>
             <a:fld id="{332F517D-9C77-4CA9-A25F-12287C96135E}" type="datetime1">
               <a:rPr lang="en-US" smtClean="0"/>
-              <a:t>3/17/2021</a:t>
+              <a:t>3/18/2021</a:t>
             </a:fld>
             <a:endParaRPr lang="en-US"/>
           </a:p>
@@ -3109,7 +3110,7 @@
           <a:p>
             <a:fld id="{E5B3C226-B550-4C7D-A05F-07AA9FF43E24}" type="datetime1">
               <a:rPr lang="en-US" smtClean="0"/>
-              <a:t>3/17/2021</a:t>
+              <a:t>3/18/2021</a:t>
             </a:fld>
             <a:endParaRPr lang="en-US"/>
           </a:p>
@@ -3400,7 +3401,7 @@
           <a:p>
             <a:fld id="{46EE6C59-4282-4A86-BEDA-6EBC9A482A2D}" type="datetime1">
               <a:rPr lang="en-US" smtClean="0"/>
-              <a:t>3/17/2021</a:t>
+              <a:t>3/18/2021</a:t>
             </a:fld>
             <a:endParaRPr lang="en-US"/>
           </a:p>
@@ -3644,7 +3645,7 @@
           <a:p>
             <a:fld id="{A7700EF3-3C29-4744-8EE4-CE5D48A4A04B}" type="datetime1">
               <a:rPr lang="en-US" smtClean="0"/>
-              <a:t>3/17/2021</a:t>
+              <a:t>3/18/2021</a:t>
             </a:fld>
             <a:endParaRPr lang="en-US"/>
           </a:p>
@@ -4411,7 +4412,7 @@
                   <a:spcPts val="600"/>
                 </a:spcAft>
               </a:pPr>
-              <a:t>3/17/2021</a:t>
+              <a:t>3/18/2021</a:t>
             </a:fld>
             <a:endParaRPr lang="en-US" sz="1100">
               <a:solidFill>
@@ -4555,7 +4556,7 @@
           <a:p>
             <a:fld id="{82BCD581-7540-41CB-8BBB-BEC98AE789ED}" type="datetime1">
               <a:rPr lang="en-US" smtClean="0"/>
-              <a:t>3/17/2021</a:t>
+              <a:t>3/18/2021</a:t>
             </a:fld>
             <a:endParaRPr lang="en-US" dirty="0"/>
           </a:p>
@@ -4985,7 +4986,7 @@
           <a:p>
             <a:fld id="{82BCD581-7540-41CB-8BBB-BEC98AE789ED}" type="datetime1">
               <a:rPr lang="en-US" smtClean="0"/>
-              <a:t>3/17/2021</a:t>
+              <a:t>3/18/2021</a:t>
             </a:fld>
             <a:endParaRPr lang="en-US" dirty="0"/>
           </a:p>
@@ -5595,7 +5596,7 @@
           <a:p>
             <a:fld id="{82BCD581-7540-41CB-8BBB-BEC98AE789ED}" type="datetime1">
               <a:rPr lang="en-US" smtClean="0"/>
-              <a:t>3/17/2021</a:t>
+              <a:t>3/18/2021</a:t>
             </a:fld>
             <a:endParaRPr lang="en-US" dirty="0"/>
           </a:p>
@@ -6055,7 +6056,7 @@
           <a:p>
             <a:fld id="{82BCD581-7540-41CB-8BBB-BEC98AE789ED}" type="datetime1">
               <a:rPr lang="en-US" smtClean="0"/>
-              <a:t>3/17/2021</a:t>
+              <a:t>3/18/2021</a:t>
             </a:fld>
             <a:endParaRPr lang="en-US" dirty="0"/>
           </a:p>
@@ -6340,7 +6341,7 @@
           <a:p>
             <a:fld id="{82BCD581-7540-41CB-8BBB-BEC98AE789ED}" type="datetime1">
               <a:rPr lang="en-US" smtClean="0"/>
-              <a:t>3/17/2021</a:t>
+              <a:t>3/18/2021</a:t>
             </a:fld>
             <a:endParaRPr lang="en-US"/>
           </a:p>
@@ -6490,7 +6491,7 @@
           <a:p>
             <a:fld id="{82BCD581-7540-41CB-8BBB-BEC98AE789ED}" type="datetime1">
               <a:rPr lang="en-US" smtClean="0"/>
-              <a:t>3/17/2021</a:t>
+              <a:t>3/18/2021</a:t>
             </a:fld>
             <a:endParaRPr lang="en-US"/>
           </a:p>
@@ -6564,6 +6565,190 @@
     <p:extLst>
       <p:ext uri="{BB962C8B-B14F-4D97-AF65-F5344CB8AC3E}">
         <p14:creationId xmlns:p14="http://schemas.microsoft.com/office/powerpoint/2010/main" val="306943890"/>
+      </p:ext>
+    </p:extLst>
+  </p:cSld>
+  <p:clrMapOvr>
+    <a:masterClrMapping/>
+  </p:clrMapOvr>
+</p:sld>
+</file>
+
+<file path=ppt/slides/slide16.xml><?xml version="1.0" encoding="utf-8"?>
+<p:sld xmlns:a="http://schemas.openxmlformats.org/drawingml/2006/main" xmlns:r="http://schemas.openxmlformats.org/officeDocument/2006/relationships" xmlns:p="http://schemas.openxmlformats.org/presentationml/2006/main">
+  <p:cSld>
+    <p:spTree>
+      <p:nvGrpSpPr>
+        <p:cNvPr id="1" name=""/>
+        <p:cNvGrpSpPr/>
+        <p:nvPr/>
+      </p:nvGrpSpPr>
+      <p:grpSpPr>
+        <a:xfrm>
+          <a:off x="0" y="0"/>
+          <a:ext cx="0" cy="0"/>
+          <a:chOff x="0" y="0"/>
+          <a:chExt cx="0" cy="0"/>
+        </a:xfrm>
+      </p:grpSpPr>
+      <p:sp>
+        <p:nvSpPr>
+          <p:cNvPr id="2" name="Title 1">
+            <a:extLst>
+              <a:ext uri="{FF2B5EF4-FFF2-40B4-BE49-F238E27FC236}">
+                <a16:creationId xmlns:a16="http://schemas.microsoft.com/office/drawing/2014/main" id="{CFD2A866-64A4-42F7-8809-D9FDB61CC407}"/>
+              </a:ext>
+            </a:extLst>
+          </p:cNvPr>
+          <p:cNvSpPr>
+            <a:spLocks noGrp="1"/>
+          </p:cNvSpPr>
+          <p:nvPr>
+            <p:ph type="ctrTitle"/>
+          </p:nvPr>
+        </p:nvSpPr>
+        <p:spPr/>
+        <p:txBody>
+          <a:bodyPr/>
+          <a:lstStyle/>
+          <a:p>
+            <a:r>
+              <a:rPr lang="en-US" dirty="0"/>
+              <a:t>Sources:</a:t>
+            </a:r>
+          </a:p>
+        </p:txBody>
+      </p:sp>
+      <p:sp>
+        <p:nvSpPr>
+          <p:cNvPr id="3" name="Subtitle 2">
+            <a:extLst>
+              <a:ext uri="{FF2B5EF4-FFF2-40B4-BE49-F238E27FC236}">
+                <a16:creationId xmlns:a16="http://schemas.microsoft.com/office/drawing/2014/main" id="{F26D0D6E-5592-4855-A460-F9EDDCBAE0B7}"/>
+              </a:ext>
+            </a:extLst>
+          </p:cNvPr>
+          <p:cNvSpPr>
+            <a:spLocks noGrp="1"/>
+          </p:cNvSpPr>
+          <p:nvPr>
+            <p:ph type="subTitle" idx="1"/>
+          </p:nvPr>
+        </p:nvSpPr>
+        <p:spPr>
+          <a:xfrm>
+            <a:off x="1088571" y="3577156"/>
+            <a:ext cx="10014857" cy="1655762"/>
+          </a:xfrm>
+        </p:spPr>
+        <p:txBody>
+          <a:bodyPr>
+            <a:normAutofit fontScale="92500"/>
+          </a:bodyPr>
+          <a:lstStyle/>
+          <a:p>
+            <a:r>
+              <a:rPr lang="en-US" dirty="0" err="1"/>
+              <a:t>Github</a:t>
+            </a:r>
+            <a:r>
+              <a:rPr lang="en-US" dirty="0"/>
+              <a:t> for this Demo: </a:t>
+            </a:r>
+            <a:r>
+              <a:rPr lang="en-US" dirty="0">
+                <a:hlinkClick r:id="rId2"/>
+              </a:rPr>
+              <a:t>https://github.com/ctrachte/JS-Computer-Graphics-Demo</a:t>
+            </a:r>
+            <a:endParaRPr lang="en-US" dirty="0"/>
+          </a:p>
+          <a:p>
+            <a:br>
+              <a:rPr lang="en-US" dirty="0"/>
+            </a:br>
+            <a:r>
+              <a:rPr lang="en-US" dirty="0"/>
+              <a:t>Gambetta, Gabriel. </a:t>
+            </a:r>
+            <a:r>
+              <a:rPr lang="en-US" i="1" dirty="0"/>
+              <a:t>“Computer Graphics from Scratch”. Web, 2021. </a:t>
+            </a:r>
+            <a:r>
+              <a:rPr lang="en-US" i="1" dirty="0">
+                <a:hlinkClick r:id="rId3"/>
+              </a:rPr>
+              <a:t>https://gabrielgambetta.com/computer-graphics-from-scratch/</a:t>
+            </a:r>
+            <a:endParaRPr lang="en-US" i="1" dirty="0"/>
+          </a:p>
+          <a:p>
+            <a:endParaRPr lang="en-US" i="1" dirty="0"/>
+          </a:p>
+        </p:txBody>
+      </p:sp>
+      <p:sp>
+        <p:nvSpPr>
+          <p:cNvPr id="4" name="Date Placeholder 3">
+            <a:extLst>
+              <a:ext uri="{FF2B5EF4-FFF2-40B4-BE49-F238E27FC236}">
+                <a16:creationId xmlns:a16="http://schemas.microsoft.com/office/drawing/2014/main" id="{C5B7EC2F-572A-4A58-A93B-226C493EA37E}"/>
+              </a:ext>
+            </a:extLst>
+          </p:cNvPr>
+          <p:cNvSpPr>
+            <a:spLocks noGrp="1"/>
+          </p:cNvSpPr>
+          <p:nvPr>
+            <p:ph type="dt" sz="half" idx="10"/>
+          </p:nvPr>
+        </p:nvSpPr>
+        <p:spPr/>
+        <p:txBody>
+          <a:bodyPr/>
+          <a:lstStyle/>
+          <a:p>
+            <a:fld id="{8FA5496C-C728-456A-977F-D9196E097204}" type="datetime1">
+              <a:rPr lang="en-US" smtClean="0"/>
+              <a:t>3/18/2021</a:t>
+            </a:fld>
+            <a:endParaRPr lang="en-US" dirty="0"/>
+          </a:p>
+        </p:txBody>
+      </p:sp>
+      <p:sp>
+        <p:nvSpPr>
+          <p:cNvPr id="5" name="Footer Placeholder 4">
+            <a:extLst>
+              <a:ext uri="{FF2B5EF4-FFF2-40B4-BE49-F238E27FC236}">
+                <a16:creationId xmlns:a16="http://schemas.microsoft.com/office/drawing/2014/main" id="{B13EE22C-5F84-4EBE-8293-449C3CCF7746}"/>
+              </a:ext>
+            </a:extLst>
+          </p:cNvPr>
+          <p:cNvSpPr>
+            <a:spLocks noGrp="1"/>
+          </p:cNvSpPr>
+          <p:nvPr>
+            <p:ph type="ftr" sz="quarter" idx="11"/>
+          </p:nvPr>
+        </p:nvSpPr>
+        <p:spPr/>
+        <p:txBody>
+          <a:bodyPr/>
+          <a:lstStyle/>
+          <a:p>
+            <a:r>
+              <a:rPr lang="en-US"/>
+              <a:t>Gambetta, Gabriel. 2021, Computer Graphics from Scratch</a:t>
+            </a:r>
+          </a:p>
+        </p:txBody>
+      </p:sp>
+    </p:spTree>
+    <p:extLst>
+      <p:ext uri="{BB962C8B-B14F-4D97-AF65-F5344CB8AC3E}">
+        <p14:creationId xmlns:p14="http://schemas.microsoft.com/office/powerpoint/2010/main" val="3385567051"/>
       </p:ext>
     </p:extLst>
   </p:cSld>
@@ -6749,7 +6934,7 @@
           <a:p>
             <a:fld id="{82BCD581-7540-41CB-8BBB-BEC98AE789ED}" type="datetime1">
               <a:rPr lang="en-US" smtClean="0"/>
-              <a:t>3/17/2021</a:t>
+              <a:t>3/18/2021</a:t>
             </a:fld>
             <a:endParaRPr lang="en-US"/>
           </a:p>
@@ -6864,7 +7049,7 @@
           <a:p>
             <a:fld id="{82BCD581-7540-41CB-8BBB-BEC98AE789ED}" type="datetime1">
               <a:rPr lang="en-US" smtClean="0"/>
-              <a:t>3/17/2021</a:t>
+              <a:t>3/18/2021</a:t>
             </a:fld>
             <a:endParaRPr lang="en-US"/>
           </a:p>
@@ -7190,7 +7375,7 @@
           <a:p>
             <a:fld id="{82BCD581-7540-41CB-8BBB-BEC98AE789ED}" type="datetime1">
               <a:rPr lang="en-US" smtClean="0"/>
-              <a:t>3/17/2021</a:t>
+              <a:t>3/18/2021</a:t>
             </a:fld>
             <a:endParaRPr lang="en-US"/>
           </a:p>
@@ -7563,7 +7748,7 @@
           <a:p>
             <a:fld id="{82BCD581-7540-41CB-8BBB-BEC98AE789ED}" type="datetime1">
               <a:rPr lang="en-US" smtClean="0"/>
-              <a:t>3/17/2021</a:t>
+              <a:t>3/18/2021</a:t>
             </a:fld>
             <a:endParaRPr lang="en-US"/>
           </a:p>
@@ -7852,7 +8037,7 @@
           <a:p>
             <a:fld id="{82BCD581-7540-41CB-8BBB-BEC98AE789ED}" type="datetime1">
               <a:rPr lang="en-US" smtClean="0"/>
-              <a:t>3/17/2021</a:t>
+              <a:t>3/18/2021</a:t>
             </a:fld>
             <a:endParaRPr lang="en-US" dirty="0"/>
           </a:p>
@@ -8237,7 +8422,7 @@
           <a:p>
             <a:fld id="{82BCD581-7540-41CB-8BBB-BEC98AE789ED}" type="datetime1">
               <a:rPr lang="en-US" smtClean="0"/>
-              <a:t>3/17/2021</a:t>
+              <a:t>3/18/2021</a:t>
             </a:fld>
             <a:endParaRPr lang="en-US" dirty="0"/>
           </a:p>
@@ -8776,7 +8961,7 @@
           <a:p>
             <a:fld id="{82BCD581-7540-41CB-8BBB-BEC98AE789ED}" type="datetime1">
               <a:rPr lang="en-US" smtClean="0"/>
-              <a:t>3/17/2021</a:t>
+              <a:t>3/18/2021</a:t>
             </a:fld>
             <a:endParaRPr lang="en-US" dirty="0"/>
           </a:p>
@@ -9164,7 +9349,7 @@
           <a:p>
             <a:fld id="{82BCD581-7540-41CB-8BBB-BEC98AE789ED}" type="datetime1">
               <a:rPr lang="en-US" smtClean="0"/>
-              <a:t>3/17/2021</a:t>
+              <a:t>3/18/2021</a:t>
             </a:fld>
             <a:endParaRPr lang="en-US" dirty="0"/>
           </a:p>

</xml_diff>